<commit_message>
=Finished v. 1.0 of MFA workshop ppt
</commit_message>
<xml_diff>
--- a/workshops/micro-frontend-architecture-deep-dive/micro_frontend_architecture_deep_dive.pptx
+++ b/workshops/micro-frontend-architecture-deep-dive/micro_frontend_architecture_deep_dive.pptx
@@ -5,10 +5,10 @@
     <p:sldMasterId id="2147483648" r:id="rId4"/>
   </p:sldMasterIdLst>
   <p:notesMasterIdLst>
-    <p:notesMasterId r:id="rId31"/>
+    <p:notesMasterId r:id="rId33"/>
   </p:notesMasterIdLst>
   <p:handoutMasterIdLst>
-    <p:handoutMasterId r:id="rId32"/>
+    <p:handoutMasterId r:id="rId34"/>
   </p:handoutMasterIdLst>
   <p:sldIdLst>
     <p:sldId id="372" r:id="rId5"/>
@@ -35,32 +35,34 @@
     <p:sldId id="439" r:id="rId26"/>
     <p:sldId id="440" r:id="rId27"/>
     <p:sldId id="438" r:id="rId28"/>
-    <p:sldId id="464" r:id="rId29"/>
-    <p:sldId id="476" r:id="rId30"/>
+    <p:sldId id="477" r:id="rId29"/>
+    <p:sldId id="478" r:id="rId30"/>
+    <p:sldId id="464" r:id="rId31"/>
+    <p:sldId id="476" r:id="rId32"/>
   </p:sldIdLst>
   <p:sldSz cx="12192000" cy="6858000"/>
   <p:notesSz cx="6858000" cy="9144000"/>
   <p:embeddedFontLst>
     <p:embeddedFont>
       <p:font typeface="Calibri" panose="020F0502020204030204" pitchFamily="34" charset="0"/>
-      <p:regular r:id="rId33"/>
-      <p:bold r:id="rId34"/>
-      <p:italic r:id="rId35"/>
-      <p:boldItalic r:id="rId36"/>
+      <p:regular r:id="rId35"/>
+      <p:bold r:id="rId36"/>
+      <p:italic r:id="rId37"/>
+      <p:boldItalic r:id="rId38"/>
     </p:embeddedFont>
     <p:embeddedFont>
       <p:font typeface="DFDS" panose="020B0604020202020204" charset="0"/>
-      <p:regular r:id="rId37"/>
-      <p:bold r:id="rId38"/>
-      <p:italic r:id="rId39"/>
+      <p:regular r:id="rId39"/>
+      <p:bold r:id="rId40"/>
+      <p:italic r:id="rId41"/>
     </p:embeddedFont>
     <p:embeddedFont>
       <p:font typeface="DFDS Bold" panose="020B0604020202020204" charset="0"/>
-      <p:bold r:id="rId40"/>
+      <p:bold r:id="rId42"/>
     </p:embeddedFont>
     <p:embeddedFont>
       <p:font typeface="DFDS Light" panose="020B0604020202020204" charset="0"/>
-      <p:regular r:id="rId41"/>
+      <p:regular r:id="rId43"/>
     </p:embeddedFont>
   </p:embeddedFontLst>
   <p:defaultTextStyle>
@@ -2943,7 +2945,7 @@
           <a:p>
             <a:fld id="{F540F470-726F-426E-889A-8E92A4693460}" type="datetimeFigureOut">
               <a:rPr lang="en-GB" smtClean="0"/>
-              <a:t>24/09/2020</a:t>
+              <a:t>25/09/2020</a:t>
             </a:fld>
             <a:endParaRPr lang="en-GB" dirty="0"/>
           </a:p>
@@ -3113,7 +3115,7 @@
             <a:fld id="{CD72A38B-F9FA-4036-A084-652409E98F08}" type="datetimeFigureOut">
               <a:rPr lang="en-GB" smtClean="0"/>
               <a:pPr/>
-              <a:t>24/09/2020</a:t>
+              <a:t>25/09/2020</a:t>
             </a:fld>
             <a:endParaRPr lang="en-GB" dirty="0"/>
           </a:p>
@@ -4539,7 +4541,7 @@
           <a:p>
             <a:fld id="{CAE15A36-EF7C-49E1-9E28-DC0261021B88}" type="datetime4">
               <a:rPr lang="en-GB" smtClean="0"/>
-              <a:t>24 September 2020</a:t>
+              <a:t>25 September 2020</a:t>
             </a:fld>
             <a:endParaRPr lang="en-GB" dirty="0"/>
           </a:p>
@@ -5042,7 +5044,7 @@
           <a:p>
             <a:fld id="{73A80043-8D1A-4EE7-8835-0FA45918CF0B}" type="datetime4">
               <a:rPr lang="en-GB" smtClean="0"/>
-              <a:t>24 September 2020</a:t>
+              <a:t>25 September 2020</a:t>
             </a:fld>
             <a:endParaRPr lang="en-GB" dirty="0"/>
           </a:p>
@@ -13568,7 +13570,7 @@
           <a:p>
             <a:fld id="{61C39D88-A2D2-46EF-88AA-9A0C8DF2E827}" type="datetime4">
               <a:rPr lang="en-GB" smtClean="0"/>
-              <a:t>24 September 2020</a:t>
+              <a:t>25 September 2020</a:t>
             </a:fld>
             <a:endParaRPr lang="en-GB" dirty="0"/>
           </a:p>
@@ -14955,7 +14957,7 @@
           <a:p>
             <a:fld id="{E66F39FE-A71C-4EA9-B6A2-49D418A61827}" type="datetimeFigureOut">
               <a:rPr lang="en-US" smtClean="0"/>
-              <a:t>9/24/2020</a:t>
+              <a:t>9/25/2020</a:t>
             </a:fld>
             <a:endParaRPr lang="en-US"/>
           </a:p>
@@ -18736,7 +18738,7 @@
           <a:p>
             <a:fld id="{A98DB34D-784C-4D9C-ABD8-61F63F762187}" type="datetime4">
               <a:rPr lang="en-GB" smtClean="0"/>
-              <a:t>24 September 2020</a:t>
+              <a:t>25 September 2020</a:t>
             </a:fld>
             <a:endParaRPr lang="en-GB" dirty="0"/>
           </a:p>
@@ -20119,7 +20121,15 @@
             </a:pPr>
             <a:r>
               <a:rPr lang="en-US" sz="2100" dirty="0"/>
-              <a:t>Will not render until it is activated.</a:t>
+              <a:t>Will </a:t>
+            </a:r>
+            <a:r>
+              <a:rPr lang="en-US" sz="2100" b="1" dirty="0"/>
+              <a:t>not render </a:t>
+            </a:r>
+            <a:r>
+              <a:rPr lang="en-US" sz="2100" dirty="0"/>
+              <a:t>until it is activated.</a:t>
             </a:r>
             <a:br>
               <a:rPr lang="en-US" sz="2100" dirty="0"/>
@@ -20133,7 +20143,23 @@
             </a:pPr>
             <a:r>
               <a:rPr lang="en-US" sz="2100" dirty="0"/>
-              <a:t>Has no effect on other parts of the page - scripts won’t run, images won’t load, audio won’t play - until activated.</a:t>
+              <a:t>Has </a:t>
+            </a:r>
+            <a:r>
+              <a:rPr lang="en-US" sz="2100" b="1" dirty="0"/>
+              <a:t>no effect </a:t>
+            </a:r>
+            <a:r>
+              <a:rPr lang="en-US" sz="2100" dirty="0"/>
+              <a:t>on other parts of the page - scripts won’t run, images won’t load, audio won’t play - </a:t>
+            </a:r>
+            <a:r>
+              <a:rPr lang="en-US" sz="2100" b="1" dirty="0"/>
+              <a:t>until activated</a:t>
+            </a:r>
+            <a:r>
+              <a:rPr lang="en-US" sz="2100" dirty="0"/>
+              <a:t>.</a:t>
             </a:r>
             <a:br>
               <a:rPr lang="en-US" sz="2100" dirty="0"/>
@@ -20147,7 +20173,15 @@
             </a:pPr>
             <a:r>
               <a:rPr lang="en-US" sz="2100" dirty="0"/>
-              <a:t>Will not appear in the DOM.</a:t>
+              <a:t>Will </a:t>
+            </a:r>
+            <a:r>
+              <a:rPr lang="en-US" sz="2100" b="1" dirty="0"/>
+              <a:t>not appear </a:t>
+            </a:r>
+            <a:r>
+              <a:rPr lang="en-US" sz="2100" dirty="0"/>
+              <a:t>in the DOM.</a:t>
             </a:r>
             <a:br>
               <a:rPr lang="en-US" sz="2100" dirty="0"/>
@@ -20161,7 +20195,23 @@
             </a:pPr>
             <a:r>
               <a:rPr lang="en-US" sz="2100" dirty="0"/>
-              <a:t>Templates can be placed anywhere in &lt;head&gt;, &lt;body&gt; or &lt;frameset&gt; and can contain any content that is allowed in those elements.</a:t>
+              <a:t>Templates can be </a:t>
+            </a:r>
+            <a:r>
+              <a:rPr lang="en-US" sz="2100" b="1" dirty="0"/>
+              <a:t>placed anywhere </a:t>
+            </a:r>
+            <a:r>
+              <a:rPr lang="en-US" sz="2100" dirty="0"/>
+              <a:t>in &lt;head&gt;, &lt;body&gt; or &lt;frameset&gt; and can contain </a:t>
+            </a:r>
+            <a:r>
+              <a:rPr lang="en-US" sz="2100" b="1" dirty="0"/>
+              <a:t>any content </a:t>
+            </a:r>
+            <a:r>
+              <a:rPr lang="en-US" sz="2100" dirty="0"/>
+              <a:t>that is allowed in those elements.</a:t>
             </a:r>
           </a:p>
         </p:txBody>
@@ -21316,6 +21366,232 @@
   <p:clrMapOvr>
     <a:masterClrMapping/>
   </p:clrMapOvr>
+  <p:timing>
+    <p:tnLst>
+      <p:par>
+        <p:cTn id="1" dur="indefinite" restart="never" nodeType="tmRoot">
+          <p:childTnLst>
+            <p:seq concurrent="1" nextAc="seek">
+              <p:cTn id="2" dur="indefinite" nodeType="mainSeq">
+                <p:childTnLst>
+                  <p:par>
+                    <p:cTn id="3" fill="hold">
+                      <p:stCondLst>
+                        <p:cond delay="indefinite"/>
+                      </p:stCondLst>
+                      <p:childTnLst>
+                        <p:par>
+                          <p:cTn id="4" fill="hold">
+                            <p:stCondLst>
+                              <p:cond delay="0"/>
+                            </p:stCondLst>
+                            <p:childTnLst>
+                              <p:par>
+                                <p:cTn id="5" presetID="1" presetClass="entr" presetSubtype="0" fill="hold" nodeType="clickEffect">
+                                  <p:stCondLst>
+                                    <p:cond delay="0"/>
+                                  </p:stCondLst>
+                                  <p:childTnLst>
+                                    <p:set>
+                                      <p:cBhvr>
+                                        <p:cTn id="6" dur="1" fill="hold">
+                                          <p:stCondLst>
+                                            <p:cond delay="0"/>
+                                          </p:stCondLst>
+                                        </p:cTn>
+                                        <p:tgtEl>
+                                          <p:spTgt spid="7">
+                                            <p:txEl>
+                                              <p:pRg st="2" end="2"/>
+                                            </p:txEl>
+                                          </p:spTgt>
+                                        </p:tgtEl>
+                                        <p:attrNameLst>
+                                          <p:attrName>style.visibility</p:attrName>
+                                        </p:attrNameLst>
+                                      </p:cBhvr>
+                                      <p:to>
+                                        <p:strVal val="visible"/>
+                                      </p:to>
+                                    </p:set>
+                                  </p:childTnLst>
+                                </p:cTn>
+                              </p:par>
+                            </p:childTnLst>
+                          </p:cTn>
+                        </p:par>
+                      </p:childTnLst>
+                    </p:cTn>
+                  </p:par>
+                  <p:par>
+                    <p:cTn id="7" fill="hold">
+                      <p:stCondLst>
+                        <p:cond delay="indefinite"/>
+                      </p:stCondLst>
+                      <p:childTnLst>
+                        <p:par>
+                          <p:cTn id="8" fill="hold">
+                            <p:stCondLst>
+                              <p:cond delay="0"/>
+                            </p:stCondLst>
+                            <p:childTnLst>
+                              <p:par>
+                                <p:cTn id="9" presetID="1" presetClass="entr" presetSubtype="0" fill="hold" nodeType="clickEffect">
+                                  <p:stCondLst>
+                                    <p:cond delay="0"/>
+                                  </p:stCondLst>
+                                  <p:childTnLst>
+                                    <p:set>
+                                      <p:cBhvr>
+                                        <p:cTn id="10" dur="1" fill="hold">
+                                          <p:stCondLst>
+                                            <p:cond delay="0"/>
+                                          </p:stCondLst>
+                                        </p:cTn>
+                                        <p:tgtEl>
+                                          <p:spTgt spid="7">
+                                            <p:txEl>
+                                              <p:pRg st="4" end="4"/>
+                                            </p:txEl>
+                                          </p:spTgt>
+                                        </p:tgtEl>
+                                        <p:attrNameLst>
+                                          <p:attrName>style.visibility</p:attrName>
+                                        </p:attrNameLst>
+                                      </p:cBhvr>
+                                      <p:to>
+                                        <p:strVal val="visible"/>
+                                      </p:to>
+                                    </p:set>
+                                  </p:childTnLst>
+                                </p:cTn>
+                              </p:par>
+                            </p:childTnLst>
+                          </p:cTn>
+                        </p:par>
+                      </p:childTnLst>
+                    </p:cTn>
+                  </p:par>
+                  <p:par>
+                    <p:cTn id="11" fill="hold">
+                      <p:stCondLst>
+                        <p:cond delay="indefinite"/>
+                      </p:stCondLst>
+                      <p:childTnLst>
+                        <p:par>
+                          <p:cTn id="12" fill="hold">
+                            <p:stCondLst>
+                              <p:cond delay="0"/>
+                            </p:stCondLst>
+                            <p:childTnLst>
+                              <p:par>
+                                <p:cTn id="13" presetID="1" presetClass="entr" presetSubtype="0" fill="hold" nodeType="clickEffect">
+                                  <p:stCondLst>
+                                    <p:cond delay="0"/>
+                                  </p:stCondLst>
+                                  <p:childTnLst>
+                                    <p:set>
+                                      <p:cBhvr>
+                                        <p:cTn id="14" dur="1" fill="hold">
+                                          <p:stCondLst>
+                                            <p:cond delay="0"/>
+                                          </p:stCondLst>
+                                        </p:cTn>
+                                        <p:tgtEl>
+                                          <p:spTgt spid="7">
+                                            <p:txEl>
+                                              <p:pRg st="6" end="6"/>
+                                            </p:txEl>
+                                          </p:spTgt>
+                                        </p:tgtEl>
+                                        <p:attrNameLst>
+                                          <p:attrName>style.visibility</p:attrName>
+                                        </p:attrNameLst>
+                                      </p:cBhvr>
+                                      <p:to>
+                                        <p:strVal val="visible"/>
+                                      </p:to>
+                                    </p:set>
+                                  </p:childTnLst>
+                                </p:cTn>
+                              </p:par>
+                            </p:childTnLst>
+                          </p:cTn>
+                        </p:par>
+                      </p:childTnLst>
+                    </p:cTn>
+                  </p:par>
+                  <p:par>
+                    <p:cTn id="15" fill="hold">
+                      <p:stCondLst>
+                        <p:cond delay="indefinite"/>
+                      </p:stCondLst>
+                      <p:childTnLst>
+                        <p:par>
+                          <p:cTn id="16" fill="hold">
+                            <p:stCondLst>
+                              <p:cond delay="0"/>
+                            </p:stCondLst>
+                            <p:childTnLst>
+                              <p:par>
+                                <p:cTn id="17" presetID="1" presetClass="entr" presetSubtype="0" fill="hold" nodeType="clickEffect">
+                                  <p:stCondLst>
+                                    <p:cond delay="0"/>
+                                  </p:stCondLst>
+                                  <p:childTnLst>
+                                    <p:set>
+                                      <p:cBhvr>
+                                        <p:cTn id="18" dur="1" fill="hold">
+                                          <p:stCondLst>
+                                            <p:cond delay="0"/>
+                                          </p:stCondLst>
+                                        </p:cTn>
+                                        <p:tgtEl>
+                                          <p:spTgt spid="7">
+                                            <p:txEl>
+                                              <p:pRg st="8" end="8"/>
+                                            </p:txEl>
+                                          </p:spTgt>
+                                        </p:tgtEl>
+                                        <p:attrNameLst>
+                                          <p:attrName>style.visibility</p:attrName>
+                                        </p:attrNameLst>
+                                      </p:cBhvr>
+                                      <p:to>
+                                        <p:strVal val="visible"/>
+                                      </p:to>
+                                    </p:set>
+                                  </p:childTnLst>
+                                </p:cTn>
+                              </p:par>
+                            </p:childTnLst>
+                          </p:cTn>
+                        </p:par>
+                      </p:childTnLst>
+                    </p:cTn>
+                  </p:par>
+                </p:childTnLst>
+              </p:cTn>
+              <p:prevCondLst>
+                <p:cond evt="onPrev" delay="0">
+                  <p:tgtEl>
+                    <p:sldTgt/>
+                  </p:tgtEl>
+                </p:cond>
+              </p:prevCondLst>
+              <p:nextCondLst>
+                <p:cond evt="onNext" delay="0">
+                  <p:tgtEl>
+                    <p:sldTgt/>
+                  </p:tgtEl>
+                </p:cond>
+              </p:nextCondLst>
+            </p:seq>
+          </p:childTnLst>
+        </p:cTn>
+      </p:par>
+    </p:tnLst>
+  </p:timing>
 </p:sld>
 </file>
 
@@ -22091,7 +22367,15 @@
             </a:pPr>
             <a:r>
               <a:rPr lang="en-US" sz="2100" dirty="0"/>
-              <a:t>Autonomous custom elements with custom behaviors and styles, defined entirely by the author.</a:t>
+              <a:t>Autonomous custom elements with </a:t>
+            </a:r>
+            <a:r>
+              <a:rPr lang="en-US" sz="2100" b="1" dirty="0"/>
+              <a:t>custom behaviors and styles</a:t>
+            </a:r>
+            <a:r>
+              <a:rPr lang="en-US" sz="2100" dirty="0"/>
+              <a:t>, defined entirely by the author.</a:t>
             </a:r>
             <a:br>
               <a:rPr lang="en-US" sz="2100" dirty="0"/>
@@ -22105,7 +22389,15 @@
             </a:pPr>
             <a:r>
               <a:rPr lang="en-US" sz="2100" dirty="0"/>
-              <a:t>Plug &amp; play components that can integrated in any HTML5-enabled application.</a:t>
+              <a:t>Plug &amp; play components that can </a:t>
+            </a:r>
+            <a:r>
+              <a:rPr lang="en-US" sz="2100" b="1" dirty="0"/>
+              <a:t>integrated in any HTML5-enabled </a:t>
+            </a:r>
+            <a:r>
+              <a:rPr lang="en-US" sz="2100" dirty="0"/>
+              <a:t>context.</a:t>
             </a:r>
             <a:br>
               <a:rPr lang="en-US" sz="2100" dirty="0"/>
@@ -22119,7 +22411,15 @@
             </a:pPr>
             <a:r>
               <a:rPr lang="en-US" sz="2100" dirty="0"/>
-              <a:t>Extensibility of existing HTML elements with new functionality as custom elements inherit semantics from the elements they extend.</a:t>
+              <a:t>Extensibility of existing HTML elements with new functionality as </a:t>
+            </a:r>
+            <a:r>
+              <a:rPr lang="en-US" sz="2100" b="1" dirty="0"/>
+              <a:t>custom elements inherit semantics </a:t>
+            </a:r>
+            <a:r>
+              <a:rPr lang="en-US" sz="2100" dirty="0"/>
+              <a:t>from the elements they extend.</a:t>
             </a:r>
           </a:p>
         </p:txBody>
@@ -22146,9 +22446,6 @@
                     <p:cTn id="3" fill="hold">
                       <p:stCondLst>
                         <p:cond delay="indefinite"/>
-                        <p:cond evt="onBegin" delay="0">
-                          <p:tn val="2"/>
-                        </p:cond>
                       </p:stCondLst>
                       <p:childTnLst>
                         <p:par>
@@ -22158,7 +22455,7 @@
                             </p:stCondLst>
                             <p:childTnLst>
                               <p:par>
-                                <p:cTn id="5" presetID="1" presetClass="entr" presetSubtype="0" fill="hold" nodeType="withEffect">
+                                <p:cTn id="5" presetID="1" presetClass="entr" presetSubtype="0" fill="hold" nodeType="clickEffect">
                                   <p:stCondLst>
                                     <p:cond delay="0"/>
                                   </p:stCondLst>
@@ -22173,7 +22470,7 @@
                                         <p:tgtEl>
                                           <p:spTgt spid="8">
                                             <p:txEl>
-                                              <p:pRg st="0" end="0"/>
+                                              <p:pRg st="2" end="2"/>
                                             </p:txEl>
                                           </p:spTgt>
                                         </p:tgtEl>
@@ -22222,7 +22519,7 @@
                                         <p:tgtEl>
                                           <p:spTgt spid="8">
                                             <p:txEl>
-                                              <p:pRg st="2" end="2"/>
+                                              <p:pRg st="3" end="3"/>
                                             </p:txEl>
                                           </p:spTgt>
                                         </p:tgtEl>
@@ -22264,55 +22561,6 @@
                                     <p:set>
                                       <p:cBhvr>
                                         <p:cTn id="14" dur="1" fill="hold">
-                                          <p:stCondLst>
-                                            <p:cond delay="0"/>
-                                          </p:stCondLst>
-                                        </p:cTn>
-                                        <p:tgtEl>
-                                          <p:spTgt spid="8">
-                                            <p:txEl>
-                                              <p:pRg st="3" end="3"/>
-                                            </p:txEl>
-                                          </p:spTgt>
-                                        </p:tgtEl>
-                                        <p:attrNameLst>
-                                          <p:attrName>style.visibility</p:attrName>
-                                        </p:attrNameLst>
-                                      </p:cBhvr>
-                                      <p:to>
-                                        <p:strVal val="visible"/>
-                                      </p:to>
-                                    </p:set>
-                                  </p:childTnLst>
-                                </p:cTn>
-                              </p:par>
-                            </p:childTnLst>
-                          </p:cTn>
-                        </p:par>
-                      </p:childTnLst>
-                    </p:cTn>
-                  </p:par>
-                  <p:par>
-                    <p:cTn id="15" fill="hold">
-                      <p:stCondLst>
-                        <p:cond delay="indefinite"/>
-                      </p:stCondLst>
-                      <p:childTnLst>
-                        <p:par>
-                          <p:cTn id="16" fill="hold">
-                            <p:stCondLst>
-                              <p:cond delay="0"/>
-                            </p:stCondLst>
-                            <p:childTnLst>
-                              <p:par>
-                                <p:cTn id="17" presetID="1" presetClass="entr" presetSubtype="0" fill="hold" nodeType="clickEffect">
-                                  <p:stCondLst>
-                                    <p:cond delay="0"/>
-                                  </p:stCondLst>
-                                  <p:childTnLst>
-                                    <p:set>
-                                      <p:cBhvr>
-                                        <p:cTn id="18" dur="1" fill="hold">
                                           <p:stCondLst>
                                             <p:cond delay="0"/>
                                           </p:stCondLst>
@@ -23641,9 +23889,6 @@
                     <p:cTn id="3" fill="hold">
                       <p:stCondLst>
                         <p:cond delay="indefinite"/>
-                        <p:cond evt="onBegin" delay="0">
-                          <p:tn val="2"/>
-                        </p:cond>
                       </p:stCondLst>
                       <p:childTnLst>
                         <p:par>
@@ -23653,7 +23898,7 @@
                             </p:stCondLst>
                             <p:childTnLst>
                               <p:par>
-                                <p:cTn id="5" presetID="1" presetClass="entr" presetSubtype="0" fill="hold" nodeType="withEffect">
+                                <p:cTn id="5" presetID="1" presetClass="entr" presetSubtype="0" fill="hold" nodeType="clickEffect">
                                   <p:stCondLst>
                                     <p:cond delay="0"/>
                                   </p:stCondLst>
@@ -23668,7 +23913,7 @@
                                         <p:tgtEl>
                                           <p:spTgt spid="7">
                                             <p:txEl>
-                                              <p:pRg st="0" end="0"/>
+                                              <p:pRg st="2" end="2"/>
                                             </p:txEl>
                                           </p:spTgt>
                                         </p:tgtEl>
@@ -23717,7 +23962,7 @@
                                         <p:tgtEl>
                                           <p:spTgt spid="7">
                                             <p:txEl>
-                                              <p:pRg st="2" end="2"/>
+                                              <p:pRg st="3" end="3"/>
                                             </p:txEl>
                                           </p:spTgt>
                                         </p:tgtEl>
@@ -23766,7 +24011,7 @@
                                         <p:tgtEl>
                                           <p:spTgt spid="7">
                                             <p:txEl>
-                                              <p:pRg st="3" end="3"/>
+                                              <p:pRg st="5" end="5"/>
                                             </p:txEl>
                                           </p:spTgt>
                                         </p:tgtEl>
@@ -23815,7 +24060,7 @@
                                         <p:tgtEl>
                                           <p:spTgt spid="7">
                                             <p:txEl>
-                                              <p:pRg st="5" end="5"/>
+                                              <p:pRg st="7" end="7"/>
                                             </p:txEl>
                                           </p:spTgt>
                                         </p:tgtEl>
@@ -23857,55 +24102,6 @@
                                     <p:set>
                                       <p:cBhvr>
                                         <p:cTn id="22" dur="1" fill="hold">
-                                          <p:stCondLst>
-                                            <p:cond delay="0"/>
-                                          </p:stCondLst>
-                                        </p:cTn>
-                                        <p:tgtEl>
-                                          <p:spTgt spid="7">
-                                            <p:txEl>
-                                              <p:pRg st="7" end="7"/>
-                                            </p:txEl>
-                                          </p:spTgt>
-                                        </p:tgtEl>
-                                        <p:attrNameLst>
-                                          <p:attrName>style.visibility</p:attrName>
-                                        </p:attrNameLst>
-                                      </p:cBhvr>
-                                      <p:to>
-                                        <p:strVal val="visible"/>
-                                      </p:to>
-                                    </p:set>
-                                  </p:childTnLst>
-                                </p:cTn>
-                              </p:par>
-                            </p:childTnLst>
-                          </p:cTn>
-                        </p:par>
-                      </p:childTnLst>
-                    </p:cTn>
-                  </p:par>
-                  <p:par>
-                    <p:cTn id="23" fill="hold">
-                      <p:stCondLst>
-                        <p:cond delay="indefinite"/>
-                      </p:stCondLst>
-                      <p:childTnLst>
-                        <p:par>
-                          <p:cTn id="24" fill="hold">
-                            <p:stCondLst>
-                              <p:cond delay="0"/>
-                            </p:stCondLst>
-                            <p:childTnLst>
-                              <p:par>
-                                <p:cTn id="25" presetID="1" presetClass="entr" presetSubtype="0" fill="hold" nodeType="clickEffect">
-                                  <p:stCondLst>
-                                    <p:cond delay="0"/>
-                                  </p:stCondLst>
-                                  <p:childTnLst>
-                                    <p:set>
-                                      <p:cBhvr>
-                                        <p:cTn id="26" dur="1" fill="hold">
                                           <p:stCondLst>
                                             <p:cond delay="0"/>
                                           </p:stCondLst>
@@ -24691,6 +24887,73 @@
           </p:txBody>
         </p:sp>
       </p:grpSp>
+      <p:sp>
+        <p:nvSpPr>
+          <p:cNvPr id="7" name="TextBox 6">
+            <a:extLst>
+              <a:ext uri="{FF2B5EF4-FFF2-40B4-BE49-F238E27FC236}">
+                <a16:creationId xmlns:a16="http://schemas.microsoft.com/office/drawing/2014/main" id="{55DB2A99-9C92-4FE1-B28A-4DB5B9352228}"/>
+              </a:ext>
+            </a:extLst>
+          </p:cNvPr>
+          <p:cNvSpPr txBox="1"/>
+          <p:nvPr/>
+        </p:nvSpPr>
+        <p:spPr>
+          <a:xfrm>
+            <a:off x="1288741" y="1669002"/>
+            <a:ext cx="9614518" cy="4216893"/>
+          </a:xfrm>
+          <a:prstGeom prst="rect">
+            <a:avLst/>
+          </a:prstGeom>
+          <a:noFill/>
+        </p:spPr>
+        <p:txBody>
+          <a:bodyPr wrap="square" lIns="0" tIns="0" rIns="0" bIns="0" rtlCol="0" anchor="t">
+            <a:noAutofit/>
+          </a:bodyPr>
+          <a:lstStyle/>
+          <a:p>
+            <a:r>
+              <a:rPr lang="en-US" sz="2100" dirty="0" err="1"/>
+              <a:t>MinionsJS</a:t>
+            </a:r>
+            <a:r>
+              <a:rPr lang="en-US" sz="2100" dirty="0"/>
+              <a:t> is a lightweight framework focused on providing simple abstractions for key concepts such as web components, “transient events” and UI telemetry via a set of “prototypes” that tie together modern web standards with the aim of empower developers that want to built re-usable UI components which can be used anywhere and adhere to the general principles of our Composable Architecture.</a:t>
+            </a:r>
+            <a:br>
+              <a:rPr lang="en-US" sz="2100" dirty="0"/>
+            </a:br>
+            <a:endParaRPr lang="en-US" sz="2100" dirty="0"/>
+          </a:p>
+          <a:p>
+            <a:r>
+              <a:rPr lang="en-US" sz="2100" dirty="0" err="1"/>
+              <a:t>MinionsJS</a:t>
+            </a:r>
+            <a:r>
+              <a:rPr lang="en-US" sz="2100" dirty="0"/>
+              <a:t> achieve this through providing a “opinionated wrapper” around the lit-elements framework, a simple plugin API and a number of “extension points” to ensure compatibility with mainstream frameworks such as React, Angular and </a:t>
+            </a:r>
+            <a:r>
+              <a:rPr lang="en-US" sz="2100" dirty="0" err="1"/>
+              <a:t>VueJS</a:t>
+            </a:r>
+            <a:r>
+              <a:rPr lang="en-US" sz="2100" dirty="0"/>
+              <a:t>.</a:t>
+            </a:r>
+          </a:p>
+          <a:p>
+            <a:endParaRPr lang="en-US" sz="2100" dirty="0"/>
+          </a:p>
+          <a:p>
+            <a:endParaRPr lang="en-US" sz="2100" dirty="0"/>
+          </a:p>
+        </p:txBody>
+      </p:sp>
     </p:spTree>
     <p:extLst>
       <p:ext uri="{BB962C8B-B14F-4D97-AF65-F5344CB8AC3E}">
@@ -24701,10 +24964,633 @@
   <p:clrMapOvr>
     <a:masterClrMapping/>
   </p:clrMapOvr>
+  <p:timing>
+    <p:tnLst>
+      <p:par>
+        <p:cTn id="1" dur="indefinite" restart="never" nodeType="tmRoot">
+          <p:childTnLst>
+            <p:seq concurrent="1" nextAc="seek">
+              <p:cTn id="2" dur="indefinite" nodeType="mainSeq">
+                <p:childTnLst>
+                  <p:par>
+                    <p:cTn id="3" fill="hold">
+                      <p:stCondLst>
+                        <p:cond delay="indefinite"/>
+                      </p:stCondLst>
+                      <p:childTnLst>
+                        <p:par>
+                          <p:cTn id="4" fill="hold">
+                            <p:stCondLst>
+                              <p:cond delay="0"/>
+                            </p:stCondLst>
+                            <p:childTnLst>
+                              <p:par>
+                                <p:cTn id="5" presetID="1" presetClass="entr" presetSubtype="0" fill="hold" nodeType="clickEffect">
+                                  <p:stCondLst>
+                                    <p:cond delay="0"/>
+                                  </p:stCondLst>
+                                  <p:childTnLst>
+                                    <p:set>
+                                      <p:cBhvr>
+                                        <p:cTn id="6" dur="1" fill="hold">
+                                          <p:stCondLst>
+                                            <p:cond delay="0"/>
+                                          </p:stCondLst>
+                                        </p:cTn>
+                                        <p:tgtEl>
+                                          <p:spTgt spid="7">
+                                            <p:txEl>
+                                              <p:pRg st="1" end="1"/>
+                                            </p:txEl>
+                                          </p:spTgt>
+                                        </p:tgtEl>
+                                        <p:attrNameLst>
+                                          <p:attrName>style.visibility</p:attrName>
+                                        </p:attrNameLst>
+                                      </p:cBhvr>
+                                      <p:to>
+                                        <p:strVal val="visible"/>
+                                      </p:to>
+                                    </p:set>
+                                  </p:childTnLst>
+                                </p:cTn>
+                              </p:par>
+                            </p:childTnLst>
+                          </p:cTn>
+                        </p:par>
+                      </p:childTnLst>
+                    </p:cTn>
+                  </p:par>
+                </p:childTnLst>
+              </p:cTn>
+              <p:prevCondLst>
+                <p:cond evt="onPrev" delay="0">
+                  <p:tgtEl>
+                    <p:sldTgt/>
+                  </p:tgtEl>
+                </p:cond>
+              </p:prevCondLst>
+              <p:nextCondLst>
+                <p:cond evt="onNext" delay="0">
+                  <p:tgtEl>
+                    <p:sldTgt/>
+                  </p:tgtEl>
+                </p:cond>
+              </p:nextCondLst>
+            </p:seq>
+          </p:childTnLst>
+        </p:cTn>
+      </p:par>
+    </p:tnLst>
+  </p:timing>
 </p:sld>
 </file>
 
 <file path=ppt/slides/slide25.xml><?xml version="1.0" encoding="utf-8"?>
+<p:sld xmlns:a="http://schemas.openxmlformats.org/drawingml/2006/main" xmlns:r="http://schemas.openxmlformats.org/officeDocument/2006/relationships" xmlns:p="http://schemas.openxmlformats.org/presentationml/2006/main">
+  <p:cSld>
+    <p:spTree>
+      <p:nvGrpSpPr>
+        <p:cNvPr id="1" name=""/>
+        <p:cNvGrpSpPr/>
+        <p:nvPr/>
+      </p:nvGrpSpPr>
+      <p:grpSpPr>
+        <a:xfrm>
+          <a:off x="0" y="0"/>
+          <a:ext cx="0" cy="0"/>
+          <a:chOff x="0" y="0"/>
+          <a:chExt cx="0" cy="0"/>
+        </a:xfrm>
+      </p:grpSpPr>
+      <p:pic>
+        <p:nvPicPr>
+          <p:cNvPr id="9" name="Picture 8">
+            <a:extLst>
+              <a:ext uri="{FF2B5EF4-FFF2-40B4-BE49-F238E27FC236}">
+                <a16:creationId xmlns:a16="http://schemas.microsoft.com/office/drawing/2014/main" id="{47FF90BC-4EA9-4433-8469-620BF496C336}"/>
+              </a:ext>
+            </a:extLst>
+          </p:cNvPr>
+          <p:cNvPicPr>
+            <a:picLocks noChangeAspect="1"/>
+          </p:cNvPicPr>
+          <p:nvPr/>
+        </p:nvPicPr>
+        <p:blipFill rotWithShape="1">
+          <a:blip r:embed="rId2">
+            <a:extLst>
+              <a:ext uri="{28A0092B-C50C-407E-A947-70E740481C1C}">
+                <a14:useLocalDpi xmlns:a14="http://schemas.microsoft.com/office/drawing/2010/main" val="0"/>
+              </a:ext>
+            </a:extLst>
+          </a:blip>
+          <a:srcRect r="62500"/>
+          <a:stretch/>
+        </p:blipFill>
+        <p:spPr>
+          <a:xfrm>
+            <a:off x="172497" y="-110435"/>
+            <a:ext cx="914400" cy="1251712"/>
+          </a:xfrm>
+          <a:prstGeom prst="rect">
+            <a:avLst/>
+          </a:prstGeom>
+        </p:spPr>
+      </p:pic>
+      <p:pic>
+        <p:nvPicPr>
+          <p:cNvPr id="7" name="Picture 6">
+            <a:extLst>
+              <a:ext uri="{FF2B5EF4-FFF2-40B4-BE49-F238E27FC236}">
+                <a16:creationId xmlns:a16="http://schemas.microsoft.com/office/drawing/2014/main" id="{C71818C1-C601-47B1-836C-F036733B9814}"/>
+              </a:ext>
+            </a:extLst>
+          </p:cNvPr>
+          <p:cNvPicPr>
+            <a:picLocks noChangeAspect="1"/>
+          </p:cNvPicPr>
+          <p:nvPr/>
+        </p:nvPicPr>
+        <p:blipFill>
+          <a:blip r:embed="rId3">
+            <a:extLst>
+              <a:ext uri="{28A0092B-C50C-407E-A947-70E740481C1C}">
+                <a14:useLocalDpi xmlns:a14="http://schemas.microsoft.com/office/drawing/2010/main" val="0"/>
+              </a:ext>
+            </a:extLst>
+          </a:blip>
+          <a:stretch>
+            <a:fillRect/>
+          </a:stretch>
+        </p:blipFill>
+        <p:spPr>
+          <a:xfrm>
+            <a:off x="2491274" y="1263702"/>
+            <a:ext cx="7499751" cy="5330759"/>
+          </a:xfrm>
+          <a:prstGeom prst="rect">
+            <a:avLst/>
+          </a:prstGeom>
+        </p:spPr>
+      </p:pic>
+      <p:grpSp>
+        <p:nvGrpSpPr>
+          <p:cNvPr id="10" name="Group 9">
+            <a:extLst>
+              <a:ext uri="{FF2B5EF4-FFF2-40B4-BE49-F238E27FC236}">
+                <a16:creationId xmlns:a16="http://schemas.microsoft.com/office/drawing/2014/main" id="{58A8AF2F-B974-4491-91CE-6F2028BFACCD}"/>
+              </a:ext>
+            </a:extLst>
+          </p:cNvPr>
+          <p:cNvGrpSpPr/>
+          <p:nvPr/>
+        </p:nvGrpSpPr>
+        <p:grpSpPr>
+          <a:xfrm>
+            <a:off x="2" y="2"/>
+            <a:ext cx="12191999" cy="948335"/>
+            <a:chOff x="0" y="0"/>
+            <a:chExt cx="12192000" cy="948335"/>
+          </a:xfrm>
+          <a:solidFill>
+            <a:schemeClr val="accent1"/>
+          </a:solidFill>
+        </p:grpSpPr>
+        <p:sp>
+          <p:nvSpPr>
+            <p:cNvPr id="11" name="Rectangle 10">
+              <a:extLst>
+                <a:ext uri="{FF2B5EF4-FFF2-40B4-BE49-F238E27FC236}">
+                  <a16:creationId xmlns:a16="http://schemas.microsoft.com/office/drawing/2014/main" id="{049BDDA0-374D-4DE8-9E4C-A21ED7C8652D}"/>
+                </a:ext>
+              </a:extLst>
+            </p:cNvPr>
+            <p:cNvSpPr/>
+            <p:nvPr/>
+          </p:nvSpPr>
+          <p:spPr>
+            <a:xfrm>
+              <a:off x="0" y="0"/>
+              <a:ext cx="12192000" cy="948335"/>
+            </a:xfrm>
+            <a:prstGeom prst="rect">
+              <a:avLst/>
+            </a:prstGeom>
+            <a:grpFill/>
+            <a:ln>
+              <a:noFill/>
+            </a:ln>
+          </p:spPr>
+          <p:style>
+            <a:lnRef idx="2">
+              <a:schemeClr val="accent1">
+                <a:shade val="50000"/>
+              </a:schemeClr>
+            </a:lnRef>
+            <a:fillRef idx="1">
+              <a:schemeClr val="accent1"/>
+            </a:fillRef>
+            <a:effectRef idx="0">
+              <a:schemeClr val="accent1"/>
+            </a:effectRef>
+            <a:fontRef idx="minor">
+              <a:schemeClr val="lt1"/>
+            </a:fontRef>
+          </p:style>
+          <p:txBody>
+            <a:bodyPr rtlCol="0" anchor="ctr"/>
+            <a:lstStyle/>
+            <a:p>
+              <a:pPr algn="ctr"/>
+              <a:endParaRPr lang="en-US" sz="1225" dirty="0"/>
+            </a:p>
+          </p:txBody>
+        </p:sp>
+        <p:sp>
+          <p:nvSpPr>
+            <p:cNvPr id="12" name="TextBox 11">
+              <a:extLst>
+                <a:ext uri="{FF2B5EF4-FFF2-40B4-BE49-F238E27FC236}">
+                  <a16:creationId xmlns:a16="http://schemas.microsoft.com/office/drawing/2014/main" id="{329B3816-A639-4692-9BC7-1BAA8E40C57D}"/>
+                </a:ext>
+              </a:extLst>
+            </p:cNvPr>
+            <p:cNvSpPr txBox="1"/>
+            <p:nvPr/>
+          </p:nvSpPr>
+          <p:spPr>
+            <a:xfrm>
+              <a:off x="10972800" y="289501"/>
+              <a:ext cx="900953" cy="280846"/>
+            </a:xfrm>
+            <a:prstGeom prst="rect">
+              <a:avLst/>
+            </a:prstGeom>
+            <a:grpFill/>
+            <a:ln>
+              <a:noFill/>
+            </a:ln>
+          </p:spPr>
+          <p:txBody>
+            <a:bodyPr wrap="square" rtlCol="0">
+              <a:spAutoFit/>
+            </a:bodyPr>
+            <a:lstStyle/>
+            <a:p>
+              <a:endParaRPr lang="en-US" sz="1225" dirty="0">
+                <a:solidFill>
+                  <a:schemeClr val="bg1"/>
+                </a:solidFill>
+              </a:endParaRPr>
+            </a:p>
+          </p:txBody>
+        </p:sp>
+        <p:sp>
+          <p:nvSpPr>
+            <p:cNvPr id="14" name="TextBox 13">
+              <a:extLst>
+                <a:ext uri="{FF2B5EF4-FFF2-40B4-BE49-F238E27FC236}">
+                  <a16:creationId xmlns:a16="http://schemas.microsoft.com/office/drawing/2014/main" id="{D6424EF1-A4E5-4F24-BD9A-DB2F01928066}"/>
+                </a:ext>
+              </a:extLst>
+            </p:cNvPr>
+            <p:cNvSpPr txBox="1"/>
+            <p:nvPr/>
+          </p:nvSpPr>
+          <p:spPr>
+            <a:xfrm>
+              <a:off x="501407" y="315365"/>
+              <a:ext cx="8089074" cy="400110"/>
+            </a:xfrm>
+            <a:prstGeom prst="rect">
+              <a:avLst/>
+            </a:prstGeom>
+            <a:grpFill/>
+            <a:ln>
+              <a:noFill/>
+            </a:ln>
+          </p:spPr>
+          <p:txBody>
+            <a:bodyPr wrap="square" rtlCol="0">
+              <a:spAutoFit/>
+            </a:bodyPr>
+            <a:lstStyle/>
+            <a:p>
+              <a:r>
+                <a:rPr lang="en-US" sz="2000" dirty="0">
+                  <a:solidFill>
+                    <a:schemeClr val="bg1"/>
+                  </a:solidFill>
+                </a:rPr>
+                <a:t>MFA &gt; </a:t>
+              </a:r>
+              <a:r>
+                <a:rPr lang="en-US" sz="2000" dirty="0" err="1">
+                  <a:solidFill>
+                    <a:schemeClr val="bg1"/>
+                  </a:solidFill>
+                </a:rPr>
+                <a:t>MinionsJS</a:t>
+              </a:r>
+              <a:r>
+                <a:rPr lang="en-US" sz="2000" dirty="0">
+                  <a:solidFill>
+                    <a:schemeClr val="bg1"/>
+                  </a:solidFill>
+                </a:rPr>
+                <a:t> &gt; Hands-on</a:t>
+              </a:r>
+            </a:p>
+          </p:txBody>
+        </p:sp>
+      </p:grpSp>
+    </p:spTree>
+    <p:extLst>
+      <p:ext uri="{BB962C8B-B14F-4D97-AF65-F5344CB8AC3E}">
+        <p14:creationId xmlns:p14="http://schemas.microsoft.com/office/powerpoint/2010/main" val="2054031497"/>
+      </p:ext>
+    </p:extLst>
+  </p:cSld>
+  <p:clrMapOvr>
+    <a:masterClrMapping/>
+  </p:clrMapOvr>
+</p:sld>
+</file>
+
+<file path=ppt/slides/slide26.xml><?xml version="1.0" encoding="utf-8"?>
+<p:sld xmlns:a="http://schemas.openxmlformats.org/drawingml/2006/main" xmlns:r="http://schemas.openxmlformats.org/officeDocument/2006/relationships" xmlns:p="http://schemas.openxmlformats.org/presentationml/2006/main">
+  <p:cSld>
+    <p:spTree>
+      <p:nvGrpSpPr>
+        <p:cNvPr id="1" name=""/>
+        <p:cNvGrpSpPr/>
+        <p:nvPr/>
+      </p:nvGrpSpPr>
+      <p:grpSpPr>
+        <a:xfrm>
+          <a:off x="0" y="0"/>
+          <a:ext cx="0" cy="0"/>
+          <a:chOff x="0" y="0"/>
+          <a:chExt cx="0" cy="0"/>
+        </a:xfrm>
+      </p:grpSpPr>
+      <p:pic>
+        <p:nvPicPr>
+          <p:cNvPr id="9" name="Picture 8">
+            <a:extLst>
+              <a:ext uri="{FF2B5EF4-FFF2-40B4-BE49-F238E27FC236}">
+                <a16:creationId xmlns:a16="http://schemas.microsoft.com/office/drawing/2014/main" id="{47FF90BC-4EA9-4433-8469-620BF496C336}"/>
+              </a:ext>
+            </a:extLst>
+          </p:cNvPr>
+          <p:cNvPicPr>
+            <a:picLocks noChangeAspect="1"/>
+          </p:cNvPicPr>
+          <p:nvPr/>
+        </p:nvPicPr>
+        <p:blipFill rotWithShape="1">
+          <a:blip r:embed="rId2">
+            <a:extLst>
+              <a:ext uri="{28A0092B-C50C-407E-A947-70E740481C1C}">
+                <a14:useLocalDpi xmlns:a14="http://schemas.microsoft.com/office/drawing/2010/main" val="0"/>
+              </a:ext>
+            </a:extLst>
+          </a:blip>
+          <a:srcRect r="62500"/>
+          <a:stretch/>
+        </p:blipFill>
+        <p:spPr>
+          <a:xfrm>
+            <a:off x="172497" y="-110435"/>
+            <a:ext cx="914400" cy="1251712"/>
+          </a:xfrm>
+          <a:prstGeom prst="rect">
+            <a:avLst/>
+          </a:prstGeom>
+        </p:spPr>
+      </p:pic>
+      <p:grpSp>
+        <p:nvGrpSpPr>
+          <p:cNvPr id="10" name="Group 9">
+            <a:extLst>
+              <a:ext uri="{FF2B5EF4-FFF2-40B4-BE49-F238E27FC236}">
+                <a16:creationId xmlns:a16="http://schemas.microsoft.com/office/drawing/2014/main" id="{58A8AF2F-B974-4491-91CE-6F2028BFACCD}"/>
+              </a:ext>
+            </a:extLst>
+          </p:cNvPr>
+          <p:cNvGrpSpPr/>
+          <p:nvPr/>
+        </p:nvGrpSpPr>
+        <p:grpSpPr>
+          <a:xfrm>
+            <a:off x="2" y="2"/>
+            <a:ext cx="12191999" cy="948335"/>
+            <a:chOff x="0" y="0"/>
+            <a:chExt cx="12192000" cy="948335"/>
+          </a:xfrm>
+          <a:solidFill>
+            <a:schemeClr val="accent1"/>
+          </a:solidFill>
+        </p:grpSpPr>
+        <p:sp>
+          <p:nvSpPr>
+            <p:cNvPr id="11" name="Rectangle 10">
+              <a:extLst>
+                <a:ext uri="{FF2B5EF4-FFF2-40B4-BE49-F238E27FC236}">
+                  <a16:creationId xmlns:a16="http://schemas.microsoft.com/office/drawing/2014/main" id="{049BDDA0-374D-4DE8-9E4C-A21ED7C8652D}"/>
+                </a:ext>
+              </a:extLst>
+            </p:cNvPr>
+            <p:cNvSpPr/>
+            <p:nvPr/>
+          </p:nvSpPr>
+          <p:spPr>
+            <a:xfrm>
+              <a:off x="0" y="0"/>
+              <a:ext cx="12192000" cy="948335"/>
+            </a:xfrm>
+            <a:prstGeom prst="rect">
+              <a:avLst/>
+            </a:prstGeom>
+            <a:grpFill/>
+            <a:ln>
+              <a:noFill/>
+            </a:ln>
+          </p:spPr>
+          <p:style>
+            <a:lnRef idx="2">
+              <a:schemeClr val="accent1">
+                <a:shade val="50000"/>
+              </a:schemeClr>
+            </a:lnRef>
+            <a:fillRef idx="1">
+              <a:schemeClr val="accent1"/>
+            </a:fillRef>
+            <a:effectRef idx="0">
+              <a:schemeClr val="accent1"/>
+            </a:effectRef>
+            <a:fontRef idx="minor">
+              <a:schemeClr val="lt1"/>
+            </a:fontRef>
+          </p:style>
+          <p:txBody>
+            <a:bodyPr rtlCol="0" anchor="ctr"/>
+            <a:lstStyle/>
+            <a:p>
+              <a:pPr algn="ctr"/>
+              <a:endParaRPr lang="en-US" sz="1225" dirty="0"/>
+            </a:p>
+          </p:txBody>
+        </p:sp>
+        <p:sp>
+          <p:nvSpPr>
+            <p:cNvPr id="12" name="TextBox 11">
+              <a:extLst>
+                <a:ext uri="{FF2B5EF4-FFF2-40B4-BE49-F238E27FC236}">
+                  <a16:creationId xmlns:a16="http://schemas.microsoft.com/office/drawing/2014/main" id="{329B3816-A639-4692-9BC7-1BAA8E40C57D}"/>
+                </a:ext>
+              </a:extLst>
+            </p:cNvPr>
+            <p:cNvSpPr txBox="1"/>
+            <p:nvPr/>
+          </p:nvSpPr>
+          <p:spPr>
+            <a:xfrm>
+              <a:off x="10972800" y="289501"/>
+              <a:ext cx="900953" cy="280846"/>
+            </a:xfrm>
+            <a:prstGeom prst="rect">
+              <a:avLst/>
+            </a:prstGeom>
+            <a:grpFill/>
+            <a:ln>
+              <a:noFill/>
+            </a:ln>
+          </p:spPr>
+          <p:txBody>
+            <a:bodyPr wrap="square" rtlCol="0">
+              <a:spAutoFit/>
+            </a:bodyPr>
+            <a:lstStyle/>
+            <a:p>
+              <a:endParaRPr lang="en-US" sz="1225" dirty="0">
+                <a:solidFill>
+                  <a:schemeClr val="bg1"/>
+                </a:solidFill>
+              </a:endParaRPr>
+            </a:p>
+          </p:txBody>
+        </p:sp>
+        <p:sp>
+          <p:nvSpPr>
+            <p:cNvPr id="14" name="TextBox 13">
+              <a:extLst>
+                <a:ext uri="{FF2B5EF4-FFF2-40B4-BE49-F238E27FC236}">
+                  <a16:creationId xmlns:a16="http://schemas.microsoft.com/office/drawing/2014/main" id="{D6424EF1-A4E5-4F24-BD9A-DB2F01928066}"/>
+                </a:ext>
+              </a:extLst>
+            </p:cNvPr>
+            <p:cNvSpPr txBox="1"/>
+            <p:nvPr/>
+          </p:nvSpPr>
+          <p:spPr>
+            <a:xfrm>
+              <a:off x="501407" y="315365"/>
+              <a:ext cx="8089074" cy="400110"/>
+            </a:xfrm>
+            <a:prstGeom prst="rect">
+              <a:avLst/>
+            </a:prstGeom>
+            <a:grpFill/>
+            <a:ln>
+              <a:noFill/>
+            </a:ln>
+          </p:spPr>
+          <p:txBody>
+            <a:bodyPr wrap="square" rtlCol="0">
+              <a:spAutoFit/>
+            </a:bodyPr>
+            <a:lstStyle/>
+            <a:p>
+              <a:r>
+                <a:rPr lang="en-US" sz="2000" dirty="0">
+                  <a:solidFill>
+                    <a:schemeClr val="bg1"/>
+                  </a:solidFill>
+                </a:rPr>
+                <a:t>MFA &gt; </a:t>
+              </a:r>
+              <a:r>
+                <a:rPr lang="en-US" sz="2000" dirty="0" err="1">
+                  <a:solidFill>
+                    <a:schemeClr val="bg1"/>
+                  </a:solidFill>
+                </a:rPr>
+                <a:t>MinionsJS</a:t>
+              </a:r>
+              <a:r>
+                <a:rPr lang="en-US" sz="2000" dirty="0">
+                  <a:solidFill>
+                    <a:schemeClr val="bg1"/>
+                  </a:solidFill>
+                </a:rPr>
+                <a:t> &gt; Hands-on</a:t>
+              </a:r>
+            </a:p>
+          </p:txBody>
+        </p:sp>
+      </p:grpSp>
+      <p:pic>
+        <p:nvPicPr>
+          <p:cNvPr id="7" name="Picture 6">
+            <a:extLst>
+              <a:ext uri="{FF2B5EF4-FFF2-40B4-BE49-F238E27FC236}">
+                <a16:creationId xmlns:a16="http://schemas.microsoft.com/office/drawing/2014/main" id="{16A31FFF-3A7B-41B6-B4DD-5F42A07A245D}"/>
+              </a:ext>
+            </a:extLst>
+          </p:cNvPr>
+          <p:cNvPicPr>
+            <a:picLocks noChangeAspect="1"/>
+          </p:cNvPicPr>
+          <p:nvPr/>
+        </p:nvPicPr>
+        <p:blipFill>
+          <a:blip r:embed="rId3">
+            <a:extLst>
+              <a:ext uri="{28A0092B-C50C-407E-A947-70E740481C1C}">
+                <a14:useLocalDpi xmlns:a14="http://schemas.microsoft.com/office/drawing/2010/main" val="0"/>
+              </a:ext>
+            </a:extLst>
+          </a:blip>
+          <a:stretch>
+            <a:fillRect/>
+          </a:stretch>
+        </p:blipFill>
+        <p:spPr>
+          <a:xfrm>
+            <a:off x="2072920" y="1340019"/>
+            <a:ext cx="8046161" cy="4578349"/>
+          </a:xfrm>
+          <a:prstGeom prst="rect">
+            <a:avLst/>
+          </a:prstGeom>
+        </p:spPr>
+      </p:pic>
+    </p:spTree>
+    <p:extLst>
+      <p:ext uri="{BB962C8B-B14F-4D97-AF65-F5344CB8AC3E}">
+        <p14:creationId xmlns:p14="http://schemas.microsoft.com/office/powerpoint/2010/main" val="1755341750"/>
+      </p:ext>
+    </p:extLst>
+  </p:cSld>
+  <p:clrMapOvr>
+    <a:masterClrMapping/>
+  </p:clrMapOvr>
+</p:sld>
+</file>
+
+<file path=ppt/slides/slide27.xml><?xml version="1.0" encoding="utf-8"?>
 <p:sld xmlns:a="http://schemas.openxmlformats.org/drawingml/2006/main" xmlns:r="http://schemas.openxmlformats.org/officeDocument/2006/relationships" xmlns:p="http://schemas.openxmlformats.org/presentationml/2006/main">
   <p:cSld>
     <p:spTree>
@@ -24960,7 +25846,7 @@
 </p:sld>
 </file>
 
-<file path=ppt/slides/slide26.xml><?xml version="1.0" encoding="utf-8"?>
+<file path=ppt/slides/slide28.xml><?xml version="1.0" encoding="utf-8"?>
 <p:sld xmlns:a="http://schemas.openxmlformats.org/drawingml/2006/main" xmlns:r="http://schemas.openxmlformats.org/officeDocument/2006/relationships" xmlns:p="http://schemas.openxmlformats.org/presentationml/2006/main">
   <p:cSld>
     <p:spTree>
@@ -25275,7 +26161,20 @@
               </a:rPr>
               <a:t>https://hackernoon.com/front-end-microservices-with-web-components-597759313393</a:t>
             </a:r>
+            <a:br>
+              <a:rPr lang="da-DK" sz="2100" dirty="0"/>
+            </a:br>
             <a:endParaRPr lang="da-DK" sz="2100" dirty="0"/>
+          </a:p>
+          <a:p>
+            <a:pPr marL="342900" indent="-342900">
+              <a:buFont typeface="Arial" panose="020B0604020202020204" pitchFamily="34" charset="0"/>
+              <a:buChar char="•"/>
+            </a:pPr>
+            <a:r>
+              <a:rPr lang="da-DK" sz="2100" dirty="0"/>
+              <a:t>https://github.com/dfds/micro-frontend-poc</a:t>
+            </a:r>
           </a:p>
         </p:txBody>
       </p:sp>
@@ -27986,18 +28885,18 @@
 </file>
 
 <file path=customXml/item1.xml><?xml version="1.0" encoding="utf-8"?>
+<p:properties xmlns:p="http://schemas.microsoft.com/office/2006/metadata/properties" xmlns:xsi="http://www.w3.org/2001/XMLSchema-instance" xmlns:pc="http://schemas.microsoft.com/office/infopath/2007/PartnerControls">
+  <documentManagement/>
+</p:properties>
+</file>
+
+<file path=customXml/item2.xml><?xml version="1.0" encoding="utf-8"?>
 <?mso-contentType ?>
 <FormTemplates xmlns="http://schemas.microsoft.com/sharepoint/v3/contenttype/forms">
   <Display>DocumentLibraryForm</Display>
   <Edit>DocumentLibraryForm</Edit>
   <New>DocumentLibraryForm</New>
 </FormTemplates>
-</file>
-
-<file path=customXml/item2.xml><?xml version="1.0" encoding="utf-8"?>
-<p:properties xmlns:p="http://schemas.microsoft.com/office/2006/metadata/properties" xmlns:xsi="http://www.w3.org/2001/XMLSchema-instance" xmlns:pc="http://schemas.microsoft.com/office/infopath/2007/PartnerControls">
-  <documentManagement/>
-</p:properties>
 </file>
 
 <file path=customXml/item3.xml><?xml version="1.0" encoding="utf-8"?>
@@ -28186,18 +29085,18 @@
 </file>
 
 <file path=customXml/itemProps1.xml><?xml version="1.0" encoding="utf-8"?>
-<ds:datastoreItem xmlns:ds="http://schemas.openxmlformats.org/officeDocument/2006/customXml" ds:itemID="{4273EE10-C1B2-449B-9085-39965BA21A56}">
+<ds:datastoreItem xmlns:ds="http://schemas.openxmlformats.org/officeDocument/2006/customXml" ds:itemID="{B61EE2CA-DCC7-45E5-87C8-6789A166AF77}">
   <ds:schemaRefs>
-    <ds:schemaRef ds:uri="http://schemas.microsoft.com/sharepoint/v3/contenttype/forms"/>
+    <ds:schemaRef ds:uri="http://schemas.microsoft.com/office/2006/metadata/properties"/>
+    <ds:schemaRef ds:uri="http://schemas.microsoft.com/office/infopath/2007/PartnerControls"/>
   </ds:schemaRefs>
 </ds:datastoreItem>
 </file>
 
 <file path=customXml/itemProps2.xml><?xml version="1.0" encoding="utf-8"?>
-<ds:datastoreItem xmlns:ds="http://schemas.openxmlformats.org/officeDocument/2006/customXml" ds:itemID="{B61EE2CA-DCC7-45E5-87C8-6789A166AF77}">
+<ds:datastoreItem xmlns:ds="http://schemas.openxmlformats.org/officeDocument/2006/customXml" ds:itemID="{4273EE10-C1B2-449B-9085-39965BA21A56}">
   <ds:schemaRefs>
-    <ds:schemaRef ds:uri="http://schemas.microsoft.com/office/2006/metadata/properties"/>
-    <ds:schemaRef ds:uri="http://schemas.microsoft.com/office/infopath/2007/PartnerControls"/>
+    <ds:schemaRef ds:uri="http://schemas.microsoft.com/sharepoint/v3/contenttype/forms"/>
   </ds:schemaRefs>
 </ds:datastoreItem>
 </file>

</xml_diff>

<commit_message>
=kata #1 for MFA deep-dive
</commit_message>
<xml_diff>
--- a/workshops/micro-frontend-architecture-deep-dive/micro_frontend_architecture_deep_dive.pptx
+++ b/workshops/micro-frontend-architecture-deep-dive/micro_frontend_architecture_deep_dive.pptx
@@ -2945,7 +2945,7 @@
           <a:p>
             <a:fld id="{F540F470-726F-426E-889A-8E92A4693460}" type="datetimeFigureOut">
               <a:rPr lang="en-GB" smtClean="0"/>
-              <a:t>25/09/2020</a:t>
+              <a:t>28/09/2020</a:t>
             </a:fld>
             <a:endParaRPr lang="en-GB" dirty="0"/>
           </a:p>
@@ -3115,7 +3115,7 @@
             <a:fld id="{CD72A38B-F9FA-4036-A084-652409E98F08}" type="datetimeFigureOut">
               <a:rPr lang="en-GB" smtClean="0"/>
               <a:pPr/>
-              <a:t>25/09/2020</a:t>
+              <a:t>28/09/2020</a:t>
             </a:fld>
             <a:endParaRPr lang="en-GB" dirty="0"/>
           </a:p>
@@ -4541,7 +4541,7 @@
           <a:p>
             <a:fld id="{CAE15A36-EF7C-49E1-9E28-DC0261021B88}" type="datetime4">
               <a:rPr lang="en-GB" smtClean="0"/>
-              <a:t>25 September 2020</a:t>
+              <a:t>28 September 2020</a:t>
             </a:fld>
             <a:endParaRPr lang="en-GB" dirty="0"/>
           </a:p>
@@ -5044,7 +5044,7 @@
           <a:p>
             <a:fld id="{73A80043-8D1A-4EE7-8835-0FA45918CF0B}" type="datetime4">
               <a:rPr lang="en-GB" smtClean="0"/>
-              <a:t>25 September 2020</a:t>
+              <a:t>28 September 2020</a:t>
             </a:fld>
             <a:endParaRPr lang="en-GB" dirty="0"/>
           </a:p>
@@ -13570,7 +13570,7 @@
           <a:p>
             <a:fld id="{61C39D88-A2D2-46EF-88AA-9A0C8DF2E827}" type="datetime4">
               <a:rPr lang="en-GB" smtClean="0"/>
-              <a:t>25 September 2020</a:t>
+              <a:t>28 September 2020</a:t>
             </a:fld>
             <a:endParaRPr lang="en-GB" dirty="0"/>
           </a:p>
@@ -14957,7 +14957,7 @@
           <a:p>
             <a:fld id="{E66F39FE-A71C-4EA9-B6A2-49D418A61827}" type="datetimeFigureOut">
               <a:rPr lang="en-US" smtClean="0"/>
-              <a:t>9/25/2020</a:t>
+              <a:t>9/28/2020</a:t>
             </a:fld>
             <a:endParaRPr lang="en-US"/>
           </a:p>
@@ -18738,7 +18738,7 @@
           <a:p>
             <a:fld id="{A98DB34D-784C-4D9C-ABD8-61F63F762187}" type="datetime4">
               <a:rPr lang="en-GB" smtClean="0"/>
-              <a:t>25 September 2020</a:t>
+              <a:t>28 September 2020</a:t>
             </a:fld>
             <a:endParaRPr lang="en-GB" dirty="0"/>
           </a:p>
@@ -28885,18 +28885,18 @@
 </file>
 
 <file path=customXml/item1.xml><?xml version="1.0" encoding="utf-8"?>
+<p:properties xmlns:p="http://schemas.microsoft.com/office/2006/metadata/properties" xmlns:xsi="http://www.w3.org/2001/XMLSchema-instance" xmlns:pc="http://schemas.microsoft.com/office/infopath/2007/PartnerControls">
+  <documentManagement/>
+</p:properties>
+</file>
+
+<file path=customXml/item2.xml><?xml version="1.0" encoding="utf-8"?>
 <?mso-contentType ?>
 <FormTemplates xmlns="http://schemas.microsoft.com/sharepoint/v3/contenttype/forms">
   <Display>DocumentLibraryForm</Display>
   <Edit>DocumentLibraryForm</Edit>
   <New>DocumentLibraryForm</New>
 </FormTemplates>
-</file>
-
-<file path=customXml/item2.xml><?xml version="1.0" encoding="utf-8"?>
-<p:properties xmlns:p="http://schemas.microsoft.com/office/2006/metadata/properties" xmlns:xsi="http://www.w3.org/2001/XMLSchema-instance" xmlns:pc="http://schemas.microsoft.com/office/infopath/2007/PartnerControls">
-  <documentManagement/>
-</p:properties>
 </file>
 
 <file path=customXml/item3.xml><?xml version="1.0" encoding="utf-8"?>
@@ -29085,18 +29085,18 @@
 </file>
 
 <file path=customXml/itemProps1.xml><?xml version="1.0" encoding="utf-8"?>
-<ds:datastoreItem xmlns:ds="http://schemas.openxmlformats.org/officeDocument/2006/customXml" ds:itemID="{4273EE10-C1B2-449B-9085-39965BA21A56}">
+<ds:datastoreItem xmlns:ds="http://schemas.openxmlformats.org/officeDocument/2006/customXml" ds:itemID="{B61EE2CA-DCC7-45E5-87C8-6789A166AF77}">
   <ds:schemaRefs>
-    <ds:schemaRef ds:uri="http://schemas.microsoft.com/sharepoint/v3/contenttype/forms"/>
+    <ds:schemaRef ds:uri="http://schemas.microsoft.com/office/2006/metadata/properties"/>
+    <ds:schemaRef ds:uri="http://schemas.microsoft.com/office/infopath/2007/PartnerControls"/>
   </ds:schemaRefs>
 </ds:datastoreItem>
 </file>
 
 <file path=customXml/itemProps2.xml><?xml version="1.0" encoding="utf-8"?>
-<ds:datastoreItem xmlns:ds="http://schemas.openxmlformats.org/officeDocument/2006/customXml" ds:itemID="{B61EE2CA-DCC7-45E5-87C8-6789A166AF77}">
+<ds:datastoreItem xmlns:ds="http://schemas.openxmlformats.org/officeDocument/2006/customXml" ds:itemID="{4273EE10-C1B2-449B-9085-39965BA21A56}">
   <ds:schemaRefs>
-    <ds:schemaRef ds:uri="http://schemas.microsoft.com/office/2006/metadata/properties"/>
-    <ds:schemaRef ds:uri="http://schemas.microsoft.com/office/infopath/2007/PartnerControls"/>
+    <ds:schemaRef ds:uri="http://schemas.microsoft.com/sharepoint/v3/contenttype/forms"/>
   </ds:schemaRefs>
 </ds:datastoreItem>
 </file>

</xml_diff>

<commit_message>
=updating slides to fit with new katas
</commit_message>
<xml_diff>
--- a/workshops/micro-frontend-architecture-deep-dive/micro_frontend_architecture_deep_dive.pptx
+++ b/workshops/micro-frontend-architecture-deep-dive/micro_frontend_architecture_deep_dive.pptx
@@ -23803,6 +23803,10 @@
             <a:endParaRPr lang="en-US" sz="2100" dirty="0"/>
           </a:p>
           <a:p>
+            <a:pPr marL="342900" indent="-342900">
+              <a:buFont typeface="Arial" panose="020B0604020202020204" pitchFamily="34" charset="0"/>
+              <a:buChar char="•"/>
+            </a:pPr>
             <a:r>
               <a:rPr lang="en-US" sz="2100" b="1" dirty="0"/>
               <a:t>Isolated DOM</a:t>
@@ -23817,6 +23821,10 @@
             <a:endParaRPr lang="en-US" sz="2100" dirty="0"/>
           </a:p>
           <a:p>
+            <a:pPr marL="342900" indent="-342900">
+              <a:buFont typeface="Arial" panose="020B0604020202020204" pitchFamily="34" charset="0"/>
+              <a:buChar char="•"/>
+            </a:pPr>
             <a:r>
               <a:rPr lang="en-US" sz="2100" b="1" dirty="0"/>
               <a:t>Scoped CSS</a:t>
@@ -23827,9 +23835,17 @@
             </a:r>
           </a:p>
           <a:p>
+            <a:pPr marL="342900" indent="-342900">
+              <a:buFont typeface="Arial" panose="020B0604020202020204" pitchFamily="34" charset="0"/>
+              <a:buChar char="•"/>
+            </a:pPr>
             <a:endParaRPr lang="en-US" sz="2100" dirty="0"/>
           </a:p>
           <a:p>
+            <a:pPr marL="342900" indent="-342900">
+              <a:buFont typeface="Arial" panose="020B0604020202020204" pitchFamily="34" charset="0"/>
+              <a:buChar char="•"/>
+            </a:pPr>
             <a:r>
               <a:rPr lang="en-US" sz="2100" b="1" dirty="0"/>
               <a:t>Composition</a:t>
@@ -23840,9 +23856,17 @@
             </a:r>
           </a:p>
           <a:p>
+            <a:pPr marL="342900" indent="-342900">
+              <a:buFont typeface="Arial" panose="020B0604020202020204" pitchFamily="34" charset="0"/>
+              <a:buChar char="•"/>
+            </a:pPr>
             <a:endParaRPr lang="en-US" sz="2100" dirty="0"/>
           </a:p>
           <a:p>
+            <a:pPr marL="342900" indent="-342900">
+              <a:buFont typeface="Arial" panose="020B0604020202020204" pitchFamily="34" charset="0"/>
+              <a:buChar char="•"/>
+            </a:pPr>
             <a:r>
               <a:rPr lang="en-US" sz="2100" b="1" dirty="0"/>
               <a:t>Simplifies CSS</a:t>
@@ -23853,9 +23877,17 @@
             </a:r>
           </a:p>
           <a:p>
+            <a:pPr marL="342900" indent="-342900">
+              <a:buFont typeface="Arial" panose="020B0604020202020204" pitchFamily="34" charset="0"/>
+              <a:buChar char="•"/>
+            </a:pPr>
             <a:endParaRPr lang="en-US" sz="2100" dirty="0"/>
           </a:p>
           <a:p>
+            <a:pPr marL="342900" indent="-342900">
+              <a:buFont typeface="Arial" panose="020B0604020202020204" pitchFamily="34" charset="0"/>
+              <a:buChar char="•"/>
+            </a:pPr>
             <a:r>
               <a:rPr lang="en-US" sz="2100" b="1" dirty="0"/>
               <a:t>Productivity</a:t>
@@ -24926,24 +24958,16 @@
             <a:br>
               <a:rPr lang="en-US" sz="2100" dirty="0"/>
             </a:br>
-            <a:endParaRPr lang="en-US" sz="2100" dirty="0"/>
-          </a:p>
-          <a:p>
-            <a:r>
-              <a:rPr lang="en-US" sz="2100" dirty="0" err="1"/>
+            <a:endParaRPr lang="en-US" sz="2100" b="1" dirty="0"/>
+          </a:p>
+          <a:p>
+            <a:r>
+              <a:rPr lang="en-US" sz="2100" b="1" i="1" dirty="0" err="1"/>
               <a:t>MinionsJS</a:t>
             </a:r>
             <a:r>
-              <a:rPr lang="en-US" sz="2100" dirty="0"/>
-              <a:t> achieve this through providing a “opinionated wrapper” around the lit-elements framework, a simple plugin API and a number of “extension points” to ensure compatibility with mainstream frameworks such as React, Angular and </a:t>
-            </a:r>
-            <a:r>
-              <a:rPr lang="en-US" sz="2100" dirty="0" err="1"/>
-              <a:t>VueJS</a:t>
-            </a:r>
-            <a:r>
-              <a:rPr lang="en-US" sz="2100" dirty="0"/>
-              <a:t>.</a:t>
+              <a:rPr lang="en-US" sz="2100" b="1" i="1" dirty="0"/>
+              <a:t> achieve its goals by providing an “opinionated wrapper” around the Google lit-elements framework and a simple plugin API.</a:t>
             </a:r>
           </a:p>
           <a:p>
@@ -25092,42 +25116,6 @@
           <a:xfrm>
             <a:off x="172497" y="-110435"/>
             <a:ext cx="914400" cy="1251712"/>
-          </a:xfrm>
-          <a:prstGeom prst="rect">
-            <a:avLst/>
-          </a:prstGeom>
-        </p:spPr>
-      </p:pic>
-      <p:pic>
-        <p:nvPicPr>
-          <p:cNvPr id="7" name="Picture 6">
-            <a:extLst>
-              <a:ext uri="{FF2B5EF4-FFF2-40B4-BE49-F238E27FC236}">
-                <a16:creationId xmlns:a16="http://schemas.microsoft.com/office/drawing/2014/main" id="{C71818C1-C601-47B1-836C-F036733B9814}"/>
-              </a:ext>
-            </a:extLst>
-          </p:cNvPr>
-          <p:cNvPicPr>
-            <a:picLocks noChangeAspect="1"/>
-          </p:cNvPicPr>
-          <p:nvPr/>
-        </p:nvPicPr>
-        <p:blipFill>
-          <a:blip r:embed="rId3">
-            <a:extLst>
-              <a:ext uri="{28A0092B-C50C-407E-A947-70E740481C1C}">
-                <a14:useLocalDpi xmlns:a14="http://schemas.microsoft.com/office/drawing/2010/main" val="0"/>
-              </a:ext>
-            </a:extLst>
-          </a:blip>
-          <a:stretch>
-            <a:fillRect/>
-          </a:stretch>
-        </p:blipFill>
-        <p:spPr>
-          <a:xfrm>
-            <a:off x="2491274" y="1263702"/>
-            <a:ext cx="7499751" cy="5330759"/>
           </a:xfrm>
           <a:prstGeom prst="rect">
             <a:avLst/>
@@ -25299,12 +25287,48 @@
                     <a:schemeClr val="bg1"/>
                   </a:solidFill>
                 </a:rPr>
-                <a:t> &gt; Hands-on</a:t>
+                <a:t> &gt; Lab</a:t>
               </a:r>
             </a:p>
           </p:txBody>
         </p:sp>
       </p:grpSp>
+      <p:pic>
+        <p:nvPicPr>
+          <p:cNvPr id="8" name="Picture 7">
+            <a:extLst>
+              <a:ext uri="{FF2B5EF4-FFF2-40B4-BE49-F238E27FC236}">
+                <a16:creationId xmlns:a16="http://schemas.microsoft.com/office/drawing/2014/main" id="{8DF66D6C-4FDB-4361-99A8-EE2075D45795}"/>
+              </a:ext>
+            </a:extLst>
+          </p:cNvPr>
+          <p:cNvPicPr>
+            <a:picLocks noChangeAspect="1"/>
+          </p:cNvPicPr>
+          <p:nvPr/>
+        </p:nvPicPr>
+        <p:blipFill>
+          <a:blip r:embed="rId3">
+            <a:extLst>
+              <a:ext uri="{28A0092B-C50C-407E-A947-70E740481C1C}">
+                <a14:useLocalDpi xmlns:a14="http://schemas.microsoft.com/office/drawing/2010/main" val="0"/>
+              </a:ext>
+            </a:extLst>
+          </a:blip>
+          <a:stretch>
+            <a:fillRect/>
+          </a:stretch>
+        </p:blipFill>
+        <p:spPr>
+          <a:xfrm>
+            <a:off x="2286000" y="1030842"/>
+            <a:ext cx="7620000" cy="5715000"/>
+          </a:xfrm>
+          <a:prstGeom prst="rect">
+            <a:avLst/>
+          </a:prstGeom>
+        </p:spPr>
+      </p:pic>
     </p:spTree>
     <p:extLst>
       <p:ext uri="{BB962C8B-B14F-4D97-AF65-F5344CB8AC3E}">
@@ -25535,58 +25559,460 @@
                     <a:schemeClr val="bg1"/>
                   </a:solidFill>
                 </a:rPr>
-                <a:t> &gt; Hands-on</a:t>
+                <a:t> &gt; Lab &gt; Assignment</a:t>
               </a:r>
             </a:p>
           </p:txBody>
         </p:sp>
       </p:grpSp>
-      <p:pic>
-        <p:nvPicPr>
-          <p:cNvPr id="7" name="Picture 6">
+      <p:sp>
+        <p:nvSpPr>
+          <p:cNvPr id="13" name="TextBox 12">
             <a:extLst>
               <a:ext uri="{FF2B5EF4-FFF2-40B4-BE49-F238E27FC236}">
-                <a16:creationId xmlns:a16="http://schemas.microsoft.com/office/drawing/2014/main" id="{16A31FFF-3A7B-41B6-B4DD-5F42A07A245D}"/>
+                <a16:creationId xmlns:a16="http://schemas.microsoft.com/office/drawing/2014/main" id="{73557DE6-81D8-499A-879C-F8A4E1CCCF2D}"/>
               </a:ext>
             </a:extLst>
           </p:cNvPr>
-          <p:cNvPicPr>
-            <a:picLocks noChangeAspect="1"/>
-          </p:cNvPicPr>
+          <p:cNvSpPr txBox="1"/>
           <p:nvPr/>
-        </p:nvPicPr>
-        <p:blipFill>
-          <a:blip r:embed="rId3">
-            <a:extLst>
-              <a:ext uri="{28A0092B-C50C-407E-A947-70E740481C1C}">
-                <a14:useLocalDpi xmlns:a14="http://schemas.microsoft.com/office/drawing/2010/main" val="0"/>
-              </a:ext>
-            </a:extLst>
-          </a:blip>
-          <a:stretch>
-            <a:fillRect/>
-          </a:stretch>
-        </p:blipFill>
+        </p:nvSpPr>
         <p:spPr>
           <a:xfrm>
-            <a:off x="2072920" y="1340019"/>
-            <a:ext cx="8046161" cy="4578349"/>
+            <a:off x="1288741" y="1669002"/>
+            <a:ext cx="9614518" cy="4216893"/>
           </a:xfrm>
           <a:prstGeom prst="rect">
             <a:avLst/>
           </a:prstGeom>
+          <a:noFill/>
         </p:spPr>
-      </p:pic>
+        <p:txBody>
+          <a:bodyPr wrap="square" lIns="0" tIns="0" rIns="0" bIns="0" rtlCol="0" anchor="t">
+            <a:noAutofit/>
+          </a:bodyPr>
+          <a:lstStyle/>
+          <a:p>
+            <a:pPr marL="342900" indent="-342900">
+              <a:buFont typeface="Arial" panose="020B0604020202020204" pitchFamily="34" charset="0"/>
+              <a:buChar char="•"/>
+            </a:pPr>
+            <a:r>
+              <a:rPr lang="en-US" sz="2100" dirty="0"/>
+              <a:t>Decide on </a:t>
+            </a:r>
+            <a:r>
+              <a:rPr lang="en-US" sz="2100" dirty="0" err="1"/>
+              <a:t>SimpleComponent</a:t>
+            </a:r>
+            <a:r>
+              <a:rPr lang="en-US" sz="2100" dirty="0"/>
+              <a:t> theme.</a:t>
+            </a:r>
+            <a:br>
+              <a:rPr lang="en-US" sz="2100" dirty="0"/>
+            </a:br>
+            <a:endParaRPr lang="en-US" sz="2100" dirty="0"/>
+          </a:p>
+          <a:p>
+            <a:pPr marL="342900" indent="-342900">
+              <a:buFont typeface="Arial" panose="020B0604020202020204" pitchFamily="34" charset="0"/>
+              <a:buChar char="•"/>
+            </a:pPr>
+            <a:r>
+              <a:rPr lang="en-US" sz="2100" dirty="0"/>
+              <a:t>Implement </a:t>
+            </a:r>
+            <a:r>
+              <a:rPr lang="en-US" sz="2100" dirty="0" err="1"/>
+              <a:t>SimpleComponent</a:t>
+            </a:r>
+            <a:r>
+              <a:rPr lang="en-US" sz="2100" dirty="0"/>
+              <a:t> using </a:t>
+            </a:r>
+            <a:r>
+              <a:rPr lang="en-US" sz="2100" dirty="0" err="1"/>
+              <a:t>MinionsJS</a:t>
+            </a:r>
+            <a:r>
+              <a:rPr lang="en-US" sz="2100" dirty="0"/>
+              <a:t>.</a:t>
+            </a:r>
+          </a:p>
+          <a:p>
+            <a:pPr marL="342900" indent="-342900">
+              <a:buFont typeface="Arial" panose="020B0604020202020204" pitchFamily="34" charset="0"/>
+              <a:buChar char="•"/>
+            </a:pPr>
+            <a:endParaRPr lang="en-US" sz="2100" dirty="0"/>
+          </a:p>
+          <a:p>
+            <a:pPr marL="342900" indent="-342900">
+              <a:buFont typeface="Arial" panose="020B0604020202020204" pitchFamily="34" charset="0"/>
+              <a:buChar char="•"/>
+            </a:pPr>
+            <a:r>
+              <a:rPr lang="en-US" sz="2100" dirty="0"/>
+              <a:t>Distributed </a:t>
+            </a:r>
+            <a:r>
+              <a:rPr lang="en-US" sz="2100" dirty="0" err="1"/>
+              <a:t>SimpleComponent</a:t>
+            </a:r>
+            <a:r>
+              <a:rPr lang="en-US" sz="2100" dirty="0"/>
+              <a:t> package via NPM.</a:t>
+            </a:r>
+          </a:p>
+          <a:p>
+            <a:pPr marL="342900" indent="-342900">
+              <a:buFont typeface="Arial" panose="020B0604020202020204" pitchFamily="34" charset="0"/>
+              <a:buChar char="•"/>
+            </a:pPr>
+            <a:endParaRPr lang="en-US" sz="2100" dirty="0"/>
+          </a:p>
+          <a:p>
+            <a:pPr marL="342900" indent="-342900">
+              <a:buFont typeface="Arial" panose="020B0604020202020204" pitchFamily="34" charset="0"/>
+              <a:buChar char="•"/>
+            </a:pPr>
+            <a:r>
+              <a:rPr lang="en-US" sz="2100" dirty="0"/>
+              <a:t>Create </a:t>
+            </a:r>
+            <a:r>
+              <a:rPr lang="en-US" sz="2100" dirty="0" err="1"/>
+              <a:t>SimpleContainerApplication</a:t>
+            </a:r>
+            <a:r>
+              <a:rPr lang="en-US" sz="2100" dirty="0"/>
+              <a:t> to consume </a:t>
+            </a:r>
+            <a:r>
+              <a:rPr lang="en-US" sz="2100" dirty="0" err="1"/>
+              <a:t>SimpleComponent</a:t>
+            </a:r>
+            <a:r>
+              <a:rPr lang="en-US" sz="2100" dirty="0"/>
+              <a:t>.</a:t>
+            </a:r>
+          </a:p>
+          <a:p>
+            <a:pPr marL="342900" indent="-342900">
+              <a:buFont typeface="Arial" panose="020B0604020202020204" pitchFamily="34" charset="0"/>
+              <a:buChar char="•"/>
+            </a:pPr>
+            <a:endParaRPr lang="en-US" sz="2100" dirty="0"/>
+          </a:p>
+          <a:p>
+            <a:pPr marL="342900" indent="-342900">
+              <a:buFont typeface="Arial" panose="020B0604020202020204" pitchFamily="34" charset="0"/>
+              <a:buChar char="•"/>
+            </a:pPr>
+            <a:r>
+              <a:rPr lang="en-US" sz="2100" dirty="0"/>
+              <a:t>Demo </a:t>
+            </a:r>
+            <a:r>
+              <a:rPr lang="en-US" sz="2100" dirty="0" err="1"/>
+              <a:t>SimpleContainerApplication</a:t>
+            </a:r>
+            <a:r>
+              <a:rPr lang="en-US" sz="2100" dirty="0"/>
+              <a:t>.</a:t>
+            </a:r>
+          </a:p>
+        </p:txBody>
+      </p:sp>
     </p:spTree>
     <p:extLst>
       <p:ext uri="{BB962C8B-B14F-4D97-AF65-F5344CB8AC3E}">
-        <p14:creationId xmlns:p14="http://schemas.microsoft.com/office/powerpoint/2010/main" val="1755341750"/>
+        <p14:creationId xmlns:p14="http://schemas.microsoft.com/office/powerpoint/2010/main" val="2485917623"/>
       </p:ext>
     </p:extLst>
   </p:cSld>
   <p:clrMapOvr>
     <a:masterClrMapping/>
   </p:clrMapOvr>
+  <p:timing>
+    <p:tnLst>
+      <p:par>
+        <p:cTn id="1" dur="indefinite" restart="never" nodeType="tmRoot">
+          <p:childTnLst>
+            <p:seq concurrent="1" nextAc="seek">
+              <p:cTn id="2" dur="indefinite" nodeType="mainSeq">
+                <p:childTnLst>
+                  <p:par>
+                    <p:cTn id="3" fill="hold">
+                      <p:stCondLst>
+                        <p:cond delay="indefinite"/>
+                        <p:cond evt="onBegin" delay="0">
+                          <p:tn val="2"/>
+                        </p:cond>
+                      </p:stCondLst>
+                      <p:childTnLst>
+                        <p:par>
+                          <p:cTn id="4" fill="hold">
+                            <p:stCondLst>
+                              <p:cond delay="0"/>
+                            </p:stCondLst>
+                            <p:childTnLst>
+                              <p:par>
+                                <p:cTn id="5" presetID="1" presetClass="entr" presetSubtype="0" fill="hold" nodeType="withEffect">
+                                  <p:stCondLst>
+                                    <p:cond delay="0"/>
+                                  </p:stCondLst>
+                                  <p:childTnLst>
+                                    <p:set>
+                                      <p:cBhvr>
+                                        <p:cTn id="6" dur="1" fill="hold">
+                                          <p:stCondLst>
+                                            <p:cond delay="0"/>
+                                          </p:stCondLst>
+                                        </p:cTn>
+                                        <p:tgtEl>
+                                          <p:spTgt spid="13">
+                                            <p:txEl>
+                                              <p:pRg st="0" end="0"/>
+                                            </p:txEl>
+                                          </p:spTgt>
+                                        </p:tgtEl>
+                                        <p:attrNameLst>
+                                          <p:attrName>style.visibility</p:attrName>
+                                        </p:attrNameLst>
+                                      </p:cBhvr>
+                                      <p:to>
+                                        <p:strVal val="visible"/>
+                                      </p:to>
+                                    </p:set>
+                                  </p:childTnLst>
+                                </p:cTn>
+                              </p:par>
+                            </p:childTnLst>
+                          </p:cTn>
+                        </p:par>
+                      </p:childTnLst>
+                    </p:cTn>
+                  </p:par>
+                  <p:par>
+                    <p:cTn id="7" fill="hold">
+                      <p:stCondLst>
+                        <p:cond delay="indefinite"/>
+                      </p:stCondLst>
+                      <p:childTnLst>
+                        <p:par>
+                          <p:cTn id="8" fill="hold">
+                            <p:stCondLst>
+                              <p:cond delay="0"/>
+                            </p:stCondLst>
+                            <p:childTnLst>
+                              <p:par>
+                                <p:cTn id="9" presetID="1" presetClass="entr" presetSubtype="0" fill="hold" nodeType="clickEffect">
+                                  <p:stCondLst>
+                                    <p:cond delay="0"/>
+                                  </p:stCondLst>
+                                  <p:childTnLst>
+                                    <p:set>
+                                      <p:cBhvr>
+                                        <p:cTn id="10" dur="1" fill="hold">
+                                          <p:stCondLst>
+                                            <p:cond delay="0"/>
+                                          </p:stCondLst>
+                                        </p:cTn>
+                                        <p:tgtEl>
+                                          <p:spTgt spid="13">
+                                            <p:txEl>
+                                              <p:pRg st="1" end="1"/>
+                                            </p:txEl>
+                                          </p:spTgt>
+                                        </p:tgtEl>
+                                        <p:attrNameLst>
+                                          <p:attrName>style.visibility</p:attrName>
+                                        </p:attrNameLst>
+                                      </p:cBhvr>
+                                      <p:to>
+                                        <p:strVal val="visible"/>
+                                      </p:to>
+                                    </p:set>
+                                  </p:childTnLst>
+                                </p:cTn>
+                              </p:par>
+                            </p:childTnLst>
+                          </p:cTn>
+                        </p:par>
+                      </p:childTnLst>
+                    </p:cTn>
+                  </p:par>
+                  <p:par>
+                    <p:cTn id="11" fill="hold">
+                      <p:stCondLst>
+                        <p:cond delay="indefinite"/>
+                      </p:stCondLst>
+                      <p:childTnLst>
+                        <p:par>
+                          <p:cTn id="12" fill="hold">
+                            <p:stCondLst>
+                              <p:cond delay="0"/>
+                            </p:stCondLst>
+                            <p:childTnLst>
+                              <p:par>
+                                <p:cTn id="13" presetID="1" presetClass="entr" presetSubtype="0" fill="hold" nodeType="clickEffect">
+                                  <p:stCondLst>
+                                    <p:cond delay="0"/>
+                                  </p:stCondLst>
+                                  <p:childTnLst>
+                                    <p:set>
+                                      <p:cBhvr>
+                                        <p:cTn id="14" dur="1" fill="hold">
+                                          <p:stCondLst>
+                                            <p:cond delay="0"/>
+                                          </p:stCondLst>
+                                        </p:cTn>
+                                        <p:tgtEl>
+                                          <p:spTgt spid="13">
+                                            <p:txEl>
+                                              <p:pRg st="3" end="3"/>
+                                            </p:txEl>
+                                          </p:spTgt>
+                                        </p:tgtEl>
+                                        <p:attrNameLst>
+                                          <p:attrName>style.visibility</p:attrName>
+                                        </p:attrNameLst>
+                                      </p:cBhvr>
+                                      <p:to>
+                                        <p:strVal val="visible"/>
+                                      </p:to>
+                                    </p:set>
+                                  </p:childTnLst>
+                                </p:cTn>
+                              </p:par>
+                            </p:childTnLst>
+                          </p:cTn>
+                        </p:par>
+                      </p:childTnLst>
+                    </p:cTn>
+                  </p:par>
+                  <p:par>
+                    <p:cTn id="15" fill="hold">
+                      <p:stCondLst>
+                        <p:cond delay="indefinite"/>
+                      </p:stCondLst>
+                      <p:childTnLst>
+                        <p:par>
+                          <p:cTn id="16" fill="hold">
+                            <p:stCondLst>
+                              <p:cond delay="0"/>
+                            </p:stCondLst>
+                            <p:childTnLst>
+                              <p:par>
+                                <p:cTn id="17" presetID="1" presetClass="entr" presetSubtype="0" fill="hold" nodeType="clickEffect">
+                                  <p:stCondLst>
+                                    <p:cond delay="0"/>
+                                  </p:stCondLst>
+                                  <p:childTnLst>
+                                    <p:set>
+                                      <p:cBhvr>
+                                        <p:cTn id="18" dur="1" fill="hold">
+                                          <p:stCondLst>
+                                            <p:cond delay="0"/>
+                                          </p:stCondLst>
+                                        </p:cTn>
+                                        <p:tgtEl>
+                                          <p:spTgt spid="13">
+                                            <p:txEl>
+                                              <p:pRg st="5" end="5"/>
+                                            </p:txEl>
+                                          </p:spTgt>
+                                        </p:tgtEl>
+                                        <p:attrNameLst>
+                                          <p:attrName>style.visibility</p:attrName>
+                                        </p:attrNameLst>
+                                      </p:cBhvr>
+                                      <p:to>
+                                        <p:strVal val="visible"/>
+                                      </p:to>
+                                    </p:set>
+                                  </p:childTnLst>
+                                </p:cTn>
+                              </p:par>
+                            </p:childTnLst>
+                          </p:cTn>
+                        </p:par>
+                      </p:childTnLst>
+                    </p:cTn>
+                  </p:par>
+                  <p:par>
+                    <p:cTn id="19" fill="hold">
+                      <p:stCondLst>
+                        <p:cond delay="indefinite"/>
+                      </p:stCondLst>
+                      <p:childTnLst>
+                        <p:par>
+                          <p:cTn id="20" fill="hold">
+                            <p:stCondLst>
+                              <p:cond delay="0"/>
+                            </p:stCondLst>
+                            <p:childTnLst>
+                              <p:par>
+                                <p:cTn id="21" presetID="1" presetClass="entr" presetSubtype="0" fill="hold" nodeType="clickEffect">
+                                  <p:stCondLst>
+                                    <p:cond delay="0"/>
+                                  </p:stCondLst>
+                                  <p:childTnLst>
+                                    <p:set>
+                                      <p:cBhvr>
+                                        <p:cTn id="22" dur="1" fill="hold">
+                                          <p:stCondLst>
+                                            <p:cond delay="0"/>
+                                          </p:stCondLst>
+                                        </p:cTn>
+                                        <p:tgtEl>
+                                          <p:spTgt spid="13">
+                                            <p:txEl>
+                                              <p:pRg st="7" end="7"/>
+                                            </p:txEl>
+                                          </p:spTgt>
+                                        </p:tgtEl>
+                                        <p:attrNameLst>
+                                          <p:attrName>style.visibility</p:attrName>
+                                        </p:attrNameLst>
+                                      </p:cBhvr>
+                                      <p:to>
+                                        <p:strVal val="visible"/>
+                                      </p:to>
+                                    </p:set>
+                                  </p:childTnLst>
+                                </p:cTn>
+                              </p:par>
+                            </p:childTnLst>
+                          </p:cTn>
+                        </p:par>
+                      </p:childTnLst>
+                    </p:cTn>
+                  </p:par>
+                </p:childTnLst>
+              </p:cTn>
+              <p:prevCondLst>
+                <p:cond evt="onPrev" delay="0">
+                  <p:tgtEl>
+                    <p:sldTgt/>
+                  </p:tgtEl>
+                </p:cond>
+              </p:prevCondLst>
+              <p:nextCondLst>
+                <p:cond evt="onNext" delay="0">
+                  <p:tgtEl>
+                    <p:sldTgt/>
+                  </p:tgtEl>
+                </p:cond>
+              </p:nextCondLst>
+            </p:seq>
+          </p:childTnLst>
+        </p:cTn>
+      </p:par>
+    </p:tnLst>
+  </p:timing>
 </p:sld>
 </file>
 
@@ -28885,18 +29311,18 @@
 </file>
 
 <file path=customXml/item1.xml><?xml version="1.0" encoding="utf-8"?>
-<p:properties xmlns:p="http://schemas.microsoft.com/office/2006/metadata/properties" xmlns:xsi="http://www.w3.org/2001/XMLSchema-instance" xmlns:pc="http://schemas.microsoft.com/office/infopath/2007/PartnerControls">
-  <documentManagement/>
-</p:properties>
-</file>
-
-<file path=customXml/item2.xml><?xml version="1.0" encoding="utf-8"?>
 <?mso-contentType ?>
 <FormTemplates xmlns="http://schemas.microsoft.com/sharepoint/v3/contenttype/forms">
   <Display>DocumentLibraryForm</Display>
   <Edit>DocumentLibraryForm</Edit>
   <New>DocumentLibraryForm</New>
 </FormTemplates>
+</file>
+
+<file path=customXml/item2.xml><?xml version="1.0" encoding="utf-8"?>
+<p:properties xmlns:p="http://schemas.microsoft.com/office/2006/metadata/properties" xmlns:xsi="http://www.w3.org/2001/XMLSchema-instance" xmlns:pc="http://schemas.microsoft.com/office/infopath/2007/PartnerControls">
+  <documentManagement/>
+</p:properties>
 </file>
 
 <file path=customXml/item3.xml><?xml version="1.0" encoding="utf-8"?>
@@ -29085,18 +29511,18 @@
 </file>
 
 <file path=customXml/itemProps1.xml><?xml version="1.0" encoding="utf-8"?>
-<ds:datastoreItem xmlns:ds="http://schemas.openxmlformats.org/officeDocument/2006/customXml" ds:itemID="{B61EE2CA-DCC7-45E5-87C8-6789A166AF77}">
+<ds:datastoreItem xmlns:ds="http://schemas.openxmlformats.org/officeDocument/2006/customXml" ds:itemID="{4273EE10-C1B2-449B-9085-39965BA21A56}">
   <ds:schemaRefs>
-    <ds:schemaRef ds:uri="http://schemas.microsoft.com/office/2006/metadata/properties"/>
-    <ds:schemaRef ds:uri="http://schemas.microsoft.com/office/infopath/2007/PartnerControls"/>
+    <ds:schemaRef ds:uri="http://schemas.microsoft.com/sharepoint/v3/contenttype/forms"/>
   </ds:schemaRefs>
 </ds:datastoreItem>
 </file>
 
 <file path=customXml/itemProps2.xml><?xml version="1.0" encoding="utf-8"?>
-<ds:datastoreItem xmlns:ds="http://schemas.openxmlformats.org/officeDocument/2006/customXml" ds:itemID="{4273EE10-C1B2-449B-9085-39965BA21A56}">
+<ds:datastoreItem xmlns:ds="http://schemas.openxmlformats.org/officeDocument/2006/customXml" ds:itemID="{B61EE2CA-DCC7-45E5-87C8-6789A166AF77}">
   <ds:schemaRefs>
-    <ds:schemaRef ds:uri="http://schemas.microsoft.com/sharepoint/v3/contenttype/forms"/>
+    <ds:schemaRef ds:uri="http://schemas.microsoft.com/office/2006/metadata/properties"/>
+    <ds:schemaRef ds:uri="http://schemas.microsoft.com/office/infopath/2007/PartnerControls"/>
   </ds:schemaRefs>
 </ds:datastoreItem>
 </file>

</xml_diff>

<commit_message>
=removing a few slides that arnt needed
</commit_message>
<xml_diff>
--- a/workshops/micro-frontend-architecture-deep-dive/micro_frontend_architecture_deep_dive.pptx
+++ b/workshops/micro-frontend-architecture-deep-dive/micro_frontend_architecture_deep_dive.pptx
@@ -5,10 +5,10 @@
     <p:sldMasterId id="2147483648" r:id="rId4"/>
   </p:sldMasterIdLst>
   <p:notesMasterIdLst>
-    <p:notesMasterId r:id="rId33"/>
+    <p:notesMasterId r:id="rId29"/>
   </p:notesMasterIdLst>
   <p:handoutMasterIdLst>
-    <p:handoutMasterId r:id="rId34"/>
+    <p:handoutMasterId r:id="rId30"/>
   </p:handoutMasterIdLst>
   <p:sldIdLst>
     <p:sldId id="372" r:id="rId5"/>
@@ -23,46 +23,42 @@
     <p:sldId id="452" r:id="rId14"/>
     <p:sldId id="462" r:id="rId15"/>
     <p:sldId id="463" r:id="rId16"/>
-    <p:sldId id="441" r:id="rId17"/>
-    <p:sldId id="442" r:id="rId18"/>
-    <p:sldId id="448" r:id="rId19"/>
-    <p:sldId id="443" r:id="rId20"/>
-    <p:sldId id="444" r:id="rId21"/>
-    <p:sldId id="445" r:id="rId22"/>
-    <p:sldId id="423" r:id="rId23"/>
-    <p:sldId id="416" r:id="rId24"/>
-    <p:sldId id="446" r:id="rId25"/>
-    <p:sldId id="439" r:id="rId26"/>
-    <p:sldId id="440" r:id="rId27"/>
-    <p:sldId id="438" r:id="rId28"/>
-    <p:sldId id="477" r:id="rId29"/>
-    <p:sldId id="478" r:id="rId30"/>
-    <p:sldId id="464" r:id="rId31"/>
-    <p:sldId id="476" r:id="rId32"/>
+    <p:sldId id="442" r:id="rId17"/>
+    <p:sldId id="448" r:id="rId18"/>
+    <p:sldId id="444" r:id="rId19"/>
+    <p:sldId id="445" r:id="rId20"/>
+    <p:sldId id="416" r:id="rId21"/>
+    <p:sldId id="446" r:id="rId22"/>
+    <p:sldId id="440" r:id="rId23"/>
+    <p:sldId id="438" r:id="rId24"/>
+    <p:sldId id="477" r:id="rId25"/>
+    <p:sldId id="478" r:id="rId26"/>
+    <p:sldId id="464" r:id="rId27"/>
+    <p:sldId id="476" r:id="rId28"/>
   </p:sldIdLst>
   <p:sldSz cx="12192000" cy="6858000"/>
   <p:notesSz cx="6858000" cy="9144000"/>
   <p:embeddedFontLst>
     <p:embeddedFont>
       <p:font typeface="Calibri" panose="020F0502020204030204" pitchFamily="34" charset="0"/>
+      <p:regular r:id="rId31"/>
+      <p:bold r:id="rId32"/>
+      <p:italic r:id="rId33"/>
+      <p:boldItalic r:id="rId34"/>
+    </p:embeddedFont>
+    <p:embeddedFont>
+      <p:font typeface="DFDS" panose="020B0604020202020204" charset="0"/>
       <p:regular r:id="rId35"/>
       <p:bold r:id="rId36"/>
       <p:italic r:id="rId37"/>
-      <p:boldItalic r:id="rId38"/>
-    </p:embeddedFont>
-    <p:embeddedFont>
-      <p:font typeface="DFDS" panose="020B0604020202020204" charset="0"/>
-      <p:regular r:id="rId39"/>
-      <p:bold r:id="rId40"/>
-      <p:italic r:id="rId41"/>
     </p:embeddedFont>
     <p:embeddedFont>
       <p:font typeface="DFDS Bold" panose="020B0604020202020204" charset="0"/>
-      <p:bold r:id="rId42"/>
+      <p:bold r:id="rId38"/>
     </p:embeddedFont>
     <p:embeddedFont>
       <p:font typeface="DFDS Light" panose="020B0604020202020204" charset="0"/>
-      <p:regular r:id="rId43"/>
+      <p:regular r:id="rId39"/>
     </p:embeddedFont>
   </p:embeddedFontLst>
   <p:defaultTextStyle>
@@ -2945,7 +2941,7 @@
           <a:p>
             <a:fld id="{F540F470-726F-426E-889A-8E92A4693460}" type="datetimeFigureOut">
               <a:rPr lang="en-GB" smtClean="0"/>
-              <a:t>28/09/2020</a:t>
+              <a:t>29/09/2020</a:t>
             </a:fld>
             <a:endParaRPr lang="en-GB" dirty="0"/>
           </a:p>
@@ -3115,7 +3111,7 @@
             <a:fld id="{CD72A38B-F9FA-4036-A084-652409E98F08}" type="datetimeFigureOut">
               <a:rPr lang="en-GB" smtClean="0"/>
               <a:pPr/>
-              <a:t>28/09/2020</a:t>
+              <a:t>29/09/2020</a:t>
             </a:fld>
             <a:endParaRPr lang="en-GB" dirty="0"/>
           </a:p>
@@ -4541,7 +4537,7 @@
           <a:p>
             <a:fld id="{CAE15A36-EF7C-49E1-9E28-DC0261021B88}" type="datetime4">
               <a:rPr lang="en-GB" smtClean="0"/>
-              <a:t>28 September 2020</a:t>
+              <a:t>29 September 2020</a:t>
             </a:fld>
             <a:endParaRPr lang="en-GB" dirty="0"/>
           </a:p>
@@ -5044,7 +5040,7 @@
           <a:p>
             <a:fld id="{73A80043-8D1A-4EE7-8835-0FA45918CF0B}" type="datetime4">
               <a:rPr lang="en-GB" smtClean="0"/>
-              <a:t>28 September 2020</a:t>
+              <a:t>29 September 2020</a:t>
             </a:fld>
             <a:endParaRPr lang="en-GB" dirty="0"/>
           </a:p>
@@ -13570,7 +13566,7 @@
           <a:p>
             <a:fld id="{61C39D88-A2D2-46EF-88AA-9A0C8DF2E827}" type="datetime4">
               <a:rPr lang="en-GB" smtClean="0"/>
-              <a:t>28 September 2020</a:t>
+              <a:t>29 September 2020</a:t>
             </a:fld>
             <a:endParaRPr lang="en-GB" dirty="0"/>
           </a:p>
@@ -14957,7 +14953,7 @@
           <a:p>
             <a:fld id="{E66F39FE-A71C-4EA9-B6A2-49D418A61827}" type="datetimeFigureOut">
               <a:rPr lang="en-US" smtClean="0"/>
-              <a:t>9/28/2020</a:t>
+              <a:t>9/29/2020</a:t>
             </a:fld>
             <a:endParaRPr lang="en-US"/>
           </a:p>
@@ -18738,7 +18734,7 @@
           <a:p>
             <a:fld id="{A98DB34D-784C-4D9C-ABD8-61F63F762187}" type="datetime4">
               <a:rPr lang="en-GB" smtClean="0"/>
-              <a:t>28 September 2020</a:t>
+              <a:t>29 September 2020</a:t>
             </a:fld>
             <a:endParaRPr lang="en-GB" dirty="0"/>
           </a:p>
@@ -20538,262 +20534,6 @@
           </a:prstGeom>
         </p:spPr>
       </p:pic>
-      <p:pic>
-        <p:nvPicPr>
-          <p:cNvPr id="7" name="Picture 6">
-            <a:extLst>
-              <a:ext uri="{FF2B5EF4-FFF2-40B4-BE49-F238E27FC236}">
-                <a16:creationId xmlns:a16="http://schemas.microsoft.com/office/drawing/2014/main" id="{C71818C1-C601-47B1-836C-F036733B9814}"/>
-              </a:ext>
-            </a:extLst>
-          </p:cNvPr>
-          <p:cNvPicPr>
-            <a:picLocks noChangeAspect="1"/>
-          </p:cNvPicPr>
-          <p:nvPr/>
-        </p:nvPicPr>
-        <p:blipFill>
-          <a:blip r:embed="rId3">
-            <a:extLst>
-              <a:ext uri="{28A0092B-C50C-407E-A947-70E740481C1C}">
-                <a14:useLocalDpi xmlns:a14="http://schemas.microsoft.com/office/drawing/2010/main" val="0"/>
-              </a:ext>
-            </a:extLst>
-          </a:blip>
-          <a:stretch>
-            <a:fillRect/>
-          </a:stretch>
-        </p:blipFill>
-        <p:spPr>
-          <a:xfrm>
-            <a:off x="2491274" y="1263702"/>
-            <a:ext cx="7499751" cy="5330759"/>
-          </a:xfrm>
-          <a:prstGeom prst="rect">
-            <a:avLst/>
-          </a:prstGeom>
-        </p:spPr>
-      </p:pic>
-      <p:grpSp>
-        <p:nvGrpSpPr>
-          <p:cNvPr id="10" name="Group 9">
-            <a:extLst>
-              <a:ext uri="{FF2B5EF4-FFF2-40B4-BE49-F238E27FC236}">
-                <a16:creationId xmlns:a16="http://schemas.microsoft.com/office/drawing/2014/main" id="{58A8AF2F-B974-4491-91CE-6F2028BFACCD}"/>
-              </a:ext>
-            </a:extLst>
-          </p:cNvPr>
-          <p:cNvGrpSpPr/>
-          <p:nvPr/>
-        </p:nvGrpSpPr>
-        <p:grpSpPr>
-          <a:xfrm>
-            <a:off x="2" y="2"/>
-            <a:ext cx="12191999" cy="948335"/>
-            <a:chOff x="0" y="0"/>
-            <a:chExt cx="12192000" cy="948335"/>
-          </a:xfrm>
-          <a:solidFill>
-            <a:schemeClr val="accent1"/>
-          </a:solidFill>
-        </p:grpSpPr>
-        <p:sp>
-          <p:nvSpPr>
-            <p:cNvPr id="11" name="Rectangle 10">
-              <a:extLst>
-                <a:ext uri="{FF2B5EF4-FFF2-40B4-BE49-F238E27FC236}">
-                  <a16:creationId xmlns:a16="http://schemas.microsoft.com/office/drawing/2014/main" id="{049BDDA0-374D-4DE8-9E4C-A21ED7C8652D}"/>
-                </a:ext>
-              </a:extLst>
-            </p:cNvPr>
-            <p:cNvSpPr/>
-            <p:nvPr/>
-          </p:nvSpPr>
-          <p:spPr>
-            <a:xfrm>
-              <a:off x="0" y="0"/>
-              <a:ext cx="12192000" cy="948335"/>
-            </a:xfrm>
-            <a:prstGeom prst="rect">
-              <a:avLst/>
-            </a:prstGeom>
-            <a:grpFill/>
-            <a:ln>
-              <a:noFill/>
-            </a:ln>
-          </p:spPr>
-          <p:style>
-            <a:lnRef idx="2">
-              <a:schemeClr val="accent1">
-                <a:shade val="50000"/>
-              </a:schemeClr>
-            </a:lnRef>
-            <a:fillRef idx="1">
-              <a:schemeClr val="accent1"/>
-            </a:fillRef>
-            <a:effectRef idx="0">
-              <a:schemeClr val="accent1"/>
-            </a:effectRef>
-            <a:fontRef idx="minor">
-              <a:schemeClr val="lt1"/>
-            </a:fontRef>
-          </p:style>
-          <p:txBody>
-            <a:bodyPr rtlCol="0" anchor="ctr"/>
-            <a:lstStyle/>
-            <a:p>
-              <a:pPr algn="ctr"/>
-              <a:endParaRPr lang="en-US" sz="1225" dirty="0"/>
-            </a:p>
-          </p:txBody>
-        </p:sp>
-        <p:sp>
-          <p:nvSpPr>
-            <p:cNvPr id="12" name="TextBox 11">
-              <a:extLst>
-                <a:ext uri="{FF2B5EF4-FFF2-40B4-BE49-F238E27FC236}">
-                  <a16:creationId xmlns:a16="http://schemas.microsoft.com/office/drawing/2014/main" id="{329B3816-A639-4692-9BC7-1BAA8E40C57D}"/>
-                </a:ext>
-              </a:extLst>
-            </p:cNvPr>
-            <p:cNvSpPr txBox="1"/>
-            <p:nvPr/>
-          </p:nvSpPr>
-          <p:spPr>
-            <a:xfrm>
-              <a:off x="10972800" y="289501"/>
-              <a:ext cx="900953" cy="280846"/>
-            </a:xfrm>
-            <a:prstGeom prst="rect">
-              <a:avLst/>
-            </a:prstGeom>
-            <a:grpFill/>
-            <a:ln>
-              <a:noFill/>
-            </a:ln>
-          </p:spPr>
-          <p:txBody>
-            <a:bodyPr wrap="square" rtlCol="0">
-              <a:spAutoFit/>
-            </a:bodyPr>
-            <a:lstStyle/>
-            <a:p>
-              <a:endParaRPr lang="en-US" sz="1225" dirty="0">
-                <a:solidFill>
-                  <a:schemeClr val="bg1"/>
-                </a:solidFill>
-              </a:endParaRPr>
-            </a:p>
-          </p:txBody>
-        </p:sp>
-        <p:sp>
-          <p:nvSpPr>
-            <p:cNvPr id="14" name="TextBox 13">
-              <a:extLst>
-                <a:ext uri="{FF2B5EF4-FFF2-40B4-BE49-F238E27FC236}">
-                  <a16:creationId xmlns:a16="http://schemas.microsoft.com/office/drawing/2014/main" id="{D6424EF1-A4E5-4F24-BD9A-DB2F01928066}"/>
-                </a:ext>
-              </a:extLst>
-            </p:cNvPr>
-            <p:cNvSpPr txBox="1"/>
-            <p:nvPr/>
-          </p:nvSpPr>
-          <p:spPr>
-            <a:xfrm>
-              <a:off x="501407" y="315365"/>
-              <a:ext cx="8089074" cy="400110"/>
-            </a:xfrm>
-            <a:prstGeom prst="rect">
-              <a:avLst/>
-            </a:prstGeom>
-            <a:grpFill/>
-            <a:ln>
-              <a:noFill/>
-            </a:ln>
-          </p:spPr>
-          <p:txBody>
-            <a:bodyPr wrap="square" rtlCol="0">
-              <a:spAutoFit/>
-            </a:bodyPr>
-            <a:lstStyle/>
-            <a:p>
-              <a:r>
-                <a:rPr lang="en-US" sz="2000" dirty="0">
-                  <a:solidFill>
-                    <a:schemeClr val="bg1"/>
-                  </a:solidFill>
-                </a:rPr>
-                <a:t>MFA &gt; Web Components &gt; Templates &gt; Hands-on</a:t>
-              </a:r>
-            </a:p>
-          </p:txBody>
-        </p:sp>
-      </p:grpSp>
-    </p:spTree>
-    <p:extLst>
-      <p:ext uri="{BB962C8B-B14F-4D97-AF65-F5344CB8AC3E}">
-        <p14:creationId xmlns:p14="http://schemas.microsoft.com/office/powerpoint/2010/main" val="2202450647"/>
-      </p:ext>
-    </p:extLst>
-  </p:cSld>
-  <p:clrMapOvr>
-    <a:masterClrMapping/>
-  </p:clrMapOvr>
-</p:sld>
-</file>
-
-<file path=ppt/slides/slide14.xml><?xml version="1.0" encoding="utf-8"?>
-<p:sld xmlns:a="http://schemas.openxmlformats.org/drawingml/2006/main" xmlns:r="http://schemas.openxmlformats.org/officeDocument/2006/relationships" xmlns:p="http://schemas.openxmlformats.org/presentationml/2006/main">
-  <p:cSld>
-    <p:spTree>
-      <p:nvGrpSpPr>
-        <p:cNvPr id="1" name=""/>
-        <p:cNvGrpSpPr/>
-        <p:nvPr/>
-      </p:nvGrpSpPr>
-      <p:grpSpPr>
-        <a:xfrm>
-          <a:off x="0" y="0"/>
-          <a:ext cx="0" cy="0"/>
-          <a:chOff x="0" y="0"/>
-          <a:chExt cx="0" cy="0"/>
-        </a:xfrm>
-      </p:grpSpPr>
-      <p:pic>
-        <p:nvPicPr>
-          <p:cNvPr id="9" name="Picture 8">
-            <a:extLst>
-              <a:ext uri="{FF2B5EF4-FFF2-40B4-BE49-F238E27FC236}">
-                <a16:creationId xmlns:a16="http://schemas.microsoft.com/office/drawing/2014/main" id="{47FF90BC-4EA9-4433-8469-620BF496C336}"/>
-              </a:ext>
-            </a:extLst>
-          </p:cNvPr>
-          <p:cNvPicPr>
-            <a:picLocks noChangeAspect="1"/>
-          </p:cNvPicPr>
-          <p:nvPr/>
-        </p:nvPicPr>
-        <p:blipFill rotWithShape="1">
-          <a:blip r:embed="rId2">
-            <a:extLst>
-              <a:ext uri="{28A0092B-C50C-407E-A947-70E740481C1C}">
-                <a14:useLocalDpi xmlns:a14="http://schemas.microsoft.com/office/drawing/2010/main" val="0"/>
-              </a:ext>
-            </a:extLst>
-          </a:blip>
-          <a:srcRect r="62500"/>
-          <a:stretch/>
-        </p:blipFill>
-        <p:spPr>
-          <a:xfrm>
-            <a:off x="172497" y="-110435"/>
-            <a:ext cx="914400" cy="1251712"/>
-          </a:xfrm>
-          <a:prstGeom prst="rect">
-            <a:avLst/>
-          </a:prstGeom>
-        </p:spPr>
-      </p:pic>
       <p:grpSp>
         <p:nvGrpSpPr>
           <p:cNvPr id="10" name="Group 9">
@@ -20998,7 +20738,7 @@
 </p:sld>
 </file>
 
-<file path=ppt/slides/slide15.xml><?xml version="1.0" encoding="utf-8"?>
+<file path=ppt/slides/slide14.xml><?xml version="1.0" encoding="utf-8"?>
 <p:sld xmlns:a="http://schemas.openxmlformats.org/drawingml/2006/main" xmlns:r="http://schemas.openxmlformats.org/officeDocument/2006/relationships" xmlns:p="http://schemas.openxmlformats.org/presentationml/2006/main">
   <p:cSld>
     <p:spTree>
@@ -21595,263 +21335,7 @@
 </p:sld>
 </file>
 
-<file path=ppt/slides/slide16.xml><?xml version="1.0" encoding="utf-8"?>
-<p:sld xmlns:a="http://schemas.openxmlformats.org/drawingml/2006/main" xmlns:r="http://schemas.openxmlformats.org/officeDocument/2006/relationships" xmlns:p="http://schemas.openxmlformats.org/presentationml/2006/main">
-  <p:cSld>
-    <p:spTree>
-      <p:nvGrpSpPr>
-        <p:cNvPr id="1" name=""/>
-        <p:cNvGrpSpPr/>
-        <p:nvPr/>
-      </p:nvGrpSpPr>
-      <p:grpSpPr>
-        <a:xfrm>
-          <a:off x="0" y="0"/>
-          <a:ext cx="0" cy="0"/>
-          <a:chOff x="0" y="0"/>
-          <a:chExt cx="0" cy="0"/>
-        </a:xfrm>
-      </p:grpSpPr>
-      <p:pic>
-        <p:nvPicPr>
-          <p:cNvPr id="9" name="Picture 8">
-            <a:extLst>
-              <a:ext uri="{FF2B5EF4-FFF2-40B4-BE49-F238E27FC236}">
-                <a16:creationId xmlns:a16="http://schemas.microsoft.com/office/drawing/2014/main" id="{47FF90BC-4EA9-4433-8469-620BF496C336}"/>
-              </a:ext>
-            </a:extLst>
-          </p:cNvPr>
-          <p:cNvPicPr>
-            <a:picLocks noChangeAspect="1"/>
-          </p:cNvPicPr>
-          <p:nvPr/>
-        </p:nvPicPr>
-        <p:blipFill rotWithShape="1">
-          <a:blip r:embed="rId2">
-            <a:extLst>
-              <a:ext uri="{28A0092B-C50C-407E-A947-70E740481C1C}">
-                <a14:useLocalDpi xmlns:a14="http://schemas.microsoft.com/office/drawing/2010/main" val="0"/>
-              </a:ext>
-            </a:extLst>
-          </a:blip>
-          <a:srcRect r="62500"/>
-          <a:stretch/>
-        </p:blipFill>
-        <p:spPr>
-          <a:xfrm>
-            <a:off x="172497" y="-110435"/>
-            <a:ext cx="914400" cy="1251712"/>
-          </a:xfrm>
-          <a:prstGeom prst="rect">
-            <a:avLst/>
-          </a:prstGeom>
-        </p:spPr>
-      </p:pic>
-      <p:pic>
-        <p:nvPicPr>
-          <p:cNvPr id="7" name="Picture 6">
-            <a:extLst>
-              <a:ext uri="{FF2B5EF4-FFF2-40B4-BE49-F238E27FC236}">
-                <a16:creationId xmlns:a16="http://schemas.microsoft.com/office/drawing/2014/main" id="{C71818C1-C601-47B1-836C-F036733B9814}"/>
-              </a:ext>
-            </a:extLst>
-          </p:cNvPr>
-          <p:cNvPicPr>
-            <a:picLocks noChangeAspect="1"/>
-          </p:cNvPicPr>
-          <p:nvPr/>
-        </p:nvPicPr>
-        <p:blipFill>
-          <a:blip r:embed="rId3">
-            <a:extLst>
-              <a:ext uri="{28A0092B-C50C-407E-A947-70E740481C1C}">
-                <a14:useLocalDpi xmlns:a14="http://schemas.microsoft.com/office/drawing/2010/main" val="0"/>
-              </a:ext>
-            </a:extLst>
-          </a:blip>
-          <a:stretch>
-            <a:fillRect/>
-          </a:stretch>
-        </p:blipFill>
-        <p:spPr>
-          <a:xfrm>
-            <a:off x="2491274" y="1263702"/>
-            <a:ext cx="7499751" cy="5330759"/>
-          </a:xfrm>
-          <a:prstGeom prst="rect">
-            <a:avLst/>
-          </a:prstGeom>
-        </p:spPr>
-      </p:pic>
-      <p:grpSp>
-        <p:nvGrpSpPr>
-          <p:cNvPr id="10" name="Group 9">
-            <a:extLst>
-              <a:ext uri="{FF2B5EF4-FFF2-40B4-BE49-F238E27FC236}">
-                <a16:creationId xmlns:a16="http://schemas.microsoft.com/office/drawing/2014/main" id="{58A8AF2F-B974-4491-91CE-6F2028BFACCD}"/>
-              </a:ext>
-            </a:extLst>
-          </p:cNvPr>
-          <p:cNvGrpSpPr/>
-          <p:nvPr/>
-        </p:nvGrpSpPr>
-        <p:grpSpPr>
-          <a:xfrm>
-            <a:off x="2" y="2"/>
-            <a:ext cx="12191999" cy="948335"/>
-            <a:chOff x="0" y="0"/>
-            <a:chExt cx="12192000" cy="948335"/>
-          </a:xfrm>
-          <a:solidFill>
-            <a:schemeClr val="accent1"/>
-          </a:solidFill>
-        </p:grpSpPr>
-        <p:sp>
-          <p:nvSpPr>
-            <p:cNvPr id="11" name="Rectangle 10">
-              <a:extLst>
-                <a:ext uri="{FF2B5EF4-FFF2-40B4-BE49-F238E27FC236}">
-                  <a16:creationId xmlns:a16="http://schemas.microsoft.com/office/drawing/2014/main" id="{049BDDA0-374D-4DE8-9E4C-A21ED7C8652D}"/>
-                </a:ext>
-              </a:extLst>
-            </p:cNvPr>
-            <p:cNvSpPr/>
-            <p:nvPr/>
-          </p:nvSpPr>
-          <p:spPr>
-            <a:xfrm>
-              <a:off x="0" y="0"/>
-              <a:ext cx="12192000" cy="948335"/>
-            </a:xfrm>
-            <a:prstGeom prst="rect">
-              <a:avLst/>
-            </a:prstGeom>
-            <a:grpFill/>
-            <a:ln>
-              <a:noFill/>
-            </a:ln>
-          </p:spPr>
-          <p:style>
-            <a:lnRef idx="2">
-              <a:schemeClr val="accent1">
-                <a:shade val="50000"/>
-              </a:schemeClr>
-            </a:lnRef>
-            <a:fillRef idx="1">
-              <a:schemeClr val="accent1"/>
-            </a:fillRef>
-            <a:effectRef idx="0">
-              <a:schemeClr val="accent1"/>
-            </a:effectRef>
-            <a:fontRef idx="minor">
-              <a:schemeClr val="lt1"/>
-            </a:fontRef>
-          </p:style>
-          <p:txBody>
-            <a:bodyPr rtlCol="0" anchor="ctr"/>
-            <a:lstStyle/>
-            <a:p>
-              <a:pPr algn="ctr"/>
-              <a:endParaRPr lang="en-US" sz="1225" dirty="0"/>
-            </a:p>
-          </p:txBody>
-        </p:sp>
-        <p:sp>
-          <p:nvSpPr>
-            <p:cNvPr id="12" name="TextBox 11">
-              <a:extLst>
-                <a:ext uri="{FF2B5EF4-FFF2-40B4-BE49-F238E27FC236}">
-                  <a16:creationId xmlns:a16="http://schemas.microsoft.com/office/drawing/2014/main" id="{329B3816-A639-4692-9BC7-1BAA8E40C57D}"/>
-                </a:ext>
-              </a:extLst>
-            </p:cNvPr>
-            <p:cNvSpPr txBox="1"/>
-            <p:nvPr/>
-          </p:nvSpPr>
-          <p:spPr>
-            <a:xfrm>
-              <a:off x="10972800" y="289501"/>
-              <a:ext cx="900953" cy="280846"/>
-            </a:xfrm>
-            <a:prstGeom prst="rect">
-              <a:avLst/>
-            </a:prstGeom>
-            <a:grpFill/>
-            <a:ln>
-              <a:noFill/>
-            </a:ln>
-          </p:spPr>
-          <p:txBody>
-            <a:bodyPr wrap="square" rtlCol="0">
-              <a:spAutoFit/>
-            </a:bodyPr>
-            <a:lstStyle/>
-            <a:p>
-              <a:endParaRPr lang="en-US" sz="1225" dirty="0">
-                <a:solidFill>
-                  <a:schemeClr val="bg1"/>
-                </a:solidFill>
-              </a:endParaRPr>
-            </a:p>
-          </p:txBody>
-        </p:sp>
-        <p:sp>
-          <p:nvSpPr>
-            <p:cNvPr id="14" name="TextBox 13">
-              <a:extLst>
-                <a:ext uri="{FF2B5EF4-FFF2-40B4-BE49-F238E27FC236}">
-                  <a16:creationId xmlns:a16="http://schemas.microsoft.com/office/drawing/2014/main" id="{D6424EF1-A4E5-4F24-BD9A-DB2F01928066}"/>
-                </a:ext>
-              </a:extLst>
-            </p:cNvPr>
-            <p:cNvSpPr txBox="1"/>
-            <p:nvPr/>
-          </p:nvSpPr>
-          <p:spPr>
-            <a:xfrm>
-              <a:off x="501407" y="315365"/>
-              <a:ext cx="8089074" cy="400110"/>
-            </a:xfrm>
-            <a:prstGeom prst="rect">
-              <a:avLst/>
-            </a:prstGeom>
-            <a:grpFill/>
-            <a:ln>
-              <a:noFill/>
-            </a:ln>
-          </p:spPr>
-          <p:txBody>
-            <a:bodyPr wrap="square" rtlCol="0">
-              <a:spAutoFit/>
-            </a:bodyPr>
-            <a:lstStyle/>
-            <a:p>
-              <a:r>
-                <a:rPr lang="en-US" sz="2000" dirty="0">
-                  <a:solidFill>
-                    <a:schemeClr val="bg1"/>
-                  </a:solidFill>
-                </a:rPr>
-                <a:t>MFA &gt; Web Components &gt; Imports &gt; Hands-on</a:t>
-              </a:r>
-            </a:p>
-          </p:txBody>
-        </p:sp>
-      </p:grpSp>
-    </p:spTree>
-    <p:extLst>
-      <p:ext uri="{BB962C8B-B14F-4D97-AF65-F5344CB8AC3E}">
-        <p14:creationId xmlns:p14="http://schemas.microsoft.com/office/powerpoint/2010/main" val="4140449073"/>
-      </p:ext>
-    </p:extLst>
-  </p:cSld>
-  <p:clrMapOvr>
-    <a:masterClrMapping/>
-  </p:clrMapOvr>
-</p:sld>
-</file>
-
-<file path=ppt/slides/slide17.xml><?xml version="1.0" encoding="utf-8"?>
+<file path=ppt/slides/slide15.xml><?xml version="1.0" encoding="utf-8"?>
 <p:sld xmlns:a="http://schemas.openxmlformats.org/drawingml/2006/main" xmlns:r="http://schemas.openxmlformats.org/officeDocument/2006/relationships" xmlns:p="http://schemas.openxmlformats.org/presentationml/2006/main">
   <p:cSld>
     <p:spTree>
@@ -22107,7 +21591,7 @@
 </p:sld>
 </file>
 
-<file path=ppt/slides/slide18.xml><?xml version="1.0" encoding="utf-8"?>
+<file path=ppt/slides/slide16.xml><?xml version="1.0" encoding="utf-8"?>
 <p:sld xmlns:a="http://schemas.openxmlformats.org/drawingml/2006/main" xmlns:r="http://schemas.openxmlformats.org/officeDocument/2006/relationships" xmlns:p="http://schemas.openxmlformats.org/presentationml/2006/main">
   <p:cSld>
     <p:spTree>
@@ -22614,7 +22098,7 @@
 </p:sld>
 </file>
 
-<file path=ppt/slides/slide19.xml><?xml version="1.0" encoding="utf-8"?>
+<file path=ppt/slides/slide17.xml><?xml version="1.0" encoding="utf-8"?>
 <p:sld xmlns:a="http://schemas.openxmlformats.org/drawingml/2006/main" xmlns:r="http://schemas.openxmlformats.org/officeDocument/2006/relationships" xmlns:p="http://schemas.openxmlformats.org/presentationml/2006/main">
   <p:cSld>
     <p:spTree>
@@ -22660,42 +22144,6 @@
           <a:xfrm>
             <a:off x="172497" y="-110435"/>
             <a:ext cx="914400" cy="1251712"/>
-          </a:xfrm>
-          <a:prstGeom prst="rect">
-            <a:avLst/>
-          </a:prstGeom>
-        </p:spPr>
-      </p:pic>
-      <p:pic>
-        <p:nvPicPr>
-          <p:cNvPr id="7" name="Picture 6">
-            <a:extLst>
-              <a:ext uri="{FF2B5EF4-FFF2-40B4-BE49-F238E27FC236}">
-                <a16:creationId xmlns:a16="http://schemas.microsoft.com/office/drawing/2014/main" id="{C71818C1-C601-47B1-836C-F036733B9814}"/>
-              </a:ext>
-            </a:extLst>
-          </p:cNvPr>
-          <p:cNvPicPr>
-            <a:picLocks noChangeAspect="1"/>
-          </p:cNvPicPr>
-          <p:nvPr/>
-        </p:nvPicPr>
-        <p:blipFill>
-          <a:blip r:embed="rId3">
-            <a:extLst>
-              <a:ext uri="{28A0092B-C50C-407E-A947-70E740481C1C}">
-                <a14:useLocalDpi xmlns:a14="http://schemas.microsoft.com/office/drawing/2010/main" val="0"/>
-              </a:ext>
-            </a:extLst>
-          </a:blip>
-          <a:stretch>
-            <a:fillRect/>
-          </a:stretch>
-        </p:blipFill>
-        <p:spPr>
-          <a:xfrm>
-            <a:off x="2491274" y="1263702"/>
-            <a:ext cx="7499751" cy="5330759"/>
           </a:xfrm>
           <a:prstGeom prst="rect">
             <a:avLst/>
@@ -22857,10 +22305,936 @@
           </p:txBody>
         </p:sp>
       </p:grpSp>
+      <p:pic>
+        <p:nvPicPr>
+          <p:cNvPr id="7" name="Picture 6">
+            <a:extLst>
+              <a:ext uri="{FF2B5EF4-FFF2-40B4-BE49-F238E27FC236}">
+                <a16:creationId xmlns:a16="http://schemas.microsoft.com/office/drawing/2014/main" id="{16A31FFF-3A7B-41B6-B4DD-5F42A07A245D}"/>
+              </a:ext>
+            </a:extLst>
+          </p:cNvPr>
+          <p:cNvPicPr>
+            <a:picLocks noChangeAspect="1"/>
+          </p:cNvPicPr>
+          <p:nvPr/>
+        </p:nvPicPr>
+        <p:blipFill>
+          <a:blip r:embed="rId3">
+            <a:extLst>
+              <a:ext uri="{28A0092B-C50C-407E-A947-70E740481C1C}">
+                <a14:useLocalDpi xmlns:a14="http://schemas.microsoft.com/office/drawing/2010/main" val="0"/>
+              </a:ext>
+            </a:extLst>
+          </a:blip>
+          <a:stretch>
+            <a:fillRect/>
+          </a:stretch>
+        </p:blipFill>
+        <p:spPr>
+          <a:xfrm>
+            <a:off x="2072920" y="1340019"/>
+            <a:ext cx="8046161" cy="4578349"/>
+          </a:xfrm>
+          <a:prstGeom prst="rect">
+            <a:avLst/>
+          </a:prstGeom>
+        </p:spPr>
+      </p:pic>
     </p:spTree>
     <p:extLst>
       <p:ext uri="{BB962C8B-B14F-4D97-AF65-F5344CB8AC3E}">
-        <p14:creationId xmlns:p14="http://schemas.microsoft.com/office/powerpoint/2010/main" val="1313766760"/>
+        <p14:creationId xmlns:p14="http://schemas.microsoft.com/office/powerpoint/2010/main" val="1277162952"/>
+      </p:ext>
+    </p:extLst>
+  </p:cSld>
+  <p:clrMapOvr>
+    <a:masterClrMapping/>
+  </p:clrMapOvr>
+</p:sld>
+</file>
+
+<file path=ppt/slides/slide18.xml><?xml version="1.0" encoding="utf-8"?>
+<p:sld xmlns:a="http://schemas.openxmlformats.org/drawingml/2006/main" xmlns:r="http://schemas.openxmlformats.org/officeDocument/2006/relationships" xmlns:p="http://schemas.openxmlformats.org/presentationml/2006/main">
+  <p:cSld>
+    <p:spTree>
+      <p:nvGrpSpPr>
+        <p:cNvPr id="1" name=""/>
+        <p:cNvGrpSpPr/>
+        <p:nvPr/>
+      </p:nvGrpSpPr>
+      <p:grpSpPr>
+        <a:xfrm>
+          <a:off x="0" y="0"/>
+          <a:ext cx="0" cy="0"/>
+          <a:chOff x="0" y="0"/>
+          <a:chExt cx="0" cy="0"/>
+        </a:xfrm>
+      </p:grpSpPr>
+      <p:pic>
+        <p:nvPicPr>
+          <p:cNvPr id="9" name="Picture 8">
+            <a:extLst>
+              <a:ext uri="{FF2B5EF4-FFF2-40B4-BE49-F238E27FC236}">
+                <a16:creationId xmlns:a16="http://schemas.microsoft.com/office/drawing/2014/main" id="{47FF90BC-4EA9-4433-8469-620BF496C336}"/>
+              </a:ext>
+            </a:extLst>
+          </p:cNvPr>
+          <p:cNvPicPr>
+            <a:picLocks noChangeAspect="1"/>
+          </p:cNvPicPr>
+          <p:nvPr/>
+        </p:nvPicPr>
+        <p:blipFill rotWithShape="1">
+          <a:blip r:embed="rId2">
+            <a:extLst>
+              <a:ext uri="{28A0092B-C50C-407E-A947-70E740481C1C}">
+                <a14:useLocalDpi xmlns:a14="http://schemas.microsoft.com/office/drawing/2010/main" val="0"/>
+              </a:ext>
+            </a:extLst>
+          </a:blip>
+          <a:srcRect r="62500"/>
+          <a:stretch/>
+        </p:blipFill>
+        <p:spPr>
+          <a:xfrm>
+            <a:off x="172497" y="-110435"/>
+            <a:ext cx="914400" cy="1251712"/>
+          </a:xfrm>
+          <a:prstGeom prst="rect">
+            <a:avLst/>
+          </a:prstGeom>
+        </p:spPr>
+      </p:pic>
+      <p:grpSp>
+        <p:nvGrpSpPr>
+          <p:cNvPr id="10" name="Group 9">
+            <a:extLst>
+              <a:ext uri="{FF2B5EF4-FFF2-40B4-BE49-F238E27FC236}">
+                <a16:creationId xmlns:a16="http://schemas.microsoft.com/office/drawing/2014/main" id="{58A8AF2F-B974-4491-91CE-6F2028BFACCD}"/>
+              </a:ext>
+            </a:extLst>
+          </p:cNvPr>
+          <p:cNvGrpSpPr/>
+          <p:nvPr/>
+        </p:nvGrpSpPr>
+        <p:grpSpPr>
+          <a:xfrm>
+            <a:off x="2" y="2"/>
+            <a:ext cx="12191999" cy="948335"/>
+            <a:chOff x="0" y="0"/>
+            <a:chExt cx="12192000" cy="948335"/>
+          </a:xfrm>
+          <a:solidFill>
+            <a:schemeClr val="accent1"/>
+          </a:solidFill>
+        </p:grpSpPr>
+        <p:sp>
+          <p:nvSpPr>
+            <p:cNvPr id="11" name="Rectangle 10">
+              <a:extLst>
+                <a:ext uri="{FF2B5EF4-FFF2-40B4-BE49-F238E27FC236}">
+                  <a16:creationId xmlns:a16="http://schemas.microsoft.com/office/drawing/2014/main" id="{049BDDA0-374D-4DE8-9E4C-A21ED7C8652D}"/>
+                </a:ext>
+              </a:extLst>
+            </p:cNvPr>
+            <p:cNvSpPr/>
+            <p:nvPr/>
+          </p:nvSpPr>
+          <p:spPr>
+            <a:xfrm>
+              <a:off x="0" y="0"/>
+              <a:ext cx="12192000" cy="948335"/>
+            </a:xfrm>
+            <a:prstGeom prst="rect">
+              <a:avLst/>
+            </a:prstGeom>
+            <a:grpFill/>
+            <a:ln>
+              <a:noFill/>
+            </a:ln>
+          </p:spPr>
+          <p:style>
+            <a:lnRef idx="2">
+              <a:schemeClr val="accent1">
+                <a:shade val="50000"/>
+              </a:schemeClr>
+            </a:lnRef>
+            <a:fillRef idx="1">
+              <a:schemeClr val="accent1"/>
+            </a:fillRef>
+            <a:effectRef idx="0">
+              <a:schemeClr val="accent1"/>
+            </a:effectRef>
+            <a:fontRef idx="minor">
+              <a:schemeClr val="lt1"/>
+            </a:fontRef>
+          </p:style>
+          <p:txBody>
+            <a:bodyPr rtlCol="0" anchor="ctr"/>
+            <a:lstStyle/>
+            <a:p>
+              <a:pPr algn="ctr"/>
+              <a:endParaRPr lang="en-US" sz="1225" dirty="0"/>
+            </a:p>
+          </p:txBody>
+        </p:sp>
+        <p:sp>
+          <p:nvSpPr>
+            <p:cNvPr id="12" name="TextBox 11">
+              <a:extLst>
+                <a:ext uri="{FF2B5EF4-FFF2-40B4-BE49-F238E27FC236}">
+                  <a16:creationId xmlns:a16="http://schemas.microsoft.com/office/drawing/2014/main" id="{329B3816-A639-4692-9BC7-1BAA8E40C57D}"/>
+                </a:ext>
+              </a:extLst>
+            </p:cNvPr>
+            <p:cNvSpPr txBox="1"/>
+            <p:nvPr/>
+          </p:nvSpPr>
+          <p:spPr>
+            <a:xfrm>
+              <a:off x="10972800" y="289501"/>
+              <a:ext cx="900953" cy="280846"/>
+            </a:xfrm>
+            <a:prstGeom prst="rect">
+              <a:avLst/>
+            </a:prstGeom>
+            <a:grpFill/>
+            <a:ln>
+              <a:noFill/>
+            </a:ln>
+          </p:spPr>
+          <p:txBody>
+            <a:bodyPr wrap="square" rtlCol="0">
+              <a:spAutoFit/>
+            </a:bodyPr>
+            <a:lstStyle/>
+            <a:p>
+              <a:endParaRPr lang="en-US" sz="1225" dirty="0">
+                <a:solidFill>
+                  <a:schemeClr val="bg1"/>
+                </a:solidFill>
+              </a:endParaRPr>
+            </a:p>
+          </p:txBody>
+        </p:sp>
+        <p:sp>
+          <p:nvSpPr>
+            <p:cNvPr id="14" name="TextBox 13">
+              <a:extLst>
+                <a:ext uri="{FF2B5EF4-FFF2-40B4-BE49-F238E27FC236}">
+                  <a16:creationId xmlns:a16="http://schemas.microsoft.com/office/drawing/2014/main" id="{D6424EF1-A4E5-4F24-BD9A-DB2F01928066}"/>
+                </a:ext>
+              </a:extLst>
+            </p:cNvPr>
+            <p:cNvSpPr txBox="1"/>
+            <p:nvPr/>
+          </p:nvSpPr>
+          <p:spPr>
+            <a:xfrm>
+              <a:off x="501407" y="315365"/>
+              <a:ext cx="8089074" cy="400110"/>
+            </a:xfrm>
+            <a:prstGeom prst="rect">
+              <a:avLst/>
+            </a:prstGeom>
+            <a:grpFill/>
+            <a:ln>
+              <a:noFill/>
+            </a:ln>
+          </p:spPr>
+          <p:txBody>
+            <a:bodyPr wrap="square" rtlCol="0">
+              <a:spAutoFit/>
+            </a:bodyPr>
+            <a:lstStyle/>
+            <a:p>
+              <a:r>
+                <a:rPr lang="en-US" sz="2000" dirty="0">
+                  <a:solidFill>
+                    <a:schemeClr val="bg1"/>
+                  </a:solidFill>
+                </a:rPr>
+                <a:t>MFA &gt; Web Components &gt; Shadow DOM</a:t>
+              </a:r>
+            </a:p>
+          </p:txBody>
+        </p:sp>
+      </p:grpSp>
+      <p:sp>
+        <p:nvSpPr>
+          <p:cNvPr id="7" name="TextBox 6">
+            <a:extLst>
+              <a:ext uri="{FF2B5EF4-FFF2-40B4-BE49-F238E27FC236}">
+                <a16:creationId xmlns:a16="http://schemas.microsoft.com/office/drawing/2014/main" id="{1B0C6B98-D7FC-4730-91FE-8C425AB93579}"/>
+              </a:ext>
+            </a:extLst>
+          </p:cNvPr>
+          <p:cNvSpPr txBox="1"/>
+          <p:nvPr/>
+        </p:nvSpPr>
+        <p:spPr>
+          <a:xfrm>
+            <a:off x="1288741" y="1669002"/>
+            <a:ext cx="9614518" cy="4216893"/>
+          </a:xfrm>
+          <a:prstGeom prst="rect">
+            <a:avLst/>
+          </a:prstGeom>
+          <a:noFill/>
+        </p:spPr>
+        <p:txBody>
+          <a:bodyPr wrap="square" lIns="0" tIns="0" rIns="0" bIns="0" rtlCol="0" anchor="t">
+            <a:noAutofit/>
+          </a:bodyPr>
+          <a:lstStyle/>
+          <a:p>
+            <a:r>
+              <a:rPr lang="en-US" sz="2100" dirty="0">
+                <a:hlinkClick r:id="rId3"/>
+              </a:rPr>
+              <a:t>Shadow DOM</a:t>
+            </a:r>
+            <a:r>
+              <a:rPr lang="en-US" sz="2100" dirty="0"/>
+              <a:t> is a specification designed as a tool for building component-based apps. Therefore, it brings solutions for common problems in web development:</a:t>
+            </a:r>
+          </a:p>
+          <a:p>
+            <a:endParaRPr lang="en-US" sz="2100" dirty="0"/>
+          </a:p>
+          <a:p>
+            <a:pPr marL="342900" indent="-342900">
+              <a:buFont typeface="Arial" panose="020B0604020202020204" pitchFamily="34" charset="0"/>
+              <a:buChar char="•"/>
+            </a:pPr>
+            <a:r>
+              <a:rPr lang="en-US" sz="2100" b="1" dirty="0"/>
+              <a:t>Isolated DOM</a:t>
+            </a:r>
+            <a:r>
+              <a:rPr lang="en-US" sz="2100" dirty="0"/>
+              <a:t> - A component's DOM is self-contained.</a:t>
+            </a:r>
+            <a:br>
+              <a:rPr lang="en-US" sz="2100" dirty="0"/>
+            </a:br>
+            <a:endParaRPr lang="en-US" sz="2100" dirty="0"/>
+          </a:p>
+          <a:p>
+            <a:pPr marL="342900" indent="-342900">
+              <a:buFont typeface="Arial" panose="020B0604020202020204" pitchFamily="34" charset="0"/>
+              <a:buChar char="•"/>
+            </a:pPr>
+            <a:r>
+              <a:rPr lang="en-US" sz="2100" b="1" dirty="0"/>
+              <a:t>Scoped CSS</a:t>
+            </a:r>
+            <a:r>
+              <a:rPr lang="en-US" sz="2100" dirty="0"/>
+              <a:t> - CSS defined inside shadow DOM is scoped to it. Style rules don't leak out and page styles don't bleed in.</a:t>
+            </a:r>
+          </a:p>
+          <a:p>
+            <a:pPr marL="342900" indent="-342900">
+              <a:buFont typeface="Arial" panose="020B0604020202020204" pitchFamily="34" charset="0"/>
+              <a:buChar char="•"/>
+            </a:pPr>
+            <a:endParaRPr lang="en-US" sz="2100" dirty="0"/>
+          </a:p>
+          <a:p>
+            <a:pPr marL="342900" indent="-342900">
+              <a:buFont typeface="Arial" panose="020B0604020202020204" pitchFamily="34" charset="0"/>
+              <a:buChar char="•"/>
+            </a:pPr>
+            <a:r>
+              <a:rPr lang="en-US" sz="2100" b="1" dirty="0"/>
+              <a:t>Composition</a:t>
+            </a:r>
+            <a:r>
+              <a:rPr lang="en-US" sz="2100" dirty="0"/>
+              <a:t> - Design a declarative, markup-based API for your component.</a:t>
+            </a:r>
+          </a:p>
+          <a:p>
+            <a:pPr marL="342900" indent="-342900">
+              <a:buFont typeface="Arial" panose="020B0604020202020204" pitchFamily="34" charset="0"/>
+              <a:buChar char="•"/>
+            </a:pPr>
+            <a:endParaRPr lang="en-US" sz="2100" dirty="0"/>
+          </a:p>
+          <a:p>
+            <a:pPr marL="342900" indent="-342900">
+              <a:buFont typeface="Arial" panose="020B0604020202020204" pitchFamily="34" charset="0"/>
+              <a:buChar char="•"/>
+            </a:pPr>
+            <a:r>
+              <a:rPr lang="en-US" sz="2100" b="1" dirty="0"/>
+              <a:t>Simplifies CSS</a:t>
+            </a:r>
+            <a:r>
+              <a:rPr lang="en-US" sz="2100" dirty="0"/>
+              <a:t> - Scoped DOM means you can use simple CSS selectors, more generic id/class names, and not worry about naming conflicts.</a:t>
+            </a:r>
+          </a:p>
+          <a:p>
+            <a:pPr marL="342900" indent="-342900">
+              <a:buFont typeface="Arial" panose="020B0604020202020204" pitchFamily="34" charset="0"/>
+              <a:buChar char="•"/>
+            </a:pPr>
+            <a:endParaRPr lang="en-US" sz="2100" dirty="0"/>
+          </a:p>
+          <a:p>
+            <a:pPr marL="342900" indent="-342900">
+              <a:buFont typeface="Arial" panose="020B0604020202020204" pitchFamily="34" charset="0"/>
+              <a:buChar char="•"/>
+            </a:pPr>
+            <a:r>
+              <a:rPr lang="en-US" sz="2100" b="1" dirty="0"/>
+              <a:t>Productivity</a:t>
+            </a:r>
+            <a:r>
+              <a:rPr lang="en-US" sz="2100" dirty="0"/>
+              <a:t> - Think of apps in chunks of DOM rather than one large (global) page.</a:t>
+            </a:r>
+          </a:p>
+        </p:txBody>
+      </p:sp>
+    </p:spTree>
+    <p:extLst>
+      <p:ext uri="{BB962C8B-B14F-4D97-AF65-F5344CB8AC3E}">
+        <p14:creationId xmlns:p14="http://schemas.microsoft.com/office/powerpoint/2010/main" val="3197062239"/>
+      </p:ext>
+    </p:extLst>
+  </p:cSld>
+  <p:clrMapOvr>
+    <a:masterClrMapping/>
+  </p:clrMapOvr>
+  <p:timing>
+    <p:tnLst>
+      <p:par>
+        <p:cTn id="1" dur="indefinite" restart="never" nodeType="tmRoot">
+          <p:childTnLst>
+            <p:seq concurrent="1" nextAc="seek">
+              <p:cTn id="2" dur="indefinite" nodeType="mainSeq">
+                <p:childTnLst>
+                  <p:par>
+                    <p:cTn id="3" fill="hold">
+                      <p:stCondLst>
+                        <p:cond delay="indefinite"/>
+                      </p:stCondLst>
+                      <p:childTnLst>
+                        <p:par>
+                          <p:cTn id="4" fill="hold">
+                            <p:stCondLst>
+                              <p:cond delay="0"/>
+                            </p:stCondLst>
+                            <p:childTnLst>
+                              <p:par>
+                                <p:cTn id="5" presetID="1" presetClass="entr" presetSubtype="0" fill="hold" nodeType="clickEffect">
+                                  <p:stCondLst>
+                                    <p:cond delay="0"/>
+                                  </p:stCondLst>
+                                  <p:childTnLst>
+                                    <p:set>
+                                      <p:cBhvr>
+                                        <p:cTn id="6" dur="1" fill="hold">
+                                          <p:stCondLst>
+                                            <p:cond delay="0"/>
+                                          </p:stCondLst>
+                                        </p:cTn>
+                                        <p:tgtEl>
+                                          <p:spTgt spid="7">
+                                            <p:txEl>
+                                              <p:pRg st="2" end="2"/>
+                                            </p:txEl>
+                                          </p:spTgt>
+                                        </p:tgtEl>
+                                        <p:attrNameLst>
+                                          <p:attrName>style.visibility</p:attrName>
+                                        </p:attrNameLst>
+                                      </p:cBhvr>
+                                      <p:to>
+                                        <p:strVal val="visible"/>
+                                      </p:to>
+                                    </p:set>
+                                  </p:childTnLst>
+                                </p:cTn>
+                              </p:par>
+                            </p:childTnLst>
+                          </p:cTn>
+                        </p:par>
+                      </p:childTnLst>
+                    </p:cTn>
+                  </p:par>
+                  <p:par>
+                    <p:cTn id="7" fill="hold">
+                      <p:stCondLst>
+                        <p:cond delay="indefinite"/>
+                      </p:stCondLst>
+                      <p:childTnLst>
+                        <p:par>
+                          <p:cTn id="8" fill="hold">
+                            <p:stCondLst>
+                              <p:cond delay="0"/>
+                            </p:stCondLst>
+                            <p:childTnLst>
+                              <p:par>
+                                <p:cTn id="9" presetID="1" presetClass="entr" presetSubtype="0" fill="hold" nodeType="clickEffect">
+                                  <p:stCondLst>
+                                    <p:cond delay="0"/>
+                                  </p:stCondLst>
+                                  <p:childTnLst>
+                                    <p:set>
+                                      <p:cBhvr>
+                                        <p:cTn id="10" dur="1" fill="hold">
+                                          <p:stCondLst>
+                                            <p:cond delay="0"/>
+                                          </p:stCondLst>
+                                        </p:cTn>
+                                        <p:tgtEl>
+                                          <p:spTgt spid="7">
+                                            <p:txEl>
+                                              <p:pRg st="3" end="3"/>
+                                            </p:txEl>
+                                          </p:spTgt>
+                                        </p:tgtEl>
+                                        <p:attrNameLst>
+                                          <p:attrName>style.visibility</p:attrName>
+                                        </p:attrNameLst>
+                                      </p:cBhvr>
+                                      <p:to>
+                                        <p:strVal val="visible"/>
+                                      </p:to>
+                                    </p:set>
+                                  </p:childTnLst>
+                                </p:cTn>
+                              </p:par>
+                            </p:childTnLst>
+                          </p:cTn>
+                        </p:par>
+                      </p:childTnLst>
+                    </p:cTn>
+                  </p:par>
+                  <p:par>
+                    <p:cTn id="11" fill="hold">
+                      <p:stCondLst>
+                        <p:cond delay="indefinite"/>
+                      </p:stCondLst>
+                      <p:childTnLst>
+                        <p:par>
+                          <p:cTn id="12" fill="hold">
+                            <p:stCondLst>
+                              <p:cond delay="0"/>
+                            </p:stCondLst>
+                            <p:childTnLst>
+                              <p:par>
+                                <p:cTn id="13" presetID="1" presetClass="entr" presetSubtype="0" fill="hold" nodeType="clickEffect">
+                                  <p:stCondLst>
+                                    <p:cond delay="0"/>
+                                  </p:stCondLst>
+                                  <p:childTnLst>
+                                    <p:set>
+                                      <p:cBhvr>
+                                        <p:cTn id="14" dur="1" fill="hold">
+                                          <p:stCondLst>
+                                            <p:cond delay="0"/>
+                                          </p:stCondLst>
+                                        </p:cTn>
+                                        <p:tgtEl>
+                                          <p:spTgt spid="7">
+                                            <p:txEl>
+                                              <p:pRg st="5" end="5"/>
+                                            </p:txEl>
+                                          </p:spTgt>
+                                        </p:tgtEl>
+                                        <p:attrNameLst>
+                                          <p:attrName>style.visibility</p:attrName>
+                                        </p:attrNameLst>
+                                      </p:cBhvr>
+                                      <p:to>
+                                        <p:strVal val="visible"/>
+                                      </p:to>
+                                    </p:set>
+                                  </p:childTnLst>
+                                </p:cTn>
+                              </p:par>
+                            </p:childTnLst>
+                          </p:cTn>
+                        </p:par>
+                      </p:childTnLst>
+                    </p:cTn>
+                  </p:par>
+                  <p:par>
+                    <p:cTn id="15" fill="hold">
+                      <p:stCondLst>
+                        <p:cond delay="indefinite"/>
+                      </p:stCondLst>
+                      <p:childTnLst>
+                        <p:par>
+                          <p:cTn id="16" fill="hold">
+                            <p:stCondLst>
+                              <p:cond delay="0"/>
+                            </p:stCondLst>
+                            <p:childTnLst>
+                              <p:par>
+                                <p:cTn id="17" presetID="1" presetClass="entr" presetSubtype="0" fill="hold" nodeType="clickEffect">
+                                  <p:stCondLst>
+                                    <p:cond delay="0"/>
+                                  </p:stCondLst>
+                                  <p:childTnLst>
+                                    <p:set>
+                                      <p:cBhvr>
+                                        <p:cTn id="18" dur="1" fill="hold">
+                                          <p:stCondLst>
+                                            <p:cond delay="0"/>
+                                          </p:stCondLst>
+                                        </p:cTn>
+                                        <p:tgtEl>
+                                          <p:spTgt spid="7">
+                                            <p:txEl>
+                                              <p:pRg st="7" end="7"/>
+                                            </p:txEl>
+                                          </p:spTgt>
+                                        </p:tgtEl>
+                                        <p:attrNameLst>
+                                          <p:attrName>style.visibility</p:attrName>
+                                        </p:attrNameLst>
+                                      </p:cBhvr>
+                                      <p:to>
+                                        <p:strVal val="visible"/>
+                                      </p:to>
+                                    </p:set>
+                                  </p:childTnLst>
+                                </p:cTn>
+                              </p:par>
+                            </p:childTnLst>
+                          </p:cTn>
+                        </p:par>
+                      </p:childTnLst>
+                    </p:cTn>
+                  </p:par>
+                  <p:par>
+                    <p:cTn id="19" fill="hold">
+                      <p:stCondLst>
+                        <p:cond delay="indefinite"/>
+                      </p:stCondLst>
+                      <p:childTnLst>
+                        <p:par>
+                          <p:cTn id="20" fill="hold">
+                            <p:stCondLst>
+                              <p:cond delay="0"/>
+                            </p:stCondLst>
+                            <p:childTnLst>
+                              <p:par>
+                                <p:cTn id="21" presetID="1" presetClass="entr" presetSubtype="0" fill="hold" nodeType="clickEffect">
+                                  <p:stCondLst>
+                                    <p:cond delay="0"/>
+                                  </p:stCondLst>
+                                  <p:childTnLst>
+                                    <p:set>
+                                      <p:cBhvr>
+                                        <p:cTn id="22" dur="1" fill="hold">
+                                          <p:stCondLst>
+                                            <p:cond delay="0"/>
+                                          </p:stCondLst>
+                                        </p:cTn>
+                                        <p:tgtEl>
+                                          <p:spTgt spid="7">
+                                            <p:txEl>
+                                              <p:pRg st="9" end="9"/>
+                                            </p:txEl>
+                                          </p:spTgt>
+                                        </p:tgtEl>
+                                        <p:attrNameLst>
+                                          <p:attrName>style.visibility</p:attrName>
+                                        </p:attrNameLst>
+                                      </p:cBhvr>
+                                      <p:to>
+                                        <p:strVal val="visible"/>
+                                      </p:to>
+                                    </p:set>
+                                  </p:childTnLst>
+                                </p:cTn>
+                              </p:par>
+                            </p:childTnLst>
+                          </p:cTn>
+                        </p:par>
+                      </p:childTnLst>
+                    </p:cTn>
+                  </p:par>
+                </p:childTnLst>
+              </p:cTn>
+              <p:prevCondLst>
+                <p:cond evt="onPrev" delay="0">
+                  <p:tgtEl>
+                    <p:sldTgt/>
+                  </p:tgtEl>
+                </p:cond>
+              </p:prevCondLst>
+              <p:nextCondLst>
+                <p:cond evt="onNext" delay="0">
+                  <p:tgtEl>
+                    <p:sldTgt/>
+                  </p:tgtEl>
+                </p:cond>
+              </p:nextCondLst>
+            </p:seq>
+          </p:childTnLst>
+        </p:cTn>
+      </p:par>
+    </p:tnLst>
+  </p:timing>
+</p:sld>
+</file>
+
+<file path=ppt/slides/slide19.xml><?xml version="1.0" encoding="utf-8"?>
+<p:sld xmlns:a="http://schemas.openxmlformats.org/drawingml/2006/main" xmlns:r="http://schemas.openxmlformats.org/officeDocument/2006/relationships" xmlns:p="http://schemas.openxmlformats.org/presentationml/2006/main">
+  <p:cSld>
+    <p:spTree>
+      <p:nvGrpSpPr>
+        <p:cNvPr id="1" name=""/>
+        <p:cNvGrpSpPr/>
+        <p:nvPr/>
+      </p:nvGrpSpPr>
+      <p:grpSpPr>
+        <a:xfrm>
+          <a:off x="0" y="0"/>
+          <a:ext cx="0" cy="0"/>
+          <a:chOff x="0" y="0"/>
+          <a:chExt cx="0" cy="0"/>
+        </a:xfrm>
+      </p:grpSpPr>
+      <p:pic>
+        <p:nvPicPr>
+          <p:cNvPr id="9" name="Picture 8">
+            <a:extLst>
+              <a:ext uri="{FF2B5EF4-FFF2-40B4-BE49-F238E27FC236}">
+                <a16:creationId xmlns:a16="http://schemas.microsoft.com/office/drawing/2014/main" id="{47FF90BC-4EA9-4433-8469-620BF496C336}"/>
+              </a:ext>
+            </a:extLst>
+          </p:cNvPr>
+          <p:cNvPicPr>
+            <a:picLocks noChangeAspect="1"/>
+          </p:cNvPicPr>
+          <p:nvPr/>
+        </p:nvPicPr>
+        <p:blipFill rotWithShape="1">
+          <a:blip r:embed="rId2">
+            <a:extLst>
+              <a:ext uri="{28A0092B-C50C-407E-A947-70E740481C1C}">
+                <a14:useLocalDpi xmlns:a14="http://schemas.microsoft.com/office/drawing/2010/main" val="0"/>
+              </a:ext>
+            </a:extLst>
+          </a:blip>
+          <a:srcRect r="62500"/>
+          <a:stretch/>
+        </p:blipFill>
+        <p:spPr>
+          <a:xfrm>
+            <a:off x="172497" y="-110435"/>
+            <a:ext cx="914400" cy="1251712"/>
+          </a:xfrm>
+          <a:prstGeom prst="rect">
+            <a:avLst/>
+          </a:prstGeom>
+        </p:spPr>
+      </p:pic>
+      <p:grpSp>
+        <p:nvGrpSpPr>
+          <p:cNvPr id="10" name="Group 9">
+            <a:extLst>
+              <a:ext uri="{FF2B5EF4-FFF2-40B4-BE49-F238E27FC236}">
+                <a16:creationId xmlns:a16="http://schemas.microsoft.com/office/drawing/2014/main" id="{58A8AF2F-B974-4491-91CE-6F2028BFACCD}"/>
+              </a:ext>
+            </a:extLst>
+          </p:cNvPr>
+          <p:cNvGrpSpPr/>
+          <p:nvPr/>
+        </p:nvGrpSpPr>
+        <p:grpSpPr>
+          <a:xfrm>
+            <a:off x="2" y="2"/>
+            <a:ext cx="12191999" cy="948335"/>
+            <a:chOff x="0" y="0"/>
+            <a:chExt cx="12192000" cy="948335"/>
+          </a:xfrm>
+          <a:solidFill>
+            <a:schemeClr val="accent1"/>
+          </a:solidFill>
+        </p:grpSpPr>
+        <p:sp>
+          <p:nvSpPr>
+            <p:cNvPr id="11" name="Rectangle 10">
+              <a:extLst>
+                <a:ext uri="{FF2B5EF4-FFF2-40B4-BE49-F238E27FC236}">
+                  <a16:creationId xmlns:a16="http://schemas.microsoft.com/office/drawing/2014/main" id="{049BDDA0-374D-4DE8-9E4C-A21ED7C8652D}"/>
+                </a:ext>
+              </a:extLst>
+            </p:cNvPr>
+            <p:cNvSpPr/>
+            <p:nvPr/>
+          </p:nvSpPr>
+          <p:spPr>
+            <a:xfrm>
+              <a:off x="0" y="0"/>
+              <a:ext cx="12192000" cy="948335"/>
+            </a:xfrm>
+            <a:prstGeom prst="rect">
+              <a:avLst/>
+            </a:prstGeom>
+            <a:grpFill/>
+            <a:ln>
+              <a:noFill/>
+            </a:ln>
+          </p:spPr>
+          <p:style>
+            <a:lnRef idx="2">
+              <a:schemeClr val="accent1">
+                <a:shade val="50000"/>
+              </a:schemeClr>
+            </a:lnRef>
+            <a:fillRef idx="1">
+              <a:schemeClr val="accent1"/>
+            </a:fillRef>
+            <a:effectRef idx="0">
+              <a:schemeClr val="accent1"/>
+            </a:effectRef>
+            <a:fontRef idx="minor">
+              <a:schemeClr val="lt1"/>
+            </a:fontRef>
+          </p:style>
+          <p:txBody>
+            <a:bodyPr rtlCol="0" anchor="ctr"/>
+            <a:lstStyle/>
+            <a:p>
+              <a:pPr algn="ctr"/>
+              <a:endParaRPr lang="en-US" sz="1225" dirty="0"/>
+            </a:p>
+          </p:txBody>
+        </p:sp>
+        <p:sp>
+          <p:nvSpPr>
+            <p:cNvPr id="12" name="TextBox 11">
+              <a:extLst>
+                <a:ext uri="{FF2B5EF4-FFF2-40B4-BE49-F238E27FC236}">
+                  <a16:creationId xmlns:a16="http://schemas.microsoft.com/office/drawing/2014/main" id="{329B3816-A639-4692-9BC7-1BAA8E40C57D}"/>
+                </a:ext>
+              </a:extLst>
+            </p:cNvPr>
+            <p:cNvSpPr txBox="1"/>
+            <p:nvPr/>
+          </p:nvSpPr>
+          <p:spPr>
+            <a:xfrm>
+              <a:off x="10972800" y="289501"/>
+              <a:ext cx="900953" cy="280846"/>
+            </a:xfrm>
+            <a:prstGeom prst="rect">
+              <a:avLst/>
+            </a:prstGeom>
+            <a:grpFill/>
+            <a:ln>
+              <a:noFill/>
+            </a:ln>
+          </p:spPr>
+          <p:txBody>
+            <a:bodyPr wrap="square" rtlCol="0">
+              <a:spAutoFit/>
+            </a:bodyPr>
+            <a:lstStyle/>
+            <a:p>
+              <a:endParaRPr lang="en-US" sz="1225" dirty="0">
+                <a:solidFill>
+                  <a:schemeClr val="bg1"/>
+                </a:solidFill>
+              </a:endParaRPr>
+            </a:p>
+          </p:txBody>
+        </p:sp>
+        <p:sp>
+          <p:nvSpPr>
+            <p:cNvPr id="14" name="TextBox 13">
+              <a:extLst>
+                <a:ext uri="{FF2B5EF4-FFF2-40B4-BE49-F238E27FC236}">
+                  <a16:creationId xmlns:a16="http://schemas.microsoft.com/office/drawing/2014/main" id="{D6424EF1-A4E5-4F24-BD9A-DB2F01928066}"/>
+                </a:ext>
+              </a:extLst>
+            </p:cNvPr>
+            <p:cNvSpPr txBox="1"/>
+            <p:nvPr/>
+          </p:nvSpPr>
+          <p:spPr>
+            <a:xfrm>
+              <a:off x="501407" y="315365"/>
+              <a:ext cx="8089074" cy="400110"/>
+            </a:xfrm>
+            <a:prstGeom prst="rect">
+              <a:avLst/>
+            </a:prstGeom>
+            <a:grpFill/>
+            <a:ln>
+              <a:noFill/>
+            </a:ln>
+          </p:spPr>
+          <p:txBody>
+            <a:bodyPr wrap="square" rtlCol="0">
+              <a:spAutoFit/>
+            </a:bodyPr>
+            <a:lstStyle/>
+            <a:p>
+              <a:r>
+                <a:rPr lang="en-US" sz="2000" dirty="0">
+                  <a:solidFill>
+                    <a:schemeClr val="bg1"/>
+                  </a:solidFill>
+                </a:rPr>
+                <a:t>MFA &gt; Web Components &gt; Shadow DOM &gt; Hands-on</a:t>
+              </a:r>
+            </a:p>
+          </p:txBody>
+        </p:sp>
+      </p:grpSp>
+      <p:pic>
+        <p:nvPicPr>
+          <p:cNvPr id="7" name="Picture 6">
+            <a:extLst>
+              <a:ext uri="{FF2B5EF4-FFF2-40B4-BE49-F238E27FC236}">
+                <a16:creationId xmlns:a16="http://schemas.microsoft.com/office/drawing/2014/main" id="{16A31FFF-3A7B-41B6-B4DD-5F42A07A245D}"/>
+              </a:ext>
+            </a:extLst>
+          </p:cNvPr>
+          <p:cNvPicPr>
+            <a:picLocks noChangeAspect="1"/>
+          </p:cNvPicPr>
+          <p:nvPr/>
+        </p:nvPicPr>
+        <p:blipFill>
+          <a:blip r:embed="rId3">
+            <a:extLst>
+              <a:ext uri="{28A0092B-C50C-407E-A947-70E740481C1C}">
+                <a14:useLocalDpi xmlns:a14="http://schemas.microsoft.com/office/drawing/2010/main" val="0"/>
+              </a:ext>
+            </a:extLst>
+          </a:blip>
+          <a:stretch>
+            <a:fillRect/>
+          </a:stretch>
+        </p:blipFill>
+        <p:spPr>
+          <a:xfrm>
+            <a:off x="2072920" y="1340019"/>
+            <a:ext cx="8046161" cy="4578349"/>
+          </a:xfrm>
+          <a:prstGeom prst="rect">
+            <a:avLst/>
+          </a:prstGeom>
+        </p:spPr>
+      </p:pic>
+    </p:spTree>
+    <p:extLst>
+      <p:ext uri="{BB962C8B-B14F-4D97-AF65-F5344CB8AC3E}">
+        <p14:creationId xmlns:p14="http://schemas.microsoft.com/office/powerpoint/2010/main" val="4042155357"/>
       </p:ext>
     </p:extLst>
   </p:cSld>
@@ -23351,1408 +23725,6 @@
       </p:pic>
       <p:grpSp>
         <p:nvGrpSpPr>
-          <p:cNvPr id="10" name="Group 9">
-            <a:extLst>
-              <a:ext uri="{FF2B5EF4-FFF2-40B4-BE49-F238E27FC236}">
-                <a16:creationId xmlns:a16="http://schemas.microsoft.com/office/drawing/2014/main" id="{58A8AF2F-B974-4491-91CE-6F2028BFACCD}"/>
-              </a:ext>
-            </a:extLst>
-          </p:cNvPr>
-          <p:cNvGrpSpPr/>
-          <p:nvPr/>
-        </p:nvGrpSpPr>
-        <p:grpSpPr>
-          <a:xfrm>
-            <a:off x="2" y="2"/>
-            <a:ext cx="12191999" cy="948335"/>
-            <a:chOff x="0" y="0"/>
-            <a:chExt cx="12192000" cy="948335"/>
-          </a:xfrm>
-          <a:solidFill>
-            <a:schemeClr val="accent1"/>
-          </a:solidFill>
-        </p:grpSpPr>
-        <p:sp>
-          <p:nvSpPr>
-            <p:cNvPr id="11" name="Rectangle 10">
-              <a:extLst>
-                <a:ext uri="{FF2B5EF4-FFF2-40B4-BE49-F238E27FC236}">
-                  <a16:creationId xmlns:a16="http://schemas.microsoft.com/office/drawing/2014/main" id="{049BDDA0-374D-4DE8-9E4C-A21ED7C8652D}"/>
-                </a:ext>
-              </a:extLst>
-            </p:cNvPr>
-            <p:cNvSpPr/>
-            <p:nvPr/>
-          </p:nvSpPr>
-          <p:spPr>
-            <a:xfrm>
-              <a:off x="0" y="0"/>
-              <a:ext cx="12192000" cy="948335"/>
-            </a:xfrm>
-            <a:prstGeom prst="rect">
-              <a:avLst/>
-            </a:prstGeom>
-            <a:grpFill/>
-            <a:ln>
-              <a:noFill/>
-            </a:ln>
-          </p:spPr>
-          <p:style>
-            <a:lnRef idx="2">
-              <a:schemeClr val="accent1">
-                <a:shade val="50000"/>
-              </a:schemeClr>
-            </a:lnRef>
-            <a:fillRef idx="1">
-              <a:schemeClr val="accent1"/>
-            </a:fillRef>
-            <a:effectRef idx="0">
-              <a:schemeClr val="accent1"/>
-            </a:effectRef>
-            <a:fontRef idx="minor">
-              <a:schemeClr val="lt1"/>
-            </a:fontRef>
-          </p:style>
-          <p:txBody>
-            <a:bodyPr rtlCol="0" anchor="ctr"/>
-            <a:lstStyle/>
-            <a:p>
-              <a:pPr algn="ctr"/>
-              <a:endParaRPr lang="en-US" sz="1225" dirty="0"/>
-            </a:p>
-          </p:txBody>
-        </p:sp>
-        <p:sp>
-          <p:nvSpPr>
-            <p:cNvPr id="12" name="TextBox 11">
-              <a:extLst>
-                <a:ext uri="{FF2B5EF4-FFF2-40B4-BE49-F238E27FC236}">
-                  <a16:creationId xmlns:a16="http://schemas.microsoft.com/office/drawing/2014/main" id="{329B3816-A639-4692-9BC7-1BAA8E40C57D}"/>
-                </a:ext>
-              </a:extLst>
-            </p:cNvPr>
-            <p:cNvSpPr txBox="1"/>
-            <p:nvPr/>
-          </p:nvSpPr>
-          <p:spPr>
-            <a:xfrm>
-              <a:off x="10972800" y="289501"/>
-              <a:ext cx="900953" cy="280846"/>
-            </a:xfrm>
-            <a:prstGeom prst="rect">
-              <a:avLst/>
-            </a:prstGeom>
-            <a:grpFill/>
-            <a:ln>
-              <a:noFill/>
-            </a:ln>
-          </p:spPr>
-          <p:txBody>
-            <a:bodyPr wrap="square" rtlCol="0">
-              <a:spAutoFit/>
-            </a:bodyPr>
-            <a:lstStyle/>
-            <a:p>
-              <a:endParaRPr lang="en-US" sz="1225" dirty="0">
-                <a:solidFill>
-                  <a:schemeClr val="bg1"/>
-                </a:solidFill>
-              </a:endParaRPr>
-            </a:p>
-          </p:txBody>
-        </p:sp>
-        <p:sp>
-          <p:nvSpPr>
-            <p:cNvPr id="14" name="TextBox 13">
-              <a:extLst>
-                <a:ext uri="{FF2B5EF4-FFF2-40B4-BE49-F238E27FC236}">
-                  <a16:creationId xmlns:a16="http://schemas.microsoft.com/office/drawing/2014/main" id="{D6424EF1-A4E5-4F24-BD9A-DB2F01928066}"/>
-                </a:ext>
-              </a:extLst>
-            </p:cNvPr>
-            <p:cNvSpPr txBox="1"/>
-            <p:nvPr/>
-          </p:nvSpPr>
-          <p:spPr>
-            <a:xfrm>
-              <a:off x="501407" y="315365"/>
-              <a:ext cx="8089074" cy="400110"/>
-            </a:xfrm>
-            <a:prstGeom prst="rect">
-              <a:avLst/>
-            </a:prstGeom>
-            <a:grpFill/>
-            <a:ln>
-              <a:noFill/>
-            </a:ln>
-          </p:spPr>
-          <p:txBody>
-            <a:bodyPr wrap="square" rtlCol="0">
-              <a:spAutoFit/>
-            </a:bodyPr>
-            <a:lstStyle/>
-            <a:p>
-              <a:r>
-                <a:rPr lang="en-US" sz="2000" dirty="0">
-                  <a:solidFill>
-                    <a:schemeClr val="bg1"/>
-                  </a:solidFill>
-                </a:rPr>
-                <a:t>MFA &gt; Web Components &gt; Custom Elements &gt; Hands-on</a:t>
-              </a:r>
-            </a:p>
-          </p:txBody>
-        </p:sp>
-      </p:grpSp>
-      <p:pic>
-        <p:nvPicPr>
-          <p:cNvPr id="7" name="Picture 6">
-            <a:extLst>
-              <a:ext uri="{FF2B5EF4-FFF2-40B4-BE49-F238E27FC236}">
-                <a16:creationId xmlns:a16="http://schemas.microsoft.com/office/drawing/2014/main" id="{16A31FFF-3A7B-41B6-B4DD-5F42A07A245D}"/>
-              </a:ext>
-            </a:extLst>
-          </p:cNvPr>
-          <p:cNvPicPr>
-            <a:picLocks noChangeAspect="1"/>
-          </p:cNvPicPr>
-          <p:nvPr/>
-        </p:nvPicPr>
-        <p:blipFill>
-          <a:blip r:embed="rId3">
-            <a:extLst>
-              <a:ext uri="{28A0092B-C50C-407E-A947-70E740481C1C}">
-                <a14:useLocalDpi xmlns:a14="http://schemas.microsoft.com/office/drawing/2010/main" val="0"/>
-              </a:ext>
-            </a:extLst>
-          </a:blip>
-          <a:stretch>
-            <a:fillRect/>
-          </a:stretch>
-        </p:blipFill>
-        <p:spPr>
-          <a:xfrm>
-            <a:off x="2072920" y="1340019"/>
-            <a:ext cx="8046161" cy="4578349"/>
-          </a:xfrm>
-          <a:prstGeom prst="rect">
-            <a:avLst/>
-          </a:prstGeom>
-        </p:spPr>
-      </p:pic>
-    </p:spTree>
-    <p:extLst>
-      <p:ext uri="{BB962C8B-B14F-4D97-AF65-F5344CB8AC3E}">
-        <p14:creationId xmlns:p14="http://schemas.microsoft.com/office/powerpoint/2010/main" val="1277162952"/>
-      </p:ext>
-    </p:extLst>
-  </p:cSld>
-  <p:clrMapOvr>
-    <a:masterClrMapping/>
-  </p:clrMapOvr>
-</p:sld>
-</file>
-
-<file path=ppt/slides/slide21.xml><?xml version="1.0" encoding="utf-8"?>
-<p:sld xmlns:a="http://schemas.openxmlformats.org/drawingml/2006/main" xmlns:r="http://schemas.openxmlformats.org/officeDocument/2006/relationships" xmlns:p="http://schemas.openxmlformats.org/presentationml/2006/main">
-  <p:cSld>
-    <p:spTree>
-      <p:nvGrpSpPr>
-        <p:cNvPr id="1" name=""/>
-        <p:cNvGrpSpPr/>
-        <p:nvPr/>
-      </p:nvGrpSpPr>
-      <p:grpSpPr>
-        <a:xfrm>
-          <a:off x="0" y="0"/>
-          <a:ext cx="0" cy="0"/>
-          <a:chOff x="0" y="0"/>
-          <a:chExt cx="0" cy="0"/>
-        </a:xfrm>
-      </p:grpSpPr>
-      <p:pic>
-        <p:nvPicPr>
-          <p:cNvPr id="9" name="Picture 8">
-            <a:extLst>
-              <a:ext uri="{FF2B5EF4-FFF2-40B4-BE49-F238E27FC236}">
-                <a16:creationId xmlns:a16="http://schemas.microsoft.com/office/drawing/2014/main" id="{47FF90BC-4EA9-4433-8469-620BF496C336}"/>
-              </a:ext>
-            </a:extLst>
-          </p:cNvPr>
-          <p:cNvPicPr>
-            <a:picLocks noChangeAspect="1"/>
-          </p:cNvPicPr>
-          <p:nvPr/>
-        </p:nvPicPr>
-        <p:blipFill rotWithShape="1">
-          <a:blip r:embed="rId2">
-            <a:extLst>
-              <a:ext uri="{28A0092B-C50C-407E-A947-70E740481C1C}">
-                <a14:useLocalDpi xmlns:a14="http://schemas.microsoft.com/office/drawing/2010/main" val="0"/>
-              </a:ext>
-            </a:extLst>
-          </a:blip>
-          <a:srcRect r="62500"/>
-          <a:stretch/>
-        </p:blipFill>
-        <p:spPr>
-          <a:xfrm>
-            <a:off x="172497" y="-110435"/>
-            <a:ext cx="914400" cy="1251712"/>
-          </a:xfrm>
-          <a:prstGeom prst="rect">
-            <a:avLst/>
-          </a:prstGeom>
-        </p:spPr>
-      </p:pic>
-      <p:grpSp>
-        <p:nvGrpSpPr>
-          <p:cNvPr id="10" name="Group 9">
-            <a:extLst>
-              <a:ext uri="{FF2B5EF4-FFF2-40B4-BE49-F238E27FC236}">
-                <a16:creationId xmlns:a16="http://schemas.microsoft.com/office/drawing/2014/main" id="{58A8AF2F-B974-4491-91CE-6F2028BFACCD}"/>
-              </a:ext>
-            </a:extLst>
-          </p:cNvPr>
-          <p:cNvGrpSpPr/>
-          <p:nvPr/>
-        </p:nvGrpSpPr>
-        <p:grpSpPr>
-          <a:xfrm>
-            <a:off x="2" y="2"/>
-            <a:ext cx="12191999" cy="948335"/>
-            <a:chOff x="0" y="0"/>
-            <a:chExt cx="12192000" cy="948335"/>
-          </a:xfrm>
-          <a:solidFill>
-            <a:schemeClr val="accent1"/>
-          </a:solidFill>
-        </p:grpSpPr>
-        <p:sp>
-          <p:nvSpPr>
-            <p:cNvPr id="11" name="Rectangle 10">
-              <a:extLst>
-                <a:ext uri="{FF2B5EF4-FFF2-40B4-BE49-F238E27FC236}">
-                  <a16:creationId xmlns:a16="http://schemas.microsoft.com/office/drawing/2014/main" id="{049BDDA0-374D-4DE8-9E4C-A21ED7C8652D}"/>
-                </a:ext>
-              </a:extLst>
-            </p:cNvPr>
-            <p:cNvSpPr/>
-            <p:nvPr/>
-          </p:nvSpPr>
-          <p:spPr>
-            <a:xfrm>
-              <a:off x="0" y="0"/>
-              <a:ext cx="12192000" cy="948335"/>
-            </a:xfrm>
-            <a:prstGeom prst="rect">
-              <a:avLst/>
-            </a:prstGeom>
-            <a:grpFill/>
-            <a:ln>
-              <a:noFill/>
-            </a:ln>
-          </p:spPr>
-          <p:style>
-            <a:lnRef idx="2">
-              <a:schemeClr val="accent1">
-                <a:shade val="50000"/>
-              </a:schemeClr>
-            </a:lnRef>
-            <a:fillRef idx="1">
-              <a:schemeClr val="accent1"/>
-            </a:fillRef>
-            <a:effectRef idx="0">
-              <a:schemeClr val="accent1"/>
-            </a:effectRef>
-            <a:fontRef idx="minor">
-              <a:schemeClr val="lt1"/>
-            </a:fontRef>
-          </p:style>
-          <p:txBody>
-            <a:bodyPr rtlCol="0" anchor="ctr"/>
-            <a:lstStyle/>
-            <a:p>
-              <a:pPr algn="ctr"/>
-              <a:endParaRPr lang="en-US" sz="1225" dirty="0"/>
-            </a:p>
-          </p:txBody>
-        </p:sp>
-        <p:sp>
-          <p:nvSpPr>
-            <p:cNvPr id="12" name="TextBox 11">
-              <a:extLst>
-                <a:ext uri="{FF2B5EF4-FFF2-40B4-BE49-F238E27FC236}">
-                  <a16:creationId xmlns:a16="http://schemas.microsoft.com/office/drawing/2014/main" id="{329B3816-A639-4692-9BC7-1BAA8E40C57D}"/>
-                </a:ext>
-              </a:extLst>
-            </p:cNvPr>
-            <p:cNvSpPr txBox="1"/>
-            <p:nvPr/>
-          </p:nvSpPr>
-          <p:spPr>
-            <a:xfrm>
-              <a:off x="10972800" y="289501"/>
-              <a:ext cx="900953" cy="280846"/>
-            </a:xfrm>
-            <a:prstGeom prst="rect">
-              <a:avLst/>
-            </a:prstGeom>
-            <a:grpFill/>
-            <a:ln>
-              <a:noFill/>
-            </a:ln>
-          </p:spPr>
-          <p:txBody>
-            <a:bodyPr wrap="square" rtlCol="0">
-              <a:spAutoFit/>
-            </a:bodyPr>
-            <a:lstStyle/>
-            <a:p>
-              <a:endParaRPr lang="en-US" sz="1225" dirty="0">
-                <a:solidFill>
-                  <a:schemeClr val="bg1"/>
-                </a:solidFill>
-              </a:endParaRPr>
-            </a:p>
-          </p:txBody>
-        </p:sp>
-        <p:sp>
-          <p:nvSpPr>
-            <p:cNvPr id="14" name="TextBox 13">
-              <a:extLst>
-                <a:ext uri="{FF2B5EF4-FFF2-40B4-BE49-F238E27FC236}">
-                  <a16:creationId xmlns:a16="http://schemas.microsoft.com/office/drawing/2014/main" id="{D6424EF1-A4E5-4F24-BD9A-DB2F01928066}"/>
-                </a:ext>
-              </a:extLst>
-            </p:cNvPr>
-            <p:cNvSpPr txBox="1"/>
-            <p:nvPr/>
-          </p:nvSpPr>
-          <p:spPr>
-            <a:xfrm>
-              <a:off x="501407" y="315365"/>
-              <a:ext cx="8089074" cy="400110"/>
-            </a:xfrm>
-            <a:prstGeom prst="rect">
-              <a:avLst/>
-            </a:prstGeom>
-            <a:grpFill/>
-            <a:ln>
-              <a:noFill/>
-            </a:ln>
-          </p:spPr>
-          <p:txBody>
-            <a:bodyPr wrap="square" rtlCol="0">
-              <a:spAutoFit/>
-            </a:bodyPr>
-            <a:lstStyle/>
-            <a:p>
-              <a:r>
-                <a:rPr lang="en-US" sz="2000" dirty="0">
-                  <a:solidFill>
-                    <a:schemeClr val="bg1"/>
-                  </a:solidFill>
-                </a:rPr>
-                <a:t>MFA &gt; Web Components &gt; Shadow DOM</a:t>
-              </a:r>
-            </a:p>
-          </p:txBody>
-        </p:sp>
-      </p:grpSp>
-      <p:sp>
-        <p:nvSpPr>
-          <p:cNvPr id="7" name="TextBox 6">
-            <a:extLst>
-              <a:ext uri="{FF2B5EF4-FFF2-40B4-BE49-F238E27FC236}">
-                <a16:creationId xmlns:a16="http://schemas.microsoft.com/office/drawing/2014/main" id="{1B0C6B98-D7FC-4730-91FE-8C425AB93579}"/>
-              </a:ext>
-            </a:extLst>
-          </p:cNvPr>
-          <p:cNvSpPr txBox="1"/>
-          <p:nvPr/>
-        </p:nvSpPr>
-        <p:spPr>
-          <a:xfrm>
-            <a:off x="1288741" y="1669002"/>
-            <a:ext cx="9614518" cy="4216893"/>
-          </a:xfrm>
-          <a:prstGeom prst="rect">
-            <a:avLst/>
-          </a:prstGeom>
-          <a:noFill/>
-        </p:spPr>
-        <p:txBody>
-          <a:bodyPr wrap="square" lIns="0" tIns="0" rIns="0" bIns="0" rtlCol="0" anchor="t">
-            <a:noAutofit/>
-          </a:bodyPr>
-          <a:lstStyle/>
-          <a:p>
-            <a:r>
-              <a:rPr lang="en-US" sz="2100" dirty="0">
-                <a:hlinkClick r:id="rId3"/>
-              </a:rPr>
-              <a:t>Shadow DOM</a:t>
-            </a:r>
-            <a:r>
-              <a:rPr lang="en-US" sz="2100" dirty="0"/>
-              <a:t> is a specification designed as a tool for building component-based apps. Therefore, it brings solutions for common problems in web development:</a:t>
-            </a:r>
-          </a:p>
-          <a:p>
-            <a:endParaRPr lang="en-US" sz="2100" dirty="0"/>
-          </a:p>
-          <a:p>
-            <a:pPr marL="342900" indent="-342900">
-              <a:buFont typeface="Arial" panose="020B0604020202020204" pitchFamily="34" charset="0"/>
-              <a:buChar char="•"/>
-            </a:pPr>
-            <a:r>
-              <a:rPr lang="en-US" sz="2100" b="1" dirty="0"/>
-              <a:t>Isolated DOM</a:t>
-            </a:r>
-            <a:r>
-              <a:rPr lang="en-US" sz="2100" dirty="0"/>
-              <a:t> - A component's DOM is self-contained.</a:t>
-            </a:r>
-            <a:br>
-              <a:rPr lang="en-US" sz="2100" dirty="0"/>
-            </a:br>
-            <a:endParaRPr lang="en-US" sz="2100" dirty="0"/>
-          </a:p>
-          <a:p>
-            <a:pPr marL="342900" indent="-342900">
-              <a:buFont typeface="Arial" panose="020B0604020202020204" pitchFamily="34" charset="0"/>
-              <a:buChar char="•"/>
-            </a:pPr>
-            <a:r>
-              <a:rPr lang="en-US" sz="2100" b="1" dirty="0"/>
-              <a:t>Scoped CSS</a:t>
-            </a:r>
-            <a:r>
-              <a:rPr lang="en-US" sz="2100" dirty="0"/>
-              <a:t> - CSS defined inside shadow DOM is scoped to it. Style rules don't leak out and page styles don't bleed in.</a:t>
-            </a:r>
-          </a:p>
-          <a:p>
-            <a:pPr marL="342900" indent="-342900">
-              <a:buFont typeface="Arial" panose="020B0604020202020204" pitchFamily="34" charset="0"/>
-              <a:buChar char="•"/>
-            </a:pPr>
-            <a:endParaRPr lang="en-US" sz="2100" dirty="0"/>
-          </a:p>
-          <a:p>
-            <a:pPr marL="342900" indent="-342900">
-              <a:buFont typeface="Arial" panose="020B0604020202020204" pitchFamily="34" charset="0"/>
-              <a:buChar char="•"/>
-            </a:pPr>
-            <a:r>
-              <a:rPr lang="en-US" sz="2100" b="1" dirty="0"/>
-              <a:t>Composition</a:t>
-            </a:r>
-            <a:r>
-              <a:rPr lang="en-US" sz="2100" dirty="0"/>
-              <a:t> - Design a declarative, markup-based API for your component.</a:t>
-            </a:r>
-          </a:p>
-          <a:p>
-            <a:pPr marL="342900" indent="-342900">
-              <a:buFont typeface="Arial" panose="020B0604020202020204" pitchFamily="34" charset="0"/>
-              <a:buChar char="•"/>
-            </a:pPr>
-            <a:endParaRPr lang="en-US" sz="2100" dirty="0"/>
-          </a:p>
-          <a:p>
-            <a:pPr marL="342900" indent="-342900">
-              <a:buFont typeface="Arial" panose="020B0604020202020204" pitchFamily="34" charset="0"/>
-              <a:buChar char="•"/>
-            </a:pPr>
-            <a:r>
-              <a:rPr lang="en-US" sz="2100" b="1" dirty="0"/>
-              <a:t>Simplifies CSS</a:t>
-            </a:r>
-            <a:r>
-              <a:rPr lang="en-US" sz="2100" dirty="0"/>
-              <a:t> - Scoped DOM means you can use simple CSS selectors, more generic id/class names, and not worry about naming conflicts.</a:t>
-            </a:r>
-          </a:p>
-          <a:p>
-            <a:pPr marL="342900" indent="-342900">
-              <a:buFont typeface="Arial" panose="020B0604020202020204" pitchFamily="34" charset="0"/>
-              <a:buChar char="•"/>
-            </a:pPr>
-            <a:endParaRPr lang="en-US" sz="2100" dirty="0"/>
-          </a:p>
-          <a:p>
-            <a:pPr marL="342900" indent="-342900">
-              <a:buFont typeface="Arial" panose="020B0604020202020204" pitchFamily="34" charset="0"/>
-              <a:buChar char="•"/>
-            </a:pPr>
-            <a:r>
-              <a:rPr lang="en-US" sz="2100" b="1" dirty="0"/>
-              <a:t>Productivity</a:t>
-            </a:r>
-            <a:r>
-              <a:rPr lang="en-US" sz="2100" dirty="0"/>
-              <a:t> - Think of apps in chunks of DOM rather than one large (global) page.</a:t>
-            </a:r>
-          </a:p>
-        </p:txBody>
-      </p:sp>
-    </p:spTree>
-    <p:extLst>
-      <p:ext uri="{BB962C8B-B14F-4D97-AF65-F5344CB8AC3E}">
-        <p14:creationId xmlns:p14="http://schemas.microsoft.com/office/powerpoint/2010/main" val="3197062239"/>
-      </p:ext>
-    </p:extLst>
-  </p:cSld>
-  <p:clrMapOvr>
-    <a:masterClrMapping/>
-  </p:clrMapOvr>
-  <p:timing>
-    <p:tnLst>
-      <p:par>
-        <p:cTn id="1" dur="indefinite" restart="never" nodeType="tmRoot">
-          <p:childTnLst>
-            <p:seq concurrent="1" nextAc="seek">
-              <p:cTn id="2" dur="indefinite" nodeType="mainSeq">
-                <p:childTnLst>
-                  <p:par>
-                    <p:cTn id="3" fill="hold">
-                      <p:stCondLst>
-                        <p:cond delay="indefinite"/>
-                      </p:stCondLst>
-                      <p:childTnLst>
-                        <p:par>
-                          <p:cTn id="4" fill="hold">
-                            <p:stCondLst>
-                              <p:cond delay="0"/>
-                            </p:stCondLst>
-                            <p:childTnLst>
-                              <p:par>
-                                <p:cTn id="5" presetID="1" presetClass="entr" presetSubtype="0" fill="hold" nodeType="clickEffect">
-                                  <p:stCondLst>
-                                    <p:cond delay="0"/>
-                                  </p:stCondLst>
-                                  <p:childTnLst>
-                                    <p:set>
-                                      <p:cBhvr>
-                                        <p:cTn id="6" dur="1" fill="hold">
-                                          <p:stCondLst>
-                                            <p:cond delay="0"/>
-                                          </p:stCondLst>
-                                        </p:cTn>
-                                        <p:tgtEl>
-                                          <p:spTgt spid="7">
-                                            <p:txEl>
-                                              <p:pRg st="2" end="2"/>
-                                            </p:txEl>
-                                          </p:spTgt>
-                                        </p:tgtEl>
-                                        <p:attrNameLst>
-                                          <p:attrName>style.visibility</p:attrName>
-                                        </p:attrNameLst>
-                                      </p:cBhvr>
-                                      <p:to>
-                                        <p:strVal val="visible"/>
-                                      </p:to>
-                                    </p:set>
-                                  </p:childTnLst>
-                                </p:cTn>
-                              </p:par>
-                            </p:childTnLst>
-                          </p:cTn>
-                        </p:par>
-                      </p:childTnLst>
-                    </p:cTn>
-                  </p:par>
-                  <p:par>
-                    <p:cTn id="7" fill="hold">
-                      <p:stCondLst>
-                        <p:cond delay="indefinite"/>
-                      </p:stCondLst>
-                      <p:childTnLst>
-                        <p:par>
-                          <p:cTn id="8" fill="hold">
-                            <p:stCondLst>
-                              <p:cond delay="0"/>
-                            </p:stCondLst>
-                            <p:childTnLst>
-                              <p:par>
-                                <p:cTn id="9" presetID="1" presetClass="entr" presetSubtype="0" fill="hold" nodeType="clickEffect">
-                                  <p:stCondLst>
-                                    <p:cond delay="0"/>
-                                  </p:stCondLst>
-                                  <p:childTnLst>
-                                    <p:set>
-                                      <p:cBhvr>
-                                        <p:cTn id="10" dur="1" fill="hold">
-                                          <p:stCondLst>
-                                            <p:cond delay="0"/>
-                                          </p:stCondLst>
-                                        </p:cTn>
-                                        <p:tgtEl>
-                                          <p:spTgt spid="7">
-                                            <p:txEl>
-                                              <p:pRg st="3" end="3"/>
-                                            </p:txEl>
-                                          </p:spTgt>
-                                        </p:tgtEl>
-                                        <p:attrNameLst>
-                                          <p:attrName>style.visibility</p:attrName>
-                                        </p:attrNameLst>
-                                      </p:cBhvr>
-                                      <p:to>
-                                        <p:strVal val="visible"/>
-                                      </p:to>
-                                    </p:set>
-                                  </p:childTnLst>
-                                </p:cTn>
-                              </p:par>
-                            </p:childTnLst>
-                          </p:cTn>
-                        </p:par>
-                      </p:childTnLst>
-                    </p:cTn>
-                  </p:par>
-                  <p:par>
-                    <p:cTn id="11" fill="hold">
-                      <p:stCondLst>
-                        <p:cond delay="indefinite"/>
-                      </p:stCondLst>
-                      <p:childTnLst>
-                        <p:par>
-                          <p:cTn id="12" fill="hold">
-                            <p:stCondLst>
-                              <p:cond delay="0"/>
-                            </p:stCondLst>
-                            <p:childTnLst>
-                              <p:par>
-                                <p:cTn id="13" presetID="1" presetClass="entr" presetSubtype="0" fill="hold" nodeType="clickEffect">
-                                  <p:stCondLst>
-                                    <p:cond delay="0"/>
-                                  </p:stCondLst>
-                                  <p:childTnLst>
-                                    <p:set>
-                                      <p:cBhvr>
-                                        <p:cTn id="14" dur="1" fill="hold">
-                                          <p:stCondLst>
-                                            <p:cond delay="0"/>
-                                          </p:stCondLst>
-                                        </p:cTn>
-                                        <p:tgtEl>
-                                          <p:spTgt spid="7">
-                                            <p:txEl>
-                                              <p:pRg st="5" end="5"/>
-                                            </p:txEl>
-                                          </p:spTgt>
-                                        </p:tgtEl>
-                                        <p:attrNameLst>
-                                          <p:attrName>style.visibility</p:attrName>
-                                        </p:attrNameLst>
-                                      </p:cBhvr>
-                                      <p:to>
-                                        <p:strVal val="visible"/>
-                                      </p:to>
-                                    </p:set>
-                                  </p:childTnLst>
-                                </p:cTn>
-                              </p:par>
-                            </p:childTnLst>
-                          </p:cTn>
-                        </p:par>
-                      </p:childTnLst>
-                    </p:cTn>
-                  </p:par>
-                  <p:par>
-                    <p:cTn id="15" fill="hold">
-                      <p:stCondLst>
-                        <p:cond delay="indefinite"/>
-                      </p:stCondLst>
-                      <p:childTnLst>
-                        <p:par>
-                          <p:cTn id="16" fill="hold">
-                            <p:stCondLst>
-                              <p:cond delay="0"/>
-                            </p:stCondLst>
-                            <p:childTnLst>
-                              <p:par>
-                                <p:cTn id="17" presetID="1" presetClass="entr" presetSubtype="0" fill="hold" nodeType="clickEffect">
-                                  <p:stCondLst>
-                                    <p:cond delay="0"/>
-                                  </p:stCondLst>
-                                  <p:childTnLst>
-                                    <p:set>
-                                      <p:cBhvr>
-                                        <p:cTn id="18" dur="1" fill="hold">
-                                          <p:stCondLst>
-                                            <p:cond delay="0"/>
-                                          </p:stCondLst>
-                                        </p:cTn>
-                                        <p:tgtEl>
-                                          <p:spTgt spid="7">
-                                            <p:txEl>
-                                              <p:pRg st="7" end="7"/>
-                                            </p:txEl>
-                                          </p:spTgt>
-                                        </p:tgtEl>
-                                        <p:attrNameLst>
-                                          <p:attrName>style.visibility</p:attrName>
-                                        </p:attrNameLst>
-                                      </p:cBhvr>
-                                      <p:to>
-                                        <p:strVal val="visible"/>
-                                      </p:to>
-                                    </p:set>
-                                  </p:childTnLst>
-                                </p:cTn>
-                              </p:par>
-                            </p:childTnLst>
-                          </p:cTn>
-                        </p:par>
-                      </p:childTnLst>
-                    </p:cTn>
-                  </p:par>
-                  <p:par>
-                    <p:cTn id="19" fill="hold">
-                      <p:stCondLst>
-                        <p:cond delay="indefinite"/>
-                      </p:stCondLst>
-                      <p:childTnLst>
-                        <p:par>
-                          <p:cTn id="20" fill="hold">
-                            <p:stCondLst>
-                              <p:cond delay="0"/>
-                            </p:stCondLst>
-                            <p:childTnLst>
-                              <p:par>
-                                <p:cTn id="21" presetID="1" presetClass="entr" presetSubtype="0" fill="hold" nodeType="clickEffect">
-                                  <p:stCondLst>
-                                    <p:cond delay="0"/>
-                                  </p:stCondLst>
-                                  <p:childTnLst>
-                                    <p:set>
-                                      <p:cBhvr>
-                                        <p:cTn id="22" dur="1" fill="hold">
-                                          <p:stCondLst>
-                                            <p:cond delay="0"/>
-                                          </p:stCondLst>
-                                        </p:cTn>
-                                        <p:tgtEl>
-                                          <p:spTgt spid="7">
-                                            <p:txEl>
-                                              <p:pRg st="9" end="9"/>
-                                            </p:txEl>
-                                          </p:spTgt>
-                                        </p:tgtEl>
-                                        <p:attrNameLst>
-                                          <p:attrName>style.visibility</p:attrName>
-                                        </p:attrNameLst>
-                                      </p:cBhvr>
-                                      <p:to>
-                                        <p:strVal val="visible"/>
-                                      </p:to>
-                                    </p:set>
-                                  </p:childTnLst>
-                                </p:cTn>
-                              </p:par>
-                            </p:childTnLst>
-                          </p:cTn>
-                        </p:par>
-                      </p:childTnLst>
-                    </p:cTn>
-                  </p:par>
-                </p:childTnLst>
-              </p:cTn>
-              <p:prevCondLst>
-                <p:cond evt="onPrev" delay="0">
-                  <p:tgtEl>
-                    <p:sldTgt/>
-                  </p:tgtEl>
-                </p:cond>
-              </p:prevCondLst>
-              <p:nextCondLst>
-                <p:cond evt="onNext" delay="0">
-                  <p:tgtEl>
-                    <p:sldTgt/>
-                  </p:tgtEl>
-                </p:cond>
-              </p:nextCondLst>
-            </p:seq>
-          </p:childTnLst>
-        </p:cTn>
-      </p:par>
-    </p:tnLst>
-  </p:timing>
-</p:sld>
-</file>
-
-<file path=ppt/slides/slide22.xml><?xml version="1.0" encoding="utf-8"?>
-<p:sld xmlns:a="http://schemas.openxmlformats.org/drawingml/2006/main" xmlns:r="http://schemas.openxmlformats.org/officeDocument/2006/relationships" xmlns:p="http://schemas.openxmlformats.org/presentationml/2006/main">
-  <p:cSld>
-    <p:spTree>
-      <p:nvGrpSpPr>
-        <p:cNvPr id="1" name=""/>
-        <p:cNvGrpSpPr/>
-        <p:nvPr/>
-      </p:nvGrpSpPr>
-      <p:grpSpPr>
-        <a:xfrm>
-          <a:off x="0" y="0"/>
-          <a:ext cx="0" cy="0"/>
-          <a:chOff x="0" y="0"/>
-          <a:chExt cx="0" cy="0"/>
-        </a:xfrm>
-      </p:grpSpPr>
-      <p:pic>
-        <p:nvPicPr>
-          <p:cNvPr id="9" name="Picture 8">
-            <a:extLst>
-              <a:ext uri="{FF2B5EF4-FFF2-40B4-BE49-F238E27FC236}">
-                <a16:creationId xmlns:a16="http://schemas.microsoft.com/office/drawing/2014/main" id="{47FF90BC-4EA9-4433-8469-620BF496C336}"/>
-              </a:ext>
-            </a:extLst>
-          </p:cNvPr>
-          <p:cNvPicPr>
-            <a:picLocks noChangeAspect="1"/>
-          </p:cNvPicPr>
-          <p:nvPr/>
-        </p:nvPicPr>
-        <p:blipFill rotWithShape="1">
-          <a:blip r:embed="rId2">
-            <a:extLst>
-              <a:ext uri="{28A0092B-C50C-407E-A947-70E740481C1C}">
-                <a14:useLocalDpi xmlns:a14="http://schemas.microsoft.com/office/drawing/2010/main" val="0"/>
-              </a:ext>
-            </a:extLst>
-          </a:blip>
-          <a:srcRect r="62500"/>
-          <a:stretch/>
-        </p:blipFill>
-        <p:spPr>
-          <a:xfrm>
-            <a:off x="172497" y="-110435"/>
-            <a:ext cx="914400" cy="1251712"/>
-          </a:xfrm>
-          <a:prstGeom prst="rect">
-            <a:avLst/>
-          </a:prstGeom>
-        </p:spPr>
-      </p:pic>
-      <p:pic>
-        <p:nvPicPr>
-          <p:cNvPr id="7" name="Picture 6">
-            <a:extLst>
-              <a:ext uri="{FF2B5EF4-FFF2-40B4-BE49-F238E27FC236}">
-                <a16:creationId xmlns:a16="http://schemas.microsoft.com/office/drawing/2014/main" id="{C71818C1-C601-47B1-836C-F036733B9814}"/>
-              </a:ext>
-            </a:extLst>
-          </p:cNvPr>
-          <p:cNvPicPr>
-            <a:picLocks noChangeAspect="1"/>
-          </p:cNvPicPr>
-          <p:nvPr/>
-        </p:nvPicPr>
-        <p:blipFill>
-          <a:blip r:embed="rId3">
-            <a:extLst>
-              <a:ext uri="{28A0092B-C50C-407E-A947-70E740481C1C}">
-                <a14:useLocalDpi xmlns:a14="http://schemas.microsoft.com/office/drawing/2010/main" val="0"/>
-              </a:ext>
-            </a:extLst>
-          </a:blip>
-          <a:stretch>
-            <a:fillRect/>
-          </a:stretch>
-        </p:blipFill>
-        <p:spPr>
-          <a:xfrm>
-            <a:off x="2491274" y="1263702"/>
-            <a:ext cx="7499751" cy="5330759"/>
-          </a:xfrm>
-          <a:prstGeom prst="rect">
-            <a:avLst/>
-          </a:prstGeom>
-        </p:spPr>
-      </p:pic>
-      <p:grpSp>
-        <p:nvGrpSpPr>
-          <p:cNvPr id="10" name="Group 9">
-            <a:extLst>
-              <a:ext uri="{FF2B5EF4-FFF2-40B4-BE49-F238E27FC236}">
-                <a16:creationId xmlns:a16="http://schemas.microsoft.com/office/drawing/2014/main" id="{58A8AF2F-B974-4491-91CE-6F2028BFACCD}"/>
-              </a:ext>
-            </a:extLst>
-          </p:cNvPr>
-          <p:cNvGrpSpPr/>
-          <p:nvPr/>
-        </p:nvGrpSpPr>
-        <p:grpSpPr>
-          <a:xfrm>
-            <a:off x="2" y="2"/>
-            <a:ext cx="12191999" cy="948335"/>
-            <a:chOff x="0" y="0"/>
-            <a:chExt cx="12192000" cy="948335"/>
-          </a:xfrm>
-          <a:solidFill>
-            <a:schemeClr val="accent1"/>
-          </a:solidFill>
-        </p:grpSpPr>
-        <p:sp>
-          <p:nvSpPr>
-            <p:cNvPr id="11" name="Rectangle 10">
-              <a:extLst>
-                <a:ext uri="{FF2B5EF4-FFF2-40B4-BE49-F238E27FC236}">
-                  <a16:creationId xmlns:a16="http://schemas.microsoft.com/office/drawing/2014/main" id="{049BDDA0-374D-4DE8-9E4C-A21ED7C8652D}"/>
-                </a:ext>
-              </a:extLst>
-            </p:cNvPr>
-            <p:cNvSpPr/>
-            <p:nvPr/>
-          </p:nvSpPr>
-          <p:spPr>
-            <a:xfrm>
-              <a:off x="0" y="0"/>
-              <a:ext cx="12192000" cy="948335"/>
-            </a:xfrm>
-            <a:prstGeom prst="rect">
-              <a:avLst/>
-            </a:prstGeom>
-            <a:grpFill/>
-            <a:ln>
-              <a:noFill/>
-            </a:ln>
-          </p:spPr>
-          <p:style>
-            <a:lnRef idx="2">
-              <a:schemeClr val="accent1">
-                <a:shade val="50000"/>
-              </a:schemeClr>
-            </a:lnRef>
-            <a:fillRef idx="1">
-              <a:schemeClr val="accent1"/>
-            </a:fillRef>
-            <a:effectRef idx="0">
-              <a:schemeClr val="accent1"/>
-            </a:effectRef>
-            <a:fontRef idx="minor">
-              <a:schemeClr val="lt1"/>
-            </a:fontRef>
-          </p:style>
-          <p:txBody>
-            <a:bodyPr rtlCol="0" anchor="ctr"/>
-            <a:lstStyle/>
-            <a:p>
-              <a:pPr algn="ctr"/>
-              <a:endParaRPr lang="en-US" sz="1225" dirty="0"/>
-            </a:p>
-          </p:txBody>
-        </p:sp>
-        <p:sp>
-          <p:nvSpPr>
-            <p:cNvPr id="12" name="TextBox 11">
-              <a:extLst>
-                <a:ext uri="{FF2B5EF4-FFF2-40B4-BE49-F238E27FC236}">
-                  <a16:creationId xmlns:a16="http://schemas.microsoft.com/office/drawing/2014/main" id="{329B3816-A639-4692-9BC7-1BAA8E40C57D}"/>
-                </a:ext>
-              </a:extLst>
-            </p:cNvPr>
-            <p:cNvSpPr txBox="1"/>
-            <p:nvPr/>
-          </p:nvSpPr>
-          <p:spPr>
-            <a:xfrm>
-              <a:off x="10972800" y="289501"/>
-              <a:ext cx="900953" cy="280846"/>
-            </a:xfrm>
-            <a:prstGeom prst="rect">
-              <a:avLst/>
-            </a:prstGeom>
-            <a:grpFill/>
-            <a:ln>
-              <a:noFill/>
-            </a:ln>
-          </p:spPr>
-          <p:txBody>
-            <a:bodyPr wrap="square" rtlCol="0">
-              <a:spAutoFit/>
-            </a:bodyPr>
-            <a:lstStyle/>
-            <a:p>
-              <a:endParaRPr lang="en-US" sz="1225" dirty="0">
-                <a:solidFill>
-                  <a:schemeClr val="bg1"/>
-                </a:solidFill>
-              </a:endParaRPr>
-            </a:p>
-          </p:txBody>
-        </p:sp>
-        <p:sp>
-          <p:nvSpPr>
-            <p:cNvPr id="14" name="TextBox 13">
-              <a:extLst>
-                <a:ext uri="{FF2B5EF4-FFF2-40B4-BE49-F238E27FC236}">
-                  <a16:creationId xmlns:a16="http://schemas.microsoft.com/office/drawing/2014/main" id="{D6424EF1-A4E5-4F24-BD9A-DB2F01928066}"/>
-                </a:ext>
-              </a:extLst>
-            </p:cNvPr>
-            <p:cNvSpPr txBox="1"/>
-            <p:nvPr/>
-          </p:nvSpPr>
-          <p:spPr>
-            <a:xfrm>
-              <a:off x="501407" y="315365"/>
-              <a:ext cx="8089074" cy="400110"/>
-            </a:xfrm>
-            <a:prstGeom prst="rect">
-              <a:avLst/>
-            </a:prstGeom>
-            <a:grpFill/>
-            <a:ln>
-              <a:noFill/>
-            </a:ln>
-          </p:spPr>
-          <p:txBody>
-            <a:bodyPr wrap="square" rtlCol="0">
-              <a:spAutoFit/>
-            </a:bodyPr>
-            <a:lstStyle/>
-            <a:p>
-              <a:r>
-                <a:rPr lang="en-US" sz="2000" dirty="0">
-                  <a:solidFill>
-                    <a:schemeClr val="bg1"/>
-                  </a:solidFill>
-                </a:rPr>
-                <a:t>MFA &gt; Web Components &gt; Shadow DOM &gt; Hands-on</a:t>
-              </a:r>
-            </a:p>
-          </p:txBody>
-        </p:sp>
-      </p:grpSp>
-    </p:spTree>
-    <p:extLst>
-      <p:ext uri="{BB962C8B-B14F-4D97-AF65-F5344CB8AC3E}">
-        <p14:creationId xmlns:p14="http://schemas.microsoft.com/office/powerpoint/2010/main" val="1047363111"/>
-      </p:ext>
-    </p:extLst>
-  </p:cSld>
-  <p:clrMapOvr>
-    <a:masterClrMapping/>
-  </p:clrMapOvr>
-</p:sld>
-</file>
-
-<file path=ppt/slides/slide23.xml><?xml version="1.0" encoding="utf-8"?>
-<p:sld xmlns:a="http://schemas.openxmlformats.org/drawingml/2006/main" xmlns:r="http://schemas.openxmlformats.org/officeDocument/2006/relationships" xmlns:p="http://schemas.openxmlformats.org/presentationml/2006/main">
-  <p:cSld>
-    <p:spTree>
-      <p:nvGrpSpPr>
-        <p:cNvPr id="1" name=""/>
-        <p:cNvGrpSpPr/>
-        <p:nvPr/>
-      </p:nvGrpSpPr>
-      <p:grpSpPr>
-        <a:xfrm>
-          <a:off x="0" y="0"/>
-          <a:ext cx="0" cy="0"/>
-          <a:chOff x="0" y="0"/>
-          <a:chExt cx="0" cy="0"/>
-        </a:xfrm>
-      </p:grpSpPr>
-      <p:pic>
-        <p:nvPicPr>
-          <p:cNvPr id="9" name="Picture 8">
-            <a:extLst>
-              <a:ext uri="{FF2B5EF4-FFF2-40B4-BE49-F238E27FC236}">
-                <a16:creationId xmlns:a16="http://schemas.microsoft.com/office/drawing/2014/main" id="{47FF90BC-4EA9-4433-8469-620BF496C336}"/>
-              </a:ext>
-            </a:extLst>
-          </p:cNvPr>
-          <p:cNvPicPr>
-            <a:picLocks noChangeAspect="1"/>
-          </p:cNvPicPr>
-          <p:nvPr/>
-        </p:nvPicPr>
-        <p:blipFill rotWithShape="1">
-          <a:blip r:embed="rId2">
-            <a:extLst>
-              <a:ext uri="{28A0092B-C50C-407E-A947-70E740481C1C}">
-                <a14:useLocalDpi xmlns:a14="http://schemas.microsoft.com/office/drawing/2010/main" val="0"/>
-              </a:ext>
-            </a:extLst>
-          </a:blip>
-          <a:srcRect r="62500"/>
-          <a:stretch/>
-        </p:blipFill>
-        <p:spPr>
-          <a:xfrm>
-            <a:off x="172497" y="-110435"/>
-            <a:ext cx="914400" cy="1251712"/>
-          </a:xfrm>
-          <a:prstGeom prst="rect">
-            <a:avLst/>
-          </a:prstGeom>
-        </p:spPr>
-      </p:pic>
-      <p:grpSp>
-        <p:nvGrpSpPr>
-          <p:cNvPr id="10" name="Group 9">
-            <a:extLst>
-              <a:ext uri="{FF2B5EF4-FFF2-40B4-BE49-F238E27FC236}">
-                <a16:creationId xmlns:a16="http://schemas.microsoft.com/office/drawing/2014/main" id="{58A8AF2F-B974-4491-91CE-6F2028BFACCD}"/>
-              </a:ext>
-            </a:extLst>
-          </p:cNvPr>
-          <p:cNvGrpSpPr/>
-          <p:nvPr/>
-        </p:nvGrpSpPr>
-        <p:grpSpPr>
-          <a:xfrm>
-            <a:off x="2" y="2"/>
-            <a:ext cx="12191999" cy="948335"/>
-            <a:chOff x="0" y="0"/>
-            <a:chExt cx="12192000" cy="948335"/>
-          </a:xfrm>
-          <a:solidFill>
-            <a:schemeClr val="accent1"/>
-          </a:solidFill>
-        </p:grpSpPr>
-        <p:sp>
-          <p:nvSpPr>
-            <p:cNvPr id="11" name="Rectangle 10">
-              <a:extLst>
-                <a:ext uri="{FF2B5EF4-FFF2-40B4-BE49-F238E27FC236}">
-                  <a16:creationId xmlns:a16="http://schemas.microsoft.com/office/drawing/2014/main" id="{049BDDA0-374D-4DE8-9E4C-A21ED7C8652D}"/>
-                </a:ext>
-              </a:extLst>
-            </p:cNvPr>
-            <p:cNvSpPr/>
-            <p:nvPr/>
-          </p:nvSpPr>
-          <p:spPr>
-            <a:xfrm>
-              <a:off x="0" y="0"/>
-              <a:ext cx="12192000" cy="948335"/>
-            </a:xfrm>
-            <a:prstGeom prst="rect">
-              <a:avLst/>
-            </a:prstGeom>
-            <a:grpFill/>
-            <a:ln>
-              <a:noFill/>
-            </a:ln>
-          </p:spPr>
-          <p:style>
-            <a:lnRef idx="2">
-              <a:schemeClr val="accent1">
-                <a:shade val="50000"/>
-              </a:schemeClr>
-            </a:lnRef>
-            <a:fillRef idx="1">
-              <a:schemeClr val="accent1"/>
-            </a:fillRef>
-            <a:effectRef idx="0">
-              <a:schemeClr val="accent1"/>
-            </a:effectRef>
-            <a:fontRef idx="minor">
-              <a:schemeClr val="lt1"/>
-            </a:fontRef>
-          </p:style>
-          <p:txBody>
-            <a:bodyPr rtlCol="0" anchor="ctr"/>
-            <a:lstStyle/>
-            <a:p>
-              <a:pPr algn="ctr"/>
-              <a:endParaRPr lang="en-US" sz="1225" dirty="0"/>
-            </a:p>
-          </p:txBody>
-        </p:sp>
-        <p:sp>
-          <p:nvSpPr>
-            <p:cNvPr id="12" name="TextBox 11">
-              <a:extLst>
-                <a:ext uri="{FF2B5EF4-FFF2-40B4-BE49-F238E27FC236}">
-                  <a16:creationId xmlns:a16="http://schemas.microsoft.com/office/drawing/2014/main" id="{329B3816-A639-4692-9BC7-1BAA8E40C57D}"/>
-                </a:ext>
-              </a:extLst>
-            </p:cNvPr>
-            <p:cNvSpPr txBox="1"/>
-            <p:nvPr/>
-          </p:nvSpPr>
-          <p:spPr>
-            <a:xfrm>
-              <a:off x="10972800" y="289501"/>
-              <a:ext cx="900953" cy="280846"/>
-            </a:xfrm>
-            <a:prstGeom prst="rect">
-              <a:avLst/>
-            </a:prstGeom>
-            <a:grpFill/>
-            <a:ln>
-              <a:noFill/>
-            </a:ln>
-          </p:spPr>
-          <p:txBody>
-            <a:bodyPr wrap="square" rtlCol="0">
-              <a:spAutoFit/>
-            </a:bodyPr>
-            <a:lstStyle/>
-            <a:p>
-              <a:endParaRPr lang="en-US" sz="1225" dirty="0">
-                <a:solidFill>
-                  <a:schemeClr val="bg1"/>
-                </a:solidFill>
-              </a:endParaRPr>
-            </a:p>
-          </p:txBody>
-        </p:sp>
-        <p:sp>
-          <p:nvSpPr>
-            <p:cNvPr id="14" name="TextBox 13">
-              <a:extLst>
-                <a:ext uri="{FF2B5EF4-FFF2-40B4-BE49-F238E27FC236}">
-                  <a16:creationId xmlns:a16="http://schemas.microsoft.com/office/drawing/2014/main" id="{D6424EF1-A4E5-4F24-BD9A-DB2F01928066}"/>
-                </a:ext>
-              </a:extLst>
-            </p:cNvPr>
-            <p:cNvSpPr txBox="1"/>
-            <p:nvPr/>
-          </p:nvSpPr>
-          <p:spPr>
-            <a:xfrm>
-              <a:off x="501407" y="315365"/>
-              <a:ext cx="8089074" cy="400110"/>
-            </a:xfrm>
-            <a:prstGeom prst="rect">
-              <a:avLst/>
-            </a:prstGeom>
-            <a:grpFill/>
-            <a:ln>
-              <a:noFill/>
-            </a:ln>
-          </p:spPr>
-          <p:txBody>
-            <a:bodyPr wrap="square" rtlCol="0">
-              <a:spAutoFit/>
-            </a:bodyPr>
-            <a:lstStyle/>
-            <a:p>
-              <a:r>
-                <a:rPr lang="en-US" sz="2000" dirty="0">
-                  <a:solidFill>
-                    <a:schemeClr val="bg1"/>
-                  </a:solidFill>
-                </a:rPr>
-                <a:t>MFA &gt; Web Components &gt; Shadow DOM &gt; Hands-on</a:t>
-              </a:r>
-            </a:p>
-          </p:txBody>
-        </p:sp>
-      </p:grpSp>
-      <p:pic>
-        <p:nvPicPr>
-          <p:cNvPr id="7" name="Picture 6">
-            <a:extLst>
-              <a:ext uri="{FF2B5EF4-FFF2-40B4-BE49-F238E27FC236}">
-                <a16:creationId xmlns:a16="http://schemas.microsoft.com/office/drawing/2014/main" id="{16A31FFF-3A7B-41B6-B4DD-5F42A07A245D}"/>
-              </a:ext>
-            </a:extLst>
-          </p:cNvPr>
-          <p:cNvPicPr>
-            <a:picLocks noChangeAspect="1"/>
-          </p:cNvPicPr>
-          <p:nvPr/>
-        </p:nvPicPr>
-        <p:blipFill>
-          <a:blip r:embed="rId3">
-            <a:extLst>
-              <a:ext uri="{28A0092B-C50C-407E-A947-70E740481C1C}">
-                <a14:useLocalDpi xmlns:a14="http://schemas.microsoft.com/office/drawing/2010/main" val="0"/>
-              </a:ext>
-            </a:extLst>
-          </a:blip>
-          <a:stretch>
-            <a:fillRect/>
-          </a:stretch>
-        </p:blipFill>
-        <p:spPr>
-          <a:xfrm>
-            <a:off x="2072920" y="1340019"/>
-            <a:ext cx="8046161" cy="4578349"/>
-          </a:xfrm>
-          <a:prstGeom prst="rect">
-            <a:avLst/>
-          </a:prstGeom>
-        </p:spPr>
-      </p:pic>
-    </p:spTree>
-    <p:extLst>
-      <p:ext uri="{BB962C8B-B14F-4D97-AF65-F5344CB8AC3E}">
-        <p14:creationId xmlns:p14="http://schemas.microsoft.com/office/powerpoint/2010/main" val="4042155357"/>
-      </p:ext>
-    </p:extLst>
-  </p:cSld>
-  <p:clrMapOvr>
-    <a:masterClrMapping/>
-  </p:clrMapOvr>
-</p:sld>
-</file>
-
-<file path=ppt/slides/slide24.xml><?xml version="1.0" encoding="utf-8"?>
-<p:sld xmlns:a="http://schemas.openxmlformats.org/drawingml/2006/main" xmlns:r="http://schemas.openxmlformats.org/officeDocument/2006/relationships" xmlns:p="http://schemas.openxmlformats.org/presentationml/2006/main">
-  <p:cSld>
-    <p:spTree>
-      <p:nvGrpSpPr>
-        <p:cNvPr id="1" name=""/>
-        <p:cNvGrpSpPr/>
-        <p:nvPr/>
-      </p:nvGrpSpPr>
-      <p:grpSpPr>
-        <a:xfrm>
-          <a:off x="0" y="0"/>
-          <a:ext cx="0" cy="0"/>
-          <a:chOff x="0" y="0"/>
-          <a:chExt cx="0" cy="0"/>
-        </a:xfrm>
-      </p:grpSpPr>
-      <p:pic>
-        <p:nvPicPr>
-          <p:cNvPr id="9" name="Picture 8">
-            <a:extLst>
-              <a:ext uri="{FF2B5EF4-FFF2-40B4-BE49-F238E27FC236}">
-                <a16:creationId xmlns:a16="http://schemas.microsoft.com/office/drawing/2014/main" id="{47FF90BC-4EA9-4433-8469-620BF496C336}"/>
-              </a:ext>
-            </a:extLst>
-          </p:cNvPr>
-          <p:cNvPicPr>
-            <a:picLocks noChangeAspect="1"/>
-          </p:cNvPicPr>
-          <p:nvPr/>
-        </p:nvPicPr>
-        <p:blipFill rotWithShape="1">
-          <a:blip r:embed="rId2">
-            <a:extLst>
-              <a:ext uri="{28A0092B-C50C-407E-A947-70E740481C1C}">
-                <a14:useLocalDpi xmlns:a14="http://schemas.microsoft.com/office/drawing/2010/main" val="0"/>
-              </a:ext>
-            </a:extLst>
-          </a:blip>
-          <a:srcRect r="62500"/>
-          <a:stretch/>
-        </p:blipFill>
-        <p:spPr>
-          <a:xfrm>
-            <a:off x="172497" y="-110435"/>
-            <a:ext cx="914400" cy="1251712"/>
-          </a:xfrm>
-          <a:prstGeom prst="rect">
-            <a:avLst/>
-          </a:prstGeom>
-        </p:spPr>
-      </p:pic>
-      <p:grpSp>
-        <p:nvGrpSpPr>
           <p:cNvPr id="11" name="Group 10">
             <a:extLst>
               <a:ext uri="{FF2B5EF4-FFF2-40B4-BE49-F238E27FC236}">
@@ -25070,7 +24042,7 @@
 </p:sld>
 </file>
 
-<file path=ppt/slides/slide25.xml><?xml version="1.0" encoding="utf-8"?>
+<file path=ppt/slides/slide21.xml><?xml version="1.0" encoding="utf-8"?>
 <p:sld xmlns:a="http://schemas.openxmlformats.org/drawingml/2006/main" xmlns:r="http://schemas.openxmlformats.org/officeDocument/2006/relationships" xmlns:p="http://schemas.openxmlformats.org/presentationml/2006/main">
   <p:cSld>
     <p:spTree>
@@ -25342,7 +24314,7 @@
 </p:sld>
 </file>
 
-<file path=ppt/slides/slide26.xml><?xml version="1.0" encoding="utf-8"?>
+<file path=ppt/slides/slide22.xml><?xml version="1.0" encoding="utf-8"?>
 <p:sld xmlns:a="http://schemas.openxmlformats.org/drawingml/2006/main" xmlns:r="http://schemas.openxmlformats.org/officeDocument/2006/relationships" xmlns:p="http://schemas.openxmlformats.org/presentationml/2006/main">
   <p:cSld>
     <p:spTree>
@@ -26016,7 +24988,7 @@
 </p:sld>
 </file>
 
-<file path=ppt/slides/slide27.xml><?xml version="1.0" encoding="utf-8"?>
+<file path=ppt/slides/slide23.xml><?xml version="1.0" encoding="utf-8"?>
 <p:sld xmlns:a="http://schemas.openxmlformats.org/drawingml/2006/main" xmlns:r="http://schemas.openxmlformats.org/officeDocument/2006/relationships" xmlns:p="http://schemas.openxmlformats.org/presentationml/2006/main">
   <p:cSld>
     <p:spTree>
@@ -26272,7 +25244,7 @@
 </p:sld>
 </file>
 
-<file path=ppt/slides/slide28.xml><?xml version="1.0" encoding="utf-8"?>
+<file path=ppt/slides/slide24.xml><?xml version="1.0" encoding="utf-8"?>
 <p:sld xmlns:a="http://schemas.openxmlformats.org/drawingml/2006/main" xmlns:r="http://schemas.openxmlformats.org/officeDocument/2006/relationships" xmlns:p="http://schemas.openxmlformats.org/presentationml/2006/main">
   <p:cSld>
     <p:spTree>
@@ -29311,18 +28283,18 @@
 </file>
 
 <file path=customXml/item1.xml><?xml version="1.0" encoding="utf-8"?>
+<p:properties xmlns:p="http://schemas.microsoft.com/office/2006/metadata/properties" xmlns:xsi="http://www.w3.org/2001/XMLSchema-instance" xmlns:pc="http://schemas.microsoft.com/office/infopath/2007/PartnerControls">
+  <documentManagement/>
+</p:properties>
+</file>
+
+<file path=customXml/item2.xml><?xml version="1.0" encoding="utf-8"?>
 <?mso-contentType ?>
 <FormTemplates xmlns="http://schemas.microsoft.com/sharepoint/v3/contenttype/forms">
   <Display>DocumentLibraryForm</Display>
   <Edit>DocumentLibraryForm</Edit>
   <New>DocumentLibraryForm</New>
 </FormTemplates>
-</file>
-
-<file path=customXml/item2.xml><?xml version="1.0" encoding="utf-8"?>
-<p:properties xmlns:p="http://schemas.microsoft.com/office/2006/metadata/properties" xmlns:xsi="http://www.w3.org/2001/XMLSchema-instance" xmlns:pc="http://schemas.microsoft.com/office/infopath/2007/PartnerControls">
-  <documentManagement/>
-</p:properties>
 </file>
 
 <file path=customXml/item3.xml><?xml version="1.0" encoding="utf-8"?>
@@ -29511,18 +28483,18 @@
 </file>
 
 <file path=customXml/itemProps1.xml><?xml version="1.0" encoding="utf-8"?>
-<ds:datastoreItem xmlns:ds="http://schemas.openxmlformats.org/officeDocument/2006/customXml" ds:itemID="{4273EE10-C1B2-449B-9085-39965BA21A56}">
+<ds:datastoreItem xmlns:ds="http://schemas.openxmlformats.org/officeDocument/2006/customXml" ds:itemID="{B61EE2CA-DCC7-45E5-87C8-6789A166AF77}">
   <ds:schemaRefs>
-    <ds:schemaRef ds:uri="http://schemas.microsoft.com/sharepoint/v3/contenttype/forms"/>
+    <ds:schemaRef ds:uri="http://schemas.microsoft.com/office/2006/metadata/properties"/>
+    <ds:schemaRef ds:uri="http://schemas.microsoft.com/office/infopath/2007/PartnerControls"/>
   </ds:schemaRefs>
 </ds:datastoreItem>
 </file>
 
 <file path=customXml/itemProps2.xml><?xml version="1.0" encoding="utf-8"?>
-<ds:datastoreItem xmlns:ds="http://schemas.openxmlformats.org/officeDocument/2006/customXml" ds:itemID="{B61EE2CA-DCC7-45E5-87C8-6789A166AF77}">
+<ds:datastoreItem xmlns:ds="http://schemas.openxmlformats.org/officeDocument/2006/customXml" ds:itemID="{4273EE10-C1B2-449B-9085-39965BA21A56}">
   <ds:schemaRefs>
-    <ds:schemaRef ds:uri="http://schemas.microsoft.com/office/2006/metadata/properties"/>
-    <ds:schemaRef ds:uri="http://schemas.microsoft.com/office/infopath/2007/PartnerControls"/>
+    <ds:schemaRef ds:uri="http://schemas.microsoft.com/sharepoint/v3/contenttype/forms"/>
   </ds:schemaRefs>
 </ds:datastoreItem>
 </file>

</xml_diff>

<commit_message>
=Changed event handlers to fit customElements.define API. Added feedback slide to ppt.
</commit_message>
<xml_diff>
--- a/workshops/micro-frontend-architecture-deep-dive/micro_frontend_architecture_deep_dive.pptx
+++ b/workshops/micro-frontend-architecture-deep-dive/micro_frontend_architecture_deep_dive.pptx
@@ -5,10 +5,10 @@
     <p:sldMasterId id="2147483648" r:id="rId4"/>
   </p:sldMasterIdLst>
   <p:notesMasterIdLst>
-    <p:notesMasterId r:id="rId29"/>
+    <p:notesMasterId r:id="rId30"/>
   </p:notesMasterIdLst>
   <p:handoutMasterIdLst>
-    <p:handoutMasterId r:id="rId30"/>
+    <p:handoutMasterId r:id="rId31"/>
   </p:handoutMasterIdLst>
   <p:sldIdLst>
     <p:sldId id="372" r:id="rId5"/>
@@ -34,31 +34,32 @@
     <p:sldId id="477" r:id="rId25"/>
     <p:sldId id="478" r:id="rId26"/>
     <p:sldId id="464" r:id="rId27"/>
-    <p:sldId id="476" r:id="rId28"/>
+    <p:sldId id="479" r:id="rId28"/>
+    <p:sldId id="476" r:id="rId29"/>
   </p:sldIdLst>
   <p:sldSz cx="12192000" cy="6858000"/>
   <p:notesSz cx="6858000" cy="9144000"/>
   <p:embeddedFontLst>
     <p:embeddedFont>
       <p:font typeface="Calibri" panose="020F0502020204030204" pitchFamily="34" charset="0"/>
-      <p:regular r:id="rId31"/>
-      <p:bold r:id="rId32"/>
-      <p:italic r:id="rId33"/>
-      <p:boldItalic r:id="rId34"/>
+      <p:regular r:id="rId32"/>
+      <p:bold r:id="rId33"/>
+      <p:italic r:id="rId34"/>
+      <p:boldItalic r:id="rId35"/>
     </p:embeddedFont>
     <p:embeddedFont>
       <p:font typeface="DFDS" panose="020B0604020202020204" charset="0"/>
-      <p:regular r:id="rId35"/>
-      <p:bold r:id="rId36"/>
-      <p:italic r:id="rId37"/>
+      <p:regular r:id="rId36"/>
+      <p:bold r:id="rId37"/>
+      <p:italic r:id="rId38"/>
     </p:embeddedFont>
     <p:embeddedFont>
       <p:font typeface="DFDS Bold" panose="020B0604020202020204" charset="0"/>
-      <p:bold r:id="rId38"/>
+      <p:bold r:id="rId39"/>
     </p:embeddedFont>
     <p:embeddedFont>
       <p:font typeface="DFDS Light" panose="020B0604020202020204" charset="0"/>
-      <p:regular r:id="rId39"/>
+      <p:regular r:id="rId40"/>
     </p:embeddedFont>
   </p:embeddedFontLst>
   <p:defaultTextStyle>
@@ -25445,6 +25446,260 @@
                     <a:schemeClr val="bg1"/>
                   </a:solidFill>
                 </a:rPr>
+                <a:t>MFA &gt; Feedback… Thx!!!</a:t>
+              </a:r>
+            </a:p>
+          </p:txBody>
+        </p:sp>
+      </p:grpSp>
+      <p:sp>
+        <p:nvSpPr>
+          <p:cNvPr id="2" name="Rectangle 1">
+            <a:extLst>
+              <a:ext uri="{FF2B5EF4-FFF2-40B4-BE49-F238E27FC236}">
+                <a16:creationId xmlns:a16="http://schemas.microsoft.com/office/drawing/2014/main" id="{3628E48B-4CAB-47B0-98B4-B6732F7224BD}"/>
+              </a:ext>
+            </a:extLst>
+          </p:cNvPr>
+          <p:cNvSpPr/>
+          <p:nvPr/>
+        </p:nvSpPr>
+        <p:spPr>
+          <a:xfrm>
+            <a:off x="549211" y="3185720"/>
+            <a:ext cx="11093578" cy="830997"/>
+          </a:xfrm>
+          <a:prstGeom prst="rect">
+            <a:avLst/>
+          </a:prstGeom>
+        </p:spPr>
+        <p:txBody>
+          <a:bodyPr wrap="square">
+            <a:spAutoFit/>
+          </a:bodyPr>
+          <a:lstStyle/>
+          <a:p>
+            <a:r>
+              <a:rPr lang="da-DK" sz="4800" dirty="0"/>
+              <a:t>https://airtable.com/shrDUlkEelfraVzON</a:t>
+            </a:r>
+          </a:p>
+        </p:txBody>
+      </p:sp>
+    </p:spTree>
+    <p:extLst>
+      <p:ext uri="{BB962C8B-B14F-4D97-AF65-F5344CB8AC3E}">
+        <p14:creationId xmlns:p14="http://schemas.microsoft.com/office/powerpoint/2010/main" val="1151304650"/>
+      </p:ext>
+    </p:extLst>
+  </p:cSld>
+  <p:clrMapOvr>
+    <a:masterClrMapping/>
+  </p:clrMapOvr>
+</p:sld>
+</file>
+
+<file path=ppt/slides/slide25.xml><?xml version="1.0" encoding="utf-8"?>
+<p:sld xmlns:a="http://schemas.openxmlformats.org/drawingml/2006/main" xmlns:r="http://schemas.openxmlformats.org/officeDocument/2006/relationships" xmlns:p="http://schemas.openxmlformats.org/presentationml/2006/main">
+  <p:cSld>
+    <p:spTree>
+      <p:nvGrpSpPr>
+        <p:cNvPr id="1" name=""/>
+        <p:cNvGrpSpPr/>
+        <p:nvPr/>
+      </p:nvGrpSpPr>
+      <p:grpSpPr>
+        <a:xfrm>
+          <a:off x="0" y="0"/>
+          <a:ext cx="0" cy="0"/>
+          <a:chOff x="0" y="0"/>
+          <a:chExt cx="0" cy="0"/>
+        </a:xfrm>
+      </p:grpSpPr>
+      <p:pic>
+        <p:nvPicPr>
+          <p:cNvPr id="9" name="Picture 8">
+            <a:extLst>
+              <a:ext uri="{FF2B5EF4-FFF2-40B4-BE49-F238E27FC236}">
+                <a16:creationId xmlns:a16="http://schemas.microsoft.com/office/drawing/2014/main" id="{47FF90BC-4EA9-4433-8469-620BF496C336}"/>
+              </a:ext>
+            </a:extLst>
+          </p:cNvPr>
+          <p:cNvPicPr>
+            <a:picLocks noChangeAspect="1"/>
+          </p:cNvPicPr>
+          <p:nvPr/>
+        </p:nvPicPr>
+        <p:blipFill rotWithShape="1">
+          <a:blip r:embed="rId2">
+            <a:extLst>
+              <a:ext uri="{28A0092B-C50C-407E-A947-70E740481C1C}">
+                <a14:useLocalDpi xmlns:a14="http://schemas.microsoft.com/office/drawing/2010/main" val="0"/>
+              </a:ext>
+            </a:extLst>
+          </a:blip>
+          <a:srcRect r="62500"/>
+          <a:stretch/>
+        </p:blipFill>
+        <p:spPr>
+          <a:xfrm>
+            <a:off x="172497" y="-110435"/>
+            <a:ext cx="914400" cy="1251712"/>
+          </a:xfrm>
+          <a:prstGeom prst="rect">
+            <a:avLst/>
+          </a:prstGeom>
+        </p:spPr>
+      </p:pic>
+      <p:grpSp>
+        <p:nvGrpSpPr>
+          <p:cNvPr id="11" name="Group 10">
+            <a:extLst>
+              <a:ext uri="{FF2B5EF4-FFF2-40B4-BE49-F238E27FC236}">
+                <a16:creationId xmlns:a16="http://schemas.microsoft.com/office/drawing/2014/main" id="{DD079491-4CFE-4DD7-B6D2-C8936BCC7016}"/>
+              </a:ext>
+            </a:extLst>
+          </p:cNvPr>
+          <p:cNvGrpSpPr/>
+          <p:nvPr/>
+        </p:nvGrpSpPr>
+        <p:grpSpPr>
+          <a:xfrm>
+            <a:off x="2" y="2"/>
+            <a:ext cx="12191999" cy="948335"/>
+            <a:chOff x="0" y="0"/>
+            <a:chExt cx="12192000" cy="948335"/>
+          </a:xfrm>
+          <a:solidFill>
+            <a:schemeClr val="accent1"/>
+          </a:solidFill>
+        </p:grpSpPr>
+        <p:sp>
+          <p:nvSpPr>
+            <p:cNvPr id="12" name="Rectangle 11">
+              <a:extLst>
+                <a:ext uri="{FF2B5EF4-FFF2-40B4-BE49-F238E27FC236}">
+                  <a16:creationId xmlns:a16="http://schemas.microsoft.com/office/drawing/2014/main" id="{38F50DF5-3E15-4160-BD8A-2C5CC28B5365}"/>
+                </a:ext>
+              </a:extLst>
+            </p:cNvPr>
+            <p:cNvSpPr/>
+            <p:nvPr/>
+          </p:nvSpPr>
+          <p:spPr>
+            <a:xfrm>
+              <a:off x="0" y="0"/>
+              <a:ext cx="12192000" cy="948335"/>
+            </a:xfrm>
+            <a:prstGeom prst="rect">
+              <a:avLst/>
+            </a:prstGeom>
+            <a:grpFill/>
+            <a:ln>
+              <a:noFill/>
+            </a:ln>
+          </p:spPr>
+          <p:style>
+            <a:lnRef idx="2">
+              <a:schemeClr val="accent1">
+                <a:shade val="50000"/>
+              </a:schemeClr>
+            </a:lnRef>
+            <a:fillRef idx="1">
+              <a:schemeClr val="accent1"/>
+            </a:fillRef>
+            <a:effectRef idx="0">
+              <a:schemeClr val="accent1"/>
+            </a:effectRef>
+            <a:fontRef idx="minor">
+              <a:schemeClr val="lt1"/>
+            </a:fontRef>
+          </p:style>
+          <p:txBody>
+            <a:bodyPr rtlCol="0" anchor="ctr"/>
+            <a:lstStyle/>
+            <a:p>
+              <a:pPr algn="ctr"/>
+              <a:endParaRPr lang="en-US" sz="1225" dirty="0"/>
+            </a:p>
+          </p:txBody>
+        </p:sp>
+        <p:sp>
+          <p:nvSpPr>
+            <p:cNvPr id="14" name="TextBox 13">
+              <a:extLst>
+                <a:ext uri="{FF2B5EF4-FFF2-40B4-BE49-F238E27FC236}">
+                  <a16:creationId xmlns:a16="http://schemas.microsoft.com/office/drawing/2014/main" id="{90E6E9D6-2F02-4978-BE13-CD734CC746F0}"/>
+                </a:ext>
+              </a:extLst>
+            </p:cNvPr>
+            <p:cNvSpPr txBox="1"/>
+            <p:nvPr/>
+          </p:nvSpPr>
+          <p:spPr>
+            <a:xfrm>
+              <a:off x="10972800" y="289501"/>
+              <a:ext cx="900953" cy="280846"/>
+            </a:xfrm>
+            <a:prstGeom prst="rect">
+              <a:avLst/>
+            </a:prstGeom>
+            <a:grpFill/>
+            <a:ln>
+              <a:noFill/>
+            </a:ln>
+          </p:spPr>
+          <p:txBody>
+            <a:bodyPr wrap="square" rtlCol="0">
+              <a:spAutoFit/>
+            </a:bodyPr>
+            <a:lstStyle/>
+            <a:p>
+              <a:endParaRPr lang="en-US" sz="1225" dirty="0">
+                <a:solidFill>
+                  <a:schemeClr val="bg1"/>
+                </a:solidFill>
+              </a:endParaRPr>
+            </a:p>
+          </p:txBody>
+        </p:sp>
+        <p:sp>
+          <p:nvSpPr>
+            <p:cNvPr id="15" name="TextBox 14">
+              <a:extLst>
+                <a:ext uri="{FF2B5EF4-FFF2-40B4-BE49-F238E27FC236}">
+                  <a16:creationId xmlns:a16="http://schemas.microsoft.com/office/drawing/2014/main" id="{8075E77A-7111-423B-AE3D-B894A2F5C8FD}"/>
+                </a:ext>
+              </a:extLst>
+            </p:cNvPr>
+            <p:cNvSpPr txBox="1"/>
+            <p:nvPr/>
+          </p:nvSpPr>
+          <p:spPr>
+            <a:xfrm>
+              <a:off x="501407" y="315365"/>
+              <a:ext cx="9906617" cy="400110"/>
+            </a:xfrm>
+            <a:prstGeom prst="rect">
+              <a:avLst/>
+            </a:prstGeom>
+            <a:grpFill/>
+            <a:ln>
+              <a:noFill/>
+            </a:ln>
+          </p:spPr>
+          <p:txBody>
+            <a:bodyPr wrap="square" rtlCol="0">
+              <a:spAutoFit/>
+            </a:bodyPr>
+            <a:lstStyle/>
+            <a:p>
+              <a:r>
+                <a:rPr lang="en-US" sz="2000" dirty="0">
+                  <a:solidFill>
+                    <a:schemeClr val="bg1"/>
+                  </a:solidFill>
+                </a:rPr>
                 <a:t>MFA &gt; Literature</a:t>
               </a:r>
             </a:p>
@@ -28283,18 +28538,18 @@
 </file>
 
 <file path=customXml/item1.xml><?xml version="1.0" encoding="utf-8"?>
-<p:properties xmlns:p="http://schemas.microsoft.com/office/2006/metadata/properties" xmlns:xsi="http://www.w3.org/2001/XMLSchema-instance" xmlns:pc="http://schemas.microsoft.com/office/infopath/2007/PartnerControls">
-  <documentManagement/>
-</p:properties>
-</file>
-
-<file path=customXml/item2.xml><?xml version="1.0" encoding="utf-8"?>
 <?mso-contentType ?>
 <FormTemplates xmlns="http://schemas.microsoft.com/sharepoint/v3/contenttype/forms">
   <Display>DocumentLibraryForm</Display>
   <Edit>DocumentLibraryForm</Edit>
   <New>DocumentLibraryForm</New>
 </FormTemplates>
+</file>
+
+<file path=customXml/item2.xml><?xml version="1.0" encoding="utf-8"?>
+<p:properties xmlns:p="http://schemas.microsoft.com/office/2006/metadata/properties" xmlns:xsi="http://www.w3.org/2001/XMLSchema-instance" xmlns:pc="http://schemas.microsoft.com/office/infopath/2007/PartnerControls">
+  <documentManagement/>
+</p:properties>
 </file>
 
 <file path=customXml/item3.xml><?xml version="1.0" encoding="utf-8"?>
@@ -28483,18 +28738,18 @@
 </file>
 
 <file path=customXml/itemProps1.xml><?xml version="1.0" encoding="utf-8"?>
-<ds:datastoreItem xmlns:ds="http://schemas.openxmlformats.org/officeDocument/2006/customXml" ds:itemID="{B61EE2CA-DCC7-45E5-87C8-6789A166AF77}">
+<ds:datastoreItem xmlns:ds="http://schemas.openxmlformats.org/officeDocument/2006/customXml" ds:itemID="{4273EE10-C1B2-449B-9085-39965BA21A56}">
   <ds:schemaRefs>
-    <ds:schemaRef ds:uri="http://schemas.microsoft.com/office/2006/metadata/properties"/>
-    <ds:schemaRef ds:uri="http://schemas.microsoft.com/office/infopath/2007/PartnerControls"/>
+    <ds:schemaRef ds:uri="http://schemas.microsoft.com/sharepoint/v3/contenttype/forms"/>
   </ds:schemaRefs>
 </ds:datastoreItem>
 </file>
 
 <file path=customXml/itemProps2.xml><?xml version="1.0" encoding="utf-8"?>
-<ds:datastoreItem xmlns:ds="http://schemas.openxmlformats.org/officeDocument/2006/customXml" ds:itemID="{4273EE10-C1B2-449B-9085-39965BA21A56}">
+<ds:datastoreItem xmlns:ds="http://schemas.openxmlformats.org/officeDocument/2006/customXml" ds:itemID="{B61EE2CA-DCC7-45E5-87C8-6789A166AF77}">
   <ds:schemaRefs>
-    <ds:schemaRef ds:uri="http://schemas.microsoft.com/sharepoint/v3/contenttype/forms"/>
+    <ds:schemaRef ds:uri="http://schemas.microsoft.com/office/2006/metadata/properties"/>
+    <ds:schemaRef ds:uri="http://schemas.microsoft.com/office/infopath/2007/PartnerControls"/>
   </ds:schemaRefs>
 </ds:datastoreItem>
 </file>

</xml_diff>

<commit_message>
=finished story boarding git deep dive
</commit_message>
<xml_diff>
--- a/workshops/micro-frontend-architecture-deep-dive/micro_frontend_architecture_deep_dive.pptx
+++ b/workshops/micro-frontend-architecture-deep-dive/micro_frontend_architecture_deep_dive.pptx
@@ -2942,7 +2942,7 @@
           <a:p>
             <a:fld id="{F540F470-726F-426E-889A-8E92A4693460}" type="datetimeFigureOut">
               <a:rPr lang="en-GB" smtClean="0"/>
-              <a:t>29/09/2020</a:t>
+              <a:t>06/10/2020</a:t>
             </a:fld>
             <a:endParaRPr lang="en-GB" dirty="0"/>
           </a:p>
@@ -3112,7 +3112,7 @@
             <a:fld id="{CD72A38B-F9FA-4036-A084-652409E98F08}" type="datetimeFigureOut">
               <a:rPr lang="en-GB" smtClean="0"/>
               <a:pPr/>
-              <a:t>29/09/2020</a:t>
+              <a:t>06/10/2020</a:t>
             </a:fld>
             <a:endParaRPr lang="en-GB" dirty="0"/>
           </a:p>
@@ -4538,7 +4538,7 @@
           <a:p>
             <a:fld id="{CAE15A36-EF7C-49E1-9E28-DC0261021B88}" type="datetime4">
               <a:rPr lang="en-GB" smtClean="0"/>
-              <a:t>29 September 2020</a:t>
+              <a:t>06 October 2020</a:t>
             </a:fld>
             <a:endParaRPr lang="en-GB" dirty="0"/>
           </a:p>
@@ -5041,7 +5041,7 @@
           <a:p>
             <a:fld id="{73A80043-8D1A-4EE7-8835-0FA45918CF0B}" type="datetime4">
               <a:rPr lang="en-GB" smtClean="0"/>
-              <a:t>29 September 2020</a:t>
+              <a:t>06 October 2020</a:t>
             </a:fld>
             <a:endParaRPr lang="en-GB" dirty="0"/>
           </a:p>
@@ -13567,7 +13567,7 @@
           <a:p>
             <a:fld id="{61C39D88-A2D2-46EF-88AA-9A0C8DF2E827}" type="datetime4">
               <a:rPr lang="en-GB" smtClean="0"/>
-              <a:t>29 September 2020</a:t>
+              <a:t>06 October 2020</a:t>
             </a:fld>
             <a:endParaRPr lang="en-GB" dirty="0"/>
           </a:p>
@@ -14954,7 +14954,7 @@
           <a:p>
             <a:fld id="{E66F39FE-A71C-4EA9-B6A2-49D418A61827}" type="datetimeFigureOut">
               <a:rPr lang="en-US" smtClean="0"/>
-              <a:t>9/29/2020</a:t>
+              <a:t>10/6/2020</a:t>
             </a:fld>
             <a:endParaRPr lang="en-US"/>
           </a:p>
@@ -18735,7 +18735,7 @@
           <a:p>
             <a:fld id="{A98DB34D-784C-4D9C-ABD8-61F63F762187}" type="datetime4">
               <a:rPr lang="en-GB" smtClean="0"/>
-              <a:t>29 September 2020</a:t>
+              <a:t>06 October 2020</a:t>
             </a:fld>
             <a:endParaRPr lang="en-GB" dirty="0"/>
           </a:p>
@@ -20684,7 +20684,7 @@
                     <a:schemeClr val="bg1"/>
                   </a:solidFill>
                 </a:rPr>
-                <a:t>MFA &gt; Web Components &gt; Templates &gt; Hands-on</a:t>
+                <a:t>MFA &gt; Web Components &gt; Templates &gt; Code Kata #1</a:t>
               </a:r>
             </a:p>
           </p:txBody>
@@ -21537,7 +21537,7 @@
                     <a:schemeClr val="bg1"/>
                   </a:solidFill>
                 </a:rPr>
-                <a:t>MFA &gt; Web Components &gt; Imports &gt; Hands-on</a:t>
+                <a:t>MFA &gt; Web Components &gt; Imports &gt; Code Kata #2</a:t>
               </a:r>
             </a:p>
           </p:txBody>
@@ -22300,7 +22300,7 @@
                     <a:schemeClr val="bg1"/>
                   </a:solidFill>
                 </a:rPr>
-                <a:t>MFA &gt; Web Components &gt; Custom Elements &gt; Hands-on</a:t>
+                <a:t>MFA &gt; Web Components &gt; Custom Elements &gt; Code Kata #3</a:t>
               </a:r>
             </a:p>
           </p:txBody>
@@ -23190,7 +23190,7 @@
                     <a:schemeClr val="bg1"/>
                   </a:solidFill>
                 </a:rPr>
-                <a:t>MFA &gt; Web Components &gt; Shadow DOM &gt; Hands-on</a:t>
+                <a:t>MFA &gt; Web Components &gt; Shadow DOM &gt; Code Kata #4</a:t>
               </a:r>
             </a:p>
           </p:txBody>
@@ -28538,21 +28538,6 @@
 </file>
 
 <file path=customXml/item1.xml><?xml version="1.0" encoding="utf-8"?>
-<?mso-contentType ?>
-<FormTemplates xmlns="http://schemas.microsoft.com/sharepoint/v3/contenttype/forms">
-  <Display>DocumentLibraryForm</Display>
-  <Edit>DocumentLibraryForm</Edit>
-  <New>DocumentLibraryForm</New>
-</FormTemplates>
-</file>
-
-<file path=customXml/item2.xml><?xml version="1.0" encoding="utf-8"?>
-<p:properties xmlns:p="http://schemas.microsoft.com/office/2006/metadata/properties" xmlns:xsi="http://www.w3.org/2001/XMLSchema-instance" xmlns:pc="http://schemas.microsoft.com/office/infopath/2007/PartnerControls">
-  <documentManagement/>
-</p:properties>
-</file>
-
-<file path=customXml/item3.xml><?xml version="1.0" encoding="utf-8"?>
 <ct:contentTypeSchema xmlns:ct="http://schemas.microsoft.com/office/2006/metadata/contentType" xmlns:ma="http://schemas.microsoft.com/office/2006/metadata/properties/metaAttributes" ct:_="" ma:_="" ma:contentTypeName="Dokument" ma:contentTypeID="0x010100F65BD4264CB9094CA7944F610D2D7DCA" ma:contentTypeVersion="7" ma:contentTypeDescription="Opret et nyt dokument." ma:contentTypeScope="" ma:versionID="285eed63ac2e046b8ebe16ddc91dee82">
   <xsd:schema xmlns:xsd="http://www.w3.org/2001/XMLSchema" xmlns:xs="http://www.w3.org/2001/XMLSchema" xmlns:p="http://schemas.microsoft.com/office/2006/metadata/properties" xmlns:ns2="2279a1a0-7112-41f8-b496-d9a5c3576fb0" xmlns:ns3="95c0be1d-4093-4789-923d-5b0c8c8304dc" targetNamespace="http://schemas.microsoft.com/office/2006/metadata/properties" ma:root="true" ma:fieldsID="92b7f3ae194bb82c73e460576e55bd12" ns2:_="" ns3:_="">
     <xsd:import namespace="2279a1a0-7112-41f8-b496-d9a5c3576fb0"/>
@@ -28737,24 +28722,22 @@
 </ct:contentTypeSchema>
 </file>
 
-<file path=customXml/itemProps1.xml><?xml version="1.0" encoding="utf-8"?>
-<ds:datastoreItem xmlns:ds="http://schemas.openxmlformats.org/officeDocument/2006/customXml" ds:itemID="{4273EE10-C1B2-449B-9085-39965BA21A56}">
-  <ds:schemaRefs>
-    <ds:schemaRef ds:uri="http://schemas.microsoft.com/sharepoint/v3/contenttype/forms"/>
-  </ds:schemaRefs>
-</ds:datastoreItem>
+<file path=customXml/item2.xml><?xml version="1.0" encoding="utf-8"?>
+<p:properties xmlns:p="http://schemas.microsoft.com/office/2006/metadata/properties" xmlns:xsi="http://www.w3.org/2001/XMLSchema-instance" xmlns:pc="http://schemas.microsoft.com/office/infopath/2007/PartnerControls">
+  <documentManagement/>
+</p:properties>
 </file>
 
-<file path=customXml/itemProps2.xml><?xml version="1.0" encoding="utf-8"?>
-<ds:datastoreItem xmlns:ds="http://schemas.openxmlformats.org/officeDocument/2006/customXml" ds:itemID="{B61EE2CA-DCC7-45E5-87C8-6789A166AF77}">
-  <ds:schemaRefs>
-    <ds:schemaRef ds:uri="http://schemas.microsoft.com/office/2006/metadata/properties"/>
-    <ds:schemaRef ds:uri="http://schemas.microsoft.com/office/infopath/2007/PartnerControls"/>
-  </ds:schemaRefs>
-</ds:datastoreItem>
+<file path=customXml/item3.xml><?xml version="1.0" encoding="utf-8"?>
+<?mso-contentType ?>
+<FormTemplates xmlns="http://schemas.microsoft.com/sharepoint/v3/contenttype/forms">
+  <Display>DocumentLibraryForm</Display>
+  <Edit>DocumentLibraryForm</Edit>
+  <New>DocumentLibraryForm</New>
+</FormTemplates>
 </file>
 
-<file path=customXml/itemProps3.xml><?xml version="1.0" encoding="utf-8"?>
+<file path=customXml/itemProps1.xml><?xml version="1.0" encoding="utf-8"?>
 <ds:datastoreItem xmlns:ds="http://schemas.openxmlformats.org/officeDocument/2006/customXml" ds:itemID="{D4EFA56C-2770-467D-8E59-C07C9A9CC313}">
   <ds:schemaRefs>
     <ds:schemaRef ds:uri="http://schemas.microsoft.com/office/2006/metadata/contentType"/>
@@ -28771,4 +28754,21 @@
     <ds:schemaRef ds:uri="http://schemas.microsoft.com/internal/obd"/>
   </ds:schemaRefs>
 </ds:datastoreItem>
+</file>
+
+<file path=customXml/itemProps2.xml><?xml version="1.0" encoding="utf-8"?>
+<ds:datastoreItem xmlns:ds="http://schemas.openxmlformats.org/officeDocument/2006/customXml" ds:itemID="{B61EE2CA-DCC7-45E5-87C8-6789A166AF77}">
+  <ds:schemaRefs>
+    <ds:schemaRef ds:uri="http://schemas.microsoft.com/office/2006/metadata/properties"/>
+    <ds:schemaRef ds:uri="http://schemas.microsoft.com/office/infopath/2007/PartnerControls"/>
+  </ds:schemaRefs>
+</ds:datastoreItem>
+</file>
+
+<file path=customXml/itemProps3.xml><?xml version="1.0" encoding="utf-8"?>
+<ds:datastoreItem xmlns:ds="http://schemas.openxmlformats.org/officeDocument/2006/customXml" ds:itemID="{4273EE10-C1B2-449B-9085-39965BA21A56}">
+  <ds:schemaRefs>
+    <ds:schemaRef ds:uri="http://schemas.microsoft.com/sharepoint/v3/contenttype/forms"/>
+  </ds:schemaRefs>
+</ds:datastoreItem>
 </file>
</xml_diff>